<commit_message>
Updated PowerPoint presentation. Was missing some slides
</commit_message>
<xml_diff>
--- a/How To Write Unit Tests.pptx
+++ b/How To Write Unit Tests.pptx
@@ -5,10 +5,10 @@
     <p:sldMasterId id="2147483648" r:id="rId1"/>
   </p:sldMasterIdLst>
   <p:notesMasterIdLst>
-    <p:notesMasterId r:id="rId40"/>
+    <p:notesMasterId r:id="rId45"/>
   </p:notesMasterIdLst>
   <p:handoutMasterIdLst>
-    <p:handoutMasterId r:id="rId41"/>
+    <p:handoutMasterId r:id="rId46"/>
   </p:handoutMasterIdLst>
   <p:sldIdLst>
     <p:sldId id="259" r:id="rId2"/>
@@ -35,20 +35,25 @@
     <p:sldId id="304" r:id="rId23"/>
     <p:sldId id="305" r:id="rId24"/>
     <p:sldId id="306" r:id="rId25"/>
-    <p:sldId id="307" r:id="rId26"/>
-    <p:sldId id="309" r:id="rId27"/>
-    <p:sldId id="311" r:id="rId28"/>
-    <p:sldId id="310" r:id="rId29"/>
-    <p:sldId id="312" r:id="rId30"/>
-    <p:sldId id="313" r:id="rId31"/>
-    <p:sldId id="314" r:id="rId32"/>
-    <p:sldId id="315" r:id="rId33"/>
-    <p:sldId id="316" r:id="rId34"/>
-    <p:sldId id="317" r:id="rId35"/>
-    <p:sldId id="318" r:id="rId36"/>
-    <p:sldId id="275" r:id="rId37"/>
-    <p:sldId id="276" r:id="rId38"/>
-    <p:sldId id="277" r:id="rId39"/>
+    <p:sldId id="319" r:id="rId26"/>
+    <p:sldId id="320" r:id="rId27"/>
+    <p:sldId id="307" r:id="rId28"/>
+    <p:sldId id="309" r:id="rId29"/>
+    <p:sldId id="311" r:id="rId30"/>
+    <p:sldId id="310" r:id="rId31"/>
+    <p:sldId id="321" r:id="rId32"/>
+    <p:sldId id="322" r:id="rId33"/>
+    <p:sldId id="312" r:id="rId34"/>
+    <p:sldId id="323" r:id="rId35"/>
+    <p:sldId id="313" r:id="rId36"/>
+    <p:sldId id="314" r:id="rId37"/>
+    <p:sldId id="315" r:id="rId38"/>
+    <p:sldId id="316" r:id="rId39"/>
+    <p:sldId id="317" r:id="rId40"/>
+    <p:sldId id="318" r:id="rId41"/>
+    <p:sldId id="275" r:id="rId42"/>
+    <p:sldId id="276" r:id="rId43"/>
+    <p:sldId id="277" r:id="rId44"/>
   </p:sldIdLst>
   <p:sldSz cx="9144000" cy="6858000" type="screen4x3"/>
   <p:notesSz cx="6858000" cy="9144000"/>
@@ -188,6 +193,8 @@
             <p14:sldId id="304"/>
             <p14:sldId id="305"/>
             <p14:sldId id="306"/>
+            <p14:sldId id="319"/>
+            <p14:sldId id="320"/>
           </p14:sldIdLst>
         </p14:section>
         <p14:section name="File Structure Of Unit Tests" id="{836C22C6-E149-414C-B8F2-6964B557A037}">
@@ -196,7 +203,10 @@
             <p14:sldId id="309"/>
             <p14:sldId id="311"/>
             <p14:sldId id="310"/>
+            <p14:sldId id="321"/>
+            <p14:sldId id="322"/>
             <p14:sldId id="312"/>
+            <p14:sldId id="323"/>
           </p14:sldIdLst>
         </p14:section>
         <p14:section name="Helper Methods" id="{AECA7022-C893-4CD0-8A05-7CE55687EA4B}">
@@ -1750,8 +1760,8 @@
     <dgm:cxn modelId="{119690D4-400B-468B-8BA0-5C9C9E2AFEAF}" srcId="{D1776C8F-2B10-4075-8DF7-7F65AB725ED5}" destId="{6BE4E373-0656-4EDC-821E-BE09C952B1F6}" srcOrd="0" destOrd="0" parTransId="{34218063-BF94-4304-99BD-B3F7BA4D3C8F}" sibTransId="{E17B9BF1-2948-497F-8EC7-3BF734D839DB}"/>
     <dgm:cxn modelId="{3D887057-7E91-45EF-8E4B-3006C2DFECB4}" type="presOf" srcId="{6BE4E373-0656-4EDC-821E-BE09C952B1F6}" destId="{C7C3E6FD-D83F-4BDA-907E-B5EE041DA931}" srcOrd="0" destOrd="0" presId="urn:microsoft.com/office/officeart/2005/8/layout/vList5"/>
     <dgm:cxn modelId="{B6416E04-E5DE-46CA-AD27-47EBE280D636}" type="presOf" srcId="{C59269D0-92A5-481C-BA64-727AFB0DD545}" destId="{B37A5355-225B-4C6F-AED7-6C620F99EECC}" srcOrd="0" destOrd="0" presId="urn:microsoft.com/office/officeart/2005/8/layout/vList5"/>
+    <dgm:cxn modelId="{4C1C2213-0DA3-4515-97ED-3A6439B66EA1}" type="presOf" srcId="{DC552FD6-B868-4B1B-BC51-1681BFF4FF22}" destId="{849A0B13-F0A6-4F35-A490-09B4768FBEAE}" srcOrd="0" destOrd="0" presId="urn:microsoft.com/office/officeart/2005/8/layout/vList5"/>
     <dgm:cxn modelId="{F40F9561-0D4C-44CF-91EF-A92B1DBDE44B}" srcId="{F6FEADD9-F67D-41F5-BA4C-3C84956E7F46}" destId="{74EE5CD8-078F-4590-BF9C-A341A294A016}" srcOrd="0" destOrd="0" parTransId="{BB568D76-3363-43D3-B00C-3359A643216C}" sibTransId="{CF9FB981-E6ED-4440-AC98-4E4E2ABA2C55}"/>
-    <dgm:cxn modelId="{4C1C2213-0DA3-4515-97ED-3A6439B66EA1}" type="presOf" srcId="{DC552FD6-B868-4B1B-BC51-1681BFF4FF22}" destId="{849A0B13-F0A6-4F35-A490-09B4768FBEAE}" srcOrd="0" destOrd="0" presId="urn:microsoft.com/office/officeart/2005/8/layout/vList5"/>
     <dgm:cxn modelId="{61F6199F-0ED7-4496-854C-82A8C6DCC5F1}" type="presOf" srcId="{92CA2F54-9F6E-46D1-A677-C19D93A8E30E}" destId="{D99A2751-FD31-46C0-B101-823FD1553186}" srcOrd="0" destOrd="0" presId="urn:microsoft.com/office/officeart/2005/8/layout/vList5"/>
     <dgm:cxn modelId="{5417F3DF-8CAE-4E6C-ADBB-ED6F50084B8E}" type="presOf" srcId="{D1776C8F-2B10-4075-8DF7-7F65AB725ED5}" destId="{F5034101-5B7D-4FE7-B47A-5A48CF39606B}" srcOrd="0" destOrd="0" presId="urn:microsoft.com/office/officeart/2005/8/layout/vList5"/>
     <dgm:cxn modelId="{9071FB3B-D26B-4384-BD1A-80C12C62D02C}" srcId="{AA046201-5C4D-445E-BF0B-5C6D2B0A1945}" destId="{C59269D0-92A5-481C-BA64-727AFB0DD545}" srcOrd="0" destOrd="0" parTransId="{312CC84D-092F-422A-AA24-A4619DBBB7BE}" sibTransId="{266DE8E8-1339-41C4-B9A7-6148496C7FA9}"/>
@@ -2029,7 +2039,7 @@
           <a:schemeClr val="accent3">
             <a:tint val="40000"/>
             <a:alpha val="90000"/>
-            <a:hueOff val="2679212"/>
+            <a:hueOff val="2679213"/>
             <a:satOff val="-3448"/>
             <a:lumOff val="-269"/>
             <a:alphaOff val="0"/>
@@ -2040,7 +2050,7 @@
             <a:schemeClr val="accent3">
               <a:tint val="40000"/>
               <a:alpha val="90000"/>
-              <a:hueOff val="2679212"/>
+              <a:hueOff val="2679213"/>
               <a:satOff val="-3448"/>
               <a:lumOff val="-269"/>
               <a:alphaOff val="0"/>
@@ -2236,7 +2246,7 @@
           <a:schemeClr val="accent3">
             <a:tint val="40000"/>
             <a:alpha val="90000"/>
-            <a:hueOff val="5358425"/>
+            <a:hueOff val="5358427"/>
             <a:satOff val="-6896"/>
             <a:lumOff val="-537"/>
             <a:alphaOff val="0"/>
@@ -2247,7 +2257,7 @@
             <a:schemeClr val="accent3">
               <a:tint val="40000"/>
               <a:alpha val="90000"/>
-              <a:hueOff val="5358425"/>
+              <a:hueOff val="5358427"/>
               <a:satOff val="-6896"/>
               <a:lumOff val="-537"/>
               <a:alphaOff val="0"/>
@@ -2455,7 +2465,7 @@
           <a:schemeClr val="accent3">
             <a:tint val="40000"/>
             <a:alpha val="90000"/>
-            <a:hueOff val="8037638"/>
+            <a:hueOff val="8037640"/>
             <a:satOff val="-10345"/>
             <a:lumOff val="-806"/>
             <a:alphaOff val="0"/>
@@ -2466,7 +2476,7 @@
             <a:schemeClr val="accent3">
               <a:tint val="40000"/>
               <a:alpha val="90000"/>
-              <a:hueOff val="8037638"/>
+              <a:hueOff val="8037640"/>
               <a:satOff val="-10345"/>
               <a:lumOff val="-806"/>
               <a:alphaOff val="0"/>
@@ -2662,7 +2672,7 @@
           <a:schemeClr val="accent3">
             <a:tint val="40000"/>
             <a:alpha val="90000"/>
-            <a:hueOff val="10716850"/>
+            <a:hueOff val="10716854"/>
             <a:satOff val="-13793"/>
             <a:lumOff val="-1075"/>
             <a:alphaOff val="0"/>
@@ -2673,7 +2683,7 @@
             <a:schemeClr val="accent3">
               <a:tint val="40000"/>
               <a:alpha val="90000"/>
-              <a:hueOff val="10716850"/>
+              <a:hueOff val="10716854"/>
               <a:satOff val="-13793"/>
               <a:lumOff val="-1075"/>
               <a:alphaOff val="0"/>
@@ -5421,7 +5431,7 @@
             <a:fld id="{EC6EAC7D-5A89-47C2-8ABA-56C9C2DEF7A4}" type="slidenum">
               <a:rPr lang="en-US" smtClean="0"/>
               <a:pPr/>
-              <a:t>36</a:t>
+              <a:t>41</a:t>
             </a:fld>
             <a:endParaRPr lang="en-US" dirty="0"/>
           </a:p>
@@ -5525,7 +5535,7 @@
             <a:fld id="{85CEDE57-F8FE-4B43-B511-2E9F76624F74}" type="slidenum">
               <a:rPr lang="en-US" smtClean="0"/>
               <a:pPr/>
-              <a:t>37</a:t>
+              <a:t>42</a:t>
             </a:fld>
             <a:endParaRPr lang="en-US" dirty="0" smtClean="0"/>
           </a:p>
@@ -5677,7 +5687,7 @@
             <a:fld id="{B2B44A5F-6CE4-493C-A0D7-6834FF76660C}" type="slidenum">
               <a:rPr lang="en-US" smtClean="0"/>
               <a:pPr/>
-              <a:t>38</a:t>
+              <a:t>43</a:t>
             </a:fld>
             <a:endParaRPr lang="en-US" dirty="0" smtClean="0"/>
           </a:p>
@@ -9521,15 +9531,7 @@
             </a:r>
             <a:r>
               <a:rPr lang="en-US" dirty="0"/>
-              <a:t>&gt; </a:t>
-            </a:r>
-            <a:r>
-              <a:rPr lang="en-US" dirty="0"/>
-              <a:t>where</a:t>
-            </a:r>
-            <a:r>
-              <a:rPr lang="en-US" dirty="0"/>
-              <a:t> T : </a:t>
+              <a:t>&gt; where T : </a:t>
             </a:r>
             <a:r>
               <a:rPr lang="en-US" dirty="0" err="1"/>
@@ -9563,6 +9565,13 @@
   <p:transition spd="slow">
     <p:wipe dir="d"/>
   </p:transition>
+  <p:timing>
+    <p:tnLst>
+      <p:par>
+        <p:cTn id="1" dur="indefinite" restart="never" nodeType="tmRoot"/>
+      </p:par>
+    </p:tnLst>
+  </p:timing>
 </p:sld>
 </file>
 
@@ -9689,6 +9698,13 @@
   <p:transition spd="slow">
     <p:wipe dir="d"/>
   </p:transition>
+  <p:timing>
+    <p:tnLst>
+      <p:par>
+        <p:cTn id="1" dur="indefinite" restart="never" nodeType="tmRoot"/>
+      </p:par>
+    </p:tnLst>
+  </p:timing>
 </p:sld>
 </file>
 
@@ -9811,6 +9827,13 @@
   <p:transition spd="slow">
     <p:wipe dir="d"/>
   </p:transition>
+  <p:timing>
+    <p:tnLst>
+      <p:par>
+        <p:cTn id="1" dur="indefinite" restart="never" nodeType="tmRoot"/>
+      </p:par>
+    </p:tnLst>
+  </p:timing>
 </p:sld>
 </file>
 
@@ -9931,6 +9954,13 @@
   <p:transition spd="slow">
     <p:wipe dir="d"/>
   </p:transition>
+  <p:timing>
+    <p:tnLst>
+      <p:par>
+        <p:cTn id="1" dur="indefinite" restart="never" nodeType="tmRoot"/>
+      </p:par>
+    </p:tnLst>
+  </p:timing>
 </p:sld>
 </file>
 
@@ -10051,6 +10081,13 @@
   <p:transition spd="slow">
     <p:wipe dir="d"/>
   </p:transition>
+  <p:timing>
+    <p:tnLst>
+      <p:par>
+        <p:cTn id="1" dur="indefinite" restart="never" nodeType="tmRoot"/>
+      </p:par>
+    </p:tnLst>
+  </p:timing>
 </p:sld>
 </file>
 
@@ -10173,6 +10210,13 @@
   <p:transition spd="slow">
     <p:wipe dir="d"/>
   </p:transition>
+  <p:timing>
+    <p:tnLst>
+      <p:par>
+        <p:cTn id="1" dur="indefinite" restart="never" nodeType="tmRoot"/>
+      </p:par>
+    </p:tnLst>
+  </p:timing>
 </p:sld>
 </file>
 
@@ -10264,6 +10308,13 @@
   <p:transition spd="slow">
     <p:wipe dir="d"/>
   </p:transition>
+  <p:timing>
+    <p:tnLst>
+      <p:par>
+        <p:cTn id="1" dur="indefinite" restart="never" nodeType="tmRoot"/>
+      </p:par>
+    </p:tnLst>
+  </p:timing>
 </p:sld>
 </file>
 
@@ -10384,6 +10435,13 @@
   <p:transition spd="slow">
     <p:wipe dir="d"/>
   </p:transition>
+  <p:timing>
+    <p:tnLst>
+      <p:par>
+        <p:cTn id="1" dur="indefinite" restart="never" nodeType="tmRoot"/>
+      </p:par>
+    </p:tnLst>
+  </p:timing>
 </p:sld>
 </file>
 
@@ -10520,6 +10578,13 @@
   <p:transition spd="slow">
     <p:wipe dir="d"/>
   </p:transition>
+  <p:timing>
+    <p:tnLst>
+      <p:par>
+        <p:cTn id="1" dur="indefinite" restart="never" nodeType="tmRoot"/>
+      </p:par>
+    </p:tnLst>
+  </p:timing>
 </p:sld>
 </file>
 
@@ -10642,6 +10707,13 @@
   <p:transition spd="slow">
     <p:wipe dir="d"/>
   </p:transition>
+  <p:timing>
+    <p:tnLst>
+      <p:par>
+        <p:cTn id="1" dur="indefinite" restart="never" nodeType="tmRoot"/>
+      </p:par>
+    </p:tnLst>
+  </p:timing>
 </p:sld>
 </file>
 
@@ -10708,7 +10780,6 @@
               <a:rPr lang="en-US" dirty="0"/>
               <a:t>Writing Unit Tests Using UCDArch </a:t>
             </a:r>
-            <a:endParaRPr lang="en-US" dirty="0"/>
           </a:p>
         </p:txBody>
       </p:sp>
@@ -11492,6 +11563,13 @@
   <p:transition spd="slow">
     <p:wipe dir="d"/>
   </p:transition>
+  <p:timing>
+    <p:tnLst>
+      <p:par>
+        <p:cTn id="1" dur="indefinite" restart="never" nodeType="tmRoot"/>
+      </p:par>
+    </p:tnLst>
+  </p:timing>
 </p:sld>
 </file>
 
@@ -11745,6 +11823,13 @@
   <p:transition spd="slow">
     <p:wipe dir="d"/>
   </p:transition>
+  <p:timing>
+    <p:tnLst>
+      <p:par>
+        <p:cTn id="1" dur="indefinite" restart="never" nodeType="tmRoot"/>
+      </p:par>
+    </p:tnLst>
+  </p:timing>
 </p:sld>
 </file>
 
@@ -11929,6 +12014,13 @@
   <p:transition spd="slow">
     <p:wipe dir="d"/>
   </p:transition>
+  <p:timing>
+    <p:tnLst>
+      <p:par>
+        <p:cTn id="1" dur="indefinite" restart="never" nodeType="tmRoot"/>
+      </p:par>
+    </p:tnLst>
+  </p:timing>
 </p:sld>
 </file>
 
@@ -12053,6 +12145,13 @@
   <p:transition spd="slow">
     <p:wipe dir="d"/>
   </p:transition>
+  <p:timing>
+    <p:tnLst>
+      <p:par>
+        <p:cTn id="1" dur="indefinite" restart="never" nodeType="tmRoot"/>
+      </p:par>
+    </p:tnLst>
+  </p:timing>
 </p:sld>
 </file>
 
@@ -12236,6 +12335,13 @@
   <p:transition spd="slow">
     <p:wipe dir="d"/>
   </p:transition>
+  <p:timing>
+    <p:tnLst>
+      <p:par>
+        <p:cTn id="1" dur="indefinite" restart="never" nodeType="tmRoot"/>
+      </p:par>
+    </p:tnLst>
+  </p:timing>
 </p:sld>
 </file>
 
@@ -12258,7 +12364,7 @@
       </p:grpSpPr>
       <p:sp>
         <p:nvSpPr>
-          <p:cNvPr id="4" name="Title 3"/>
+          <p:cNvPr id="2" name="Title 1"/>
           <p:cNvSpPr>
             <a:spLocks noGrp="1"/>
           </p:cNvSpPr>
@@ -12273,16 +12379,56 @@
           <a:p>
             <a:r>
               <a:rPr lang="en-US" dirty="0" smtClean="0"/>
-              <a:t>File Structure Of Unit Tests</a:t>
+              <a:t>Interface Tests</a:t>
             </a:r>
             <a:endParaRPr lang="en-US" dirty="0"/>
+          </a:p>
+        </p:txBody>
+      </p:sp>
+      <p:sp>
+        <p:nvSpPr>
+          <p:cNvPr id="3" name="Content Placeholder 2"/>
+          <p:cNvSpPr>
+            <a:spLocks noGrp="1"/>
+          </p:cNvSpPr>
+          <p:nvPr>
+            <p:ph idx="1"/>
+          </p:nvPr>
+        </p:nvSpPr>
+        <p:spPr/>
+        <p:txBody>
+          <a:bodyPr/>
+          <a:lstStyle/>
+          <a:p>
+            <a:r>
+              <a:rPr lang="en-US" dirty="0" smtClean="0"/>
+              <a:t>Sometimes these need to be run within the structure of a Controller test</a:t>
+            </a:r>
+          </a:p>
+          <a:p>
+            <a:r>
+              <a:rPr lang="en-US" dirty="0" smtClean="0"/>
+              <a:t>Check that expected parameters are passed</a:t>
+            </a:r>
+          </a:p>
+          <a:p>
+            <a:r>
+              <a:rPr lang="en-US" dirty="0" smtClean="0"/>
+              <a:t>Check that any actions or return values are what is expected</a:t>
+            </a:r>
+          </a:p>
+          <a:p>
+            <a:r>
+              <a:rPr lang="en-US" dirty="0" smtClean="0"/>
+              <a:t>Even if you don’t write tests for your interfaces, you just have one place to review the logic.</a:t>
+            </a:r>
           </a:p>
         </p:txBody>
       </p:sp>
     </p:spTree>
     <p:extLst>
       <p:ext uri="{BB962C8B-B14F-4D97-AF65-F5344CB8AC3E}">
-        <p14:creationId xmlns:p14="http://schemas.microsoft.com/office/powerpoint/2010/main" val="913485716"/>
+        <p14:creationId xmlns:p14="http://schemas.microsoft.com/office/powerpoint/2010/main" val="1460307893"/>
       </p:ext>
     </p:extLst>
   </p:cSld>
@@ -12314,7 +12460,7 @@
       </p:grpSpPr>
       <p:sp>
         <p:nvSpPr>
-          <p:cNvPr id="4" name="Title 3"/>
+          <p:cNvPr id="2" name="Title 1"/>
           <p:cNvSpPr>
             <a:spLocks noGrp="1"/>
           </p:cNvSpPr>
@@ -12329,64 +12475,144 @@
           <a:p>
             <a:r>
               <a:rPr lang="en-US" dirty="0" smtClean="0"/>
-              <a:t>File Structure Of Unit Tests</a:t>
+              <a:t>Interface Tests Example</a:t>
             </a:r>
             <a:endParaRPr lang="en-US" dirty="0"/>
           </a:p>
         </p:txBody>
       </p:sp>
-      <p:sp>
-        <p:nvSpPr>
-          <p:cNvPr id="5" name="Content Placeholder 4"/>
-          <p:cNvSpPr>
-            <a:spLocks noGrp="1"/>
-          </p:cNvSpPr>
-          <p:nvPr>
-            <p:ph idx="1"/>
-          </p:nvPr>
-        </p:nvSpPr>
-        <p:spPr/>
-        <p:txBody>
-          <a:bodyPr>
-            <a:normAutofit/>
-          </a:bodyPr>
-          <a:lstStyle/>
-          <a:p>
-            <a:r>
-              <a:rPr lang="en-US" dirty="0" err="1" smtClean="0"/>
-              <a:t>Project.Tests</a:t>
-            </a:r>
-            <a:endParaRPr lang="en-US" dirty="0" smtClean="0"/>
-          </a:p>
-          <a:p>
-            <a:pPr lvl="1"/>
-            <a:r>
-              <a:rPr lang="en-US" dirty="0" err="1" smtClean="0"/>
-              <a:t>ControllerTests</a:t>
-            </a:r>
-            <a:endParaRPr lang="en-US" dirty="0" smtClean="0"/>
-          </a:p>
-          <a:p>
-            <a:pPr lvl="1"/>
-            <a:r>
-              <a:rPr lang="en-US" dirty="0" smtClean="0"/>
-              <a:t>Core</a:t>
-            </a:r>
-          </a:p>
-          <a:p>
-            <a:pPr lvl="1"/>
-            <a:r>
-              <a:rPr lang="en-US" dirty="0" err="1" smtClean="0"/>
-              <a:t>RepositoryTests</a:t>
-            </a:r>
-            <a:endParaRPr lang="en-US" dirty="0"/>
-          </a:p>
-        </p:txBody>
-      </p:sp>
+      <p:pic>
+        <p:nvPicPr>
+          <p:cNvPr id="1026" name="Picture 2"/>
+          <p:cNvPicPr>
+            <a:picLocks noChangeAspect="1" noChangeArrowheads="1"/>
+          </p:cNvPicPr>
+          <p:nvPr/>
+        </p:nvPicPr>
+        <p:blipFill>
+          <a:blip r:embed="rId2">
+            <a:extLst>
+              <a:ext uri="{28A0092B-C50C-407E-A947-70E740481C1C}">
+                <a14:useLocalDpi xmlns:a14="http://schemas.microsoft.com/office/drawing/2010/main" val="0"/>
+              </a:ext>
+            </a:extLst>
+          </a:blip>
+          <a:srcRect/>
+          <a:stretch>
+            <a:fillRect/>
+          </a:stretch>
+        </p:blipFill>
+        <p:spPr bwMode="auto">
+          <a:xfrm>
+            <a:off x="990600" y="1295400"/>
+            <a:ext cx="6715125" cy="2581275"/>
+          </a:xfrm>
+          <a:prstGeom prst="rect">
+            <a:avLst/>
+          </a:prstGeom>
+          <a:noFill/>
+          <a:ln>
+            <a:noFill/>
+          </a:ln>
+          <a:effectLst/>
+          <a:extLst>
+            <a:ext uri="{909E8E84-426E-40DD-AFC4-6F175D3DCCD1}">
+              <a14:hiddenFill xmlns:a14="http://schemas.microsoft.com/office/drawing/2010/main">
+                <a:solidFill>
+                  <a:schemeClr val="accent1"/>
+                </a:solidFill>
+              </a14:hiddenFill>
+            </a:ext>
+            <a:ext uri="{91240B29-F687-4F45-9708-019B960494DF}">
+              <a14:hiddenLine xmlns:a14="http://schemas.microsoft.com/office/drawing/2010/main" w="9525">
+                <a:solidFill>
+                  <a:schemeClr val="tx1"/>
+                </a:solidFill>
+                <a:miter lim="800000"/>
+                <a:headEnd/>
+                <a:tailEnd/>
+              </a14:hiddenLine>
+            </a:ext>
+            <a:ext uri="{AF507438-7753-43E0-B8FC-AC1667EBCBE1}">
+              <a14:hiddenEffects xmlns:a14="http://schemas.microsoft.com/office/drawing/2010/main">
+                <a:effectLst>
+                  <a:outerShdw dist="35921" dir="2700000" algn="ctr" rotWithShape="0">
+                    <a:schemeClr val="bg2"/>
+                  </a:outerShdw>
+                </a:effectLst>
+              </a14:hiddenEffects>
+            </a:ext>
+          </a:extLst>
+        </p:spPr>
+      </p:pic>
+      <p:pic>
+        <p:nvPicPr>
+          <p:cNvPr id="1027" name="Picture 3"/>
+          <p:cNvPicPr>
+            <a:picLocks noChangeAspect="1" noChangeArrowheads="1"/>
+          </p:cNvPicPr>
+          <p:nvPr/>
+        </p:nvPicPr>
+        <p:blipFill>
+          <a:blip r:embed="rId3" cstate="email">
+            <a:extLst>
+              <a:ext uri="{28A0092B-C50C-407E-A947-70E740481C1C}">
+                <a14:useLocalDpi xmlns:a14="http://schemas.microsoft.com/office/drawing/2010/main" val="0"/>
+              </a:ext>
+            </a:extLst>
+          </a:blip>
+          <a:srcRect/>
+          <a:stretch>
+            <a:fillRect/>
+          </a:stretch>
+        </p:blipFill>
+        <p:spPr bwMode="auto">
+          <a:xfrm>
+            <a:off x="762000" y="3979333"/>
+            <a:ext cx="7571096" cy="2667000"/>
+          </a:xfrm>
+          <a:prstGeom prst="rect">
+            <a:avLst/>
+          </a:prstGeom>
+          <a:noFill/>
+          <a:ln>
+            <a:noFill/>
+          </a:ln>
+          <a:effectLst/>
+          <a:extLst>
+            <a:ext uri="{909E8E84-426E-40DD-AFC4-6F175D3DCCD1}">
+              <a14:hiddenFill xmlns:a14="http://schemas.microsoft.com/office/drawing/2010/main">
+                <a:solidFill>
+                  <a:schemeClr val="accent1"/>
+                </a:solidFill>
+              </a14:hiddenFill>
+            </a:ext>
+            <a:ext uri="{91240B29-F687-4F45-9708-019B960494DF}">
+              <a14:hiddenLine xmlns:a14="http://schemas.microsoft.com/office/drawing/2010/main" w="9525">
+                <a:solidFill>
+                  <a:schemeClr val="tx1"/>
+                </a:solidFill>
+                <a:miter lim="800000"/>
+                <a:headEnd/>
+                <a:tailEnd/>
+              </a14:hiddenLine>
+            </a:ext>
+            <a:ext uri="{AF507438-7753-43E0-B8FC-AC1667EBCBE1}">
+              <a14:hiddenEffects xmlns:a14="http://schemas.microsoft.com/office/drawing/2010/main">
+                <a:effectLst>
+                  <a:outerShdw dist="35921" dir="2700000" algn="ctr" rotWithShape="0">
+                    <a:schemeClr val="bg2"/>
+                  </a:outerShdw>
+                </a:effectLst>
+              </a14:hiddenEffects>
+            </a:ext>
+          </a:extLst>
+        </p:spPr>
+      </p:pic>
     </p:spTree>
     <p:extLst>
       <p:ext uri="{BB962C8B-B14F-4D97-AF65-F5344CB8AC3E}">
-        <p14:creationId xmlns:p14="http://schemas.microsoft.com/office/powerpoint/2010/main" val="2656164662"/>
+        <p14:creationId xmlns:p14="http://schemas.microsoft.com/office/powerpoint/2010/main" val="3261311510"/>
       </p:ext>
     </p:extLst>
   </p:cSld>
@@ -12418,7 +12644,7 @@
       </p:grpSpPr>
       <p:sp>
         <p:nvSpPr>
-          <p:cNvPr id="2" name="Title 1"/>
+          <p:cNvPr id="4" name="Title 3"/>
           <p:cNvSpPr>
             <a:spLocks noGrp="1"/>
           </p:cNvSpPr>
@@ -12432,81 +12658,8 @@
           <a:lstStyle/>
           <a:p>
             <a:r>
-              <a:rPr lang="en-US" dirty="0" err="1" smtClean="0"/>
-              <a:t>ControllerTests</a:t>
-            </a:r>
-            <a:endParaRPr lang="en-US" dirty="0"/>
-          </a:p>
-        </p:txBody>
-      </p:sp>
-      <p:sp>
-        <p:nvSpPr>
-          <p:cNvPr id="3" name="Content Placeholder 2"/>
-          <p:cNvSpPr>
-            <a:spLocks noGrp="1"/>
-          </p:cNvSpPr>
-          <p:nvPr>
-            <p:ph idx="1"/>
-          </p:nvPr>
-        </p:nvSpPr>
-        <p:spPr/>
-        <p:txBody>
-          <a:bodyPr/>
-          <a:lstStyle/>
-          <a:p>
-            <a:r>
-              <a:rPr lang="en-US" dirty="0" err="1" smtClean="0"/>
-              <a:t>Controller1Tests</a:t>
-            </a:r>
-            <a:r>
               <a:rPr lang="en-US" dirty="0" smtClean="0"/>
-              <a:t> (Partial Classes)</a:t>
-            </a:r>
-          </a:p>
-          <a:p>
-            <a:pPr lvl="1"/>
-            <a:r>
-              <a:rPr lang="en-US" dirty="0" err="1" smtClean="0"/>
-              <a:t>Controller1TestsInit.cs</a:t>
-            </a:r>
-            <a:endParaRPr lang="en-US" dirty="0" smtClean="0"/>
-          </a:p>
-          <a:p>
-            <a:pPr lvl="1"/>
-            <a:r>
-              <a:rPr lang="en-US" dirty="0" err="1" smtClean="0"/>
-              <a:t>Controller1TestsMapping.cs</a:t>
-            </a:r>
-            <a:endParaRPr lang="en-US" dirty="0" smtClean="0"/>
-          </a:p>
-          <a:p>
-            <a:pPr lvl="1"/>
-            <a:r>
-              <a:rPr lang="en-US" dirty="0" err="1" smtClean="0"/>
-              <a:t>Controller1TestsPart01.cs</a:t>
-            </a:r>
-            <a:endParaRPr lang="en-US" dirty="0" smtClean="0"/>
-          </a:p>
-          <a:p>
-            <a:pPr lvl="1"/>
-            <a:r>
-              <a:rPr lang="en-US" dirty="0" err="1" smtClean="0"/>
-              <a:t>Controller1TestsPart02.cs</a:t>
-            </a:r>
-            <a:endParaRPr lang="en-US" dirty="0" smtClean="0"/>
-          </a:p>
-          <a:p>
-            <a:pPr lvl="1"/>
-            <a:r>
-              <a:rPr lang="en-US" dirty="0" err="1" smtClean="0"/>
-              <a:t>Controller1TestsReflection.cs</a:t>
-            </a:r>
-            <a:endParaRPr lang="en-US" dirty="0" smtClean="0"/>
-          </a:p>
-          <a:p>
-            <a:r>
-              <a:rPr lang="en-US" dirty="0" err="1" smtClean="0"/>
-              <a:t>Controller2Tests.cs</a:t>
+              <a:t>File Structure Of Unit Tests</a:t>
             </a:r>
             <a:endParaRPr lang="en-US" dirty="0"/>
           </a:p>
@@ -12515,7 +12668,7 @@
     </p:spTree>
     <p:extLst>
       <p:ext uri="{BB962C8B-B14F-4D97-AF65-F5344CB8AC3E}">
-        <p14:creationId xmlns:p14="http://schemas.microsoft.com/office/powerpoint/2010/main" val="1662310139"/>
+        <p14:creationId xmlns:p14="http://schemas.microsoft.com/office/powerpoint/2010/main" val="913485716"/>
       </p:ext>
     </p:extLst>
   </p:cSld>
@@ -12525,6 +12678,13 @@
   <p:transition spd="slow">
     <p:wipe dir="d"/>
   </p:transition>
+  <p:timing>
+    <p:tnLst>
+      <p:par>
+        <p:cTn id="1" dur="indefinite" restart="never" nodeType="tmRoot"/>
+      </p:par>
+    </p:tnLst>
+  </p:timing>
 </p:sld>
 </file>
 
@@ -12547,7 +12707,7 @@
       </p:grpSpPr>
       <p:sp>
         <p:nvSpPr>
-          <p:cNvPr id="2" name="Title 1"/>
+          <p:cNvPr id="4" name="Title 3"/>
           <p:cNvSpPr>
             <a:spLocks noGrp="1"/>
           </p:cNvSpPr>
@@ -12562,7 +12722,7 @@
           <a:p>
             <a:r>
               <a:rPr lang="en-US" dirty="0" smtClean="0"/>
-              <a:t>Core</a:t>
+              <a:t>File Structure Of Unit Tests</a:t>
             </a:r>
             <a:endParaRPr lang="en-US" dirty="0"/>
           </a:p>
@@ -12570,7 +12730,7 @@
       </p:sp>
       <p:sp>
         <p:nvSpPr>
-          <p:cNvPr id="3" name="Content Placeholder 2"/>
+          <p:cNvPr id="5" name="Content Placeholder 4"/>
           <p:cNvSpPr>
             <a:spLocks noGrp="1"/>
           </p:cNvSpPr>
@@ -12581,50 +12741,44 @@
         <p:spPr/>
         <p:txBody>
           <a:bodyPr>
-            <a:normAutofit fontScale="85000" lnSpcReduction="20000"/>
+            <a:normAutofit/>
           </a:bodyPr>
           <a:lstStyle/>
           <a:p>
             <a:r>
-              <a:rPr lang="en-US" dirty="0"/>
-              <a:t>Extensions</a:t>
-            </a:r>
+              <a:rPr lang="en-US" dirty="0" err="1" smtClean="0"/>
+              <a:t>Project.Tests</a:t>
+            </a:r>
+            <a:endParaRPr lang="en-US" dirty="0" smtClean="0"/>
           </a:p>
           <a:p>
             <a:pPr lvl="1"/>
             <a:r>
-              <a:rPr lang="en-US" dirty="0" err="1"/>
-              <a:t>AssertExtensions.cs</a:t>
-            </a:r>
-            <a:endParaRPr lang="en-US" dirty="0"/>
+              <a:rPr lang="en-US" dirty="0" err="1" smtClean="0"/>
+              <a:t>ControllerTests</a:t>
+            </a:r>
+            <a:endParaRPr lang="en-US" dirty="0" smtClean="0"/>
           </a:p>
           <a:p>
             <a:pPr lvl="1"/>
             <a:r>
-              <a:rPr lang="en-US" dirty="0" err="1"/>
-              <a:t>RouteTestingExtensions.cs</a:t>
-            </a:r>
-            <a:endParaRPr lang="en-US" dirty="0"/>
+              <a:rPr lang="en-US" dirty="0" smtClean="0"/>
+              <a:t>Core</a:t>
+            </a:r>
           </a:p>
           <a:p>
             <a:pPr lvl="1"/>
             <a:r>
-              <a:rPr lang="en-US" dirty="0" err="1"/>
-              <a:t>StringExtensions.cs</a:t>
-            </a:r>
-            <a:endParaRPr lang="en-US" dirty="0"/>
-          </a:p>
-          <a:p>
-            <a:r>
-              <a:rPr lang="en-US" dirty="0" smtClean="0"/>
-              <a:t>Helpers</a:t>
-            </a:r>
+              <a:rPr lang="en-US" dirty="0" err="1" smtClean="0"/>
+              <a:t>InterfaceTests</a:t>
+            </a:r>
+            <a:endParaRPr lang="en-US" dirty="0" smtClean="0"/>
           </a:p>
           <a:p>
             <a:pPr lvl="1"/>
             <a:r>
               <a:rPr lang="en-US" dirty="0" err="1" smtClean="0"/>
-              <a:t>AttributeAndFieldValidation.cs</a:t>
+              <a:t>MiscTests</a:t>
             </a:r>
             <a:endParaRPr lang="en-US" dirty="0" smtClean="0"/>
           </a:p>
@@ -12632,7 +12786,7 @@
             <a:pPr lvl="1"/>
             <a:r>
               <a:rPr lang="en-US" dirty="0" err="1" smtClean="0"/>
-              <a:t>ControllerRecordFakes.cs</a:t>
+              <a:t>RepositoryTests</a:t>
             </a:r>
             <a:endParaRPr lang="en-US" dirty="0" smtClean="0"/>
           </a:p>
@@ -12640,37 +12794,8 @@
             <a:pPr lvl="1"/>
             <a:r>
               <a:rPr lang="en-US" dirty="0" err="1" smtClean="0"/>
-              <a:t>CreateValidEntities.cs</a:t>
-            </a:r>
-            <a:endParaRPr lang="en-US" dirty="0" smtClean="0"/>
-          </a:p>
-          <a:p>
-            <a:pPr lvl="1"/>
-            <a:r>
-              <a:rPr lang="en-US" dirty="0" err="1" smtClean="0"/>
-              <a:t>NameAndType.cs</a:t>
-            </a:r>
-            <a:endParaRPr lang="en-US" dirty="0" smtClean="0"/>
-          </a:p>
-          <a:p>
-            <a:pPr lvl="1"/>
-            <a:r>
-              <a:rPr lang="en-US" dirty="0" err="1" smtClean="0"/>
-              <a:t>SpecificGuid.cs</a:t>
-            </a:r>
-            <a:endParaRPr lang="en-US" dirty="0"/>
-          </a:p>
-          <a:p>
-            <a:r>
-              <a:rPr lang="en-US" dirty="0" err="1"/>
-              <a:t>AbstractRepositoryTests.cs</a:t>
-            </a:r>
-            <a:r>
-              <a:rPr lang="en-US" dirty="0"/>
-              <a:t> (until moved to UCDArch)</a:t>
-            </a:r>
-          </a:p>
-          <a:p>
+              <a:t>ViewModelTests</a:t>
+            </a:r>
             <a:endParaRPr lang="en-US" dirty="0"/>
           </a:p>
         </p:txBody>
@@ -12678,7 +12803,7 @@
     </p:spTree>
     <p:extLst>
       <p:ext uri="{BB962C8B-B14F-4D97-AF65-F5344CB8AC3E}">
-        <p14:creationId xmlns:p14="http://schemas.microsoft.com/office/powerpoint/2010/main" val="955249806"/>
+        <p14:creationId xmlns:p14="http://schemas.microsoft.com/office/powerpoint/2010/main" val="2656164662"/>
       </p:ext>
     </p:extLst>
   </p:cSld>
@@ -12688,6 +12813,13 @@
   <p:transition spd="slow">
     <p:wipe dir="d"/>
   </p:transition>
+  <p:timing>
+    <p:tnLst>
+      <p:par>
+        <p:cTn id="1" dur="indefinite" restart="never" nodeType="tmRoot"/>
+      </p:par>
+    </p:tnLst>
+  </p:timing>
 </p:sld>
 </file>
 
@@ -12725,7 +12857,7 @@
           <a:p>
             <a:r>
               <a:rPr lang="en-US" dirty="0" err="1" smtClean="0"/>
-              <a:t>RepositoryTests</a:t>
+              <a:t>ControllerTests</a:t>
             </a:r>
             <a:endParaRPr lang="en-US" dirty="0"/>
           </a:p>
@@ -12748,25 +12880,34 @@
           <a:p>
             <a:r>
               <a:rPr lang="en-US" dirty="0" err="1" smtClean="0"/>
-              <a:t>SmallRepository1Tests.cs</a:t>
+              <a:t>Controller1Tests</a:t>
+            </a:r>
+            <a:r>
+              <a:rPr lang="en-US" dirty="0" smtClean="0"/>
+              <a:t> (Partial Classes)</a:t>
+            </a:r>
+          </a:p>
+          <a:p>
+            <a:pPr lvl="1"/>
+            <a:r>
+              <a:rPr lang="en-US" dirty="0" err="1" smtClean="0"/>
+              <a:t>Controller1TestsInit.cs</a:t>
             </a:r>
             <a:endParaRPr lang="en-US" dirty="0" smtClean="0"/>
           </a:p>
           <a:p>
+            <a:pPr lvl="1"/>
             <a:r>
               <a:rPr lang="en-US" dirty="0" err="1" smtClean="0"/>
-              <a:t>LargeRepository2Tests</a:t>
-            </a:r>
-            <a:r>
-              <a:rPr lang="en-US" dirty="0" smtClean="0"/>
-              <a:t> (partial Classes)</a:t>
-            </a:r>
+              <a:t>Controller1TestsMapping.cs</a:t>
+            </a:r>
+            <a:endParaRPr lang="en-US" dirty="0" smtClean="0"/>
           </a:p>
           <a:p>
             <a:pPr lvl="1"/>
             <a:r>
               <a:rPr lang="en-US" dirty="0" err="1" smtClean="0"/>
-              <a:t>LargeRepository2TestsInit.cs</a:t>
+              <a:t>Controller1TestsPart01.cs</a:t>
             </a:r>
             <a:endParaRPr lang="en-US" dirty="0" smtClean="0"/>
           </a:p>
@@ -12774,7 +12915,7 @@
             <a:pPr lvl="1"/>
             <a:r>
               <a:rPr lang="en-US" dirty="0" err="1" smtClean="0"/>
-              <a:t>LargeRepository2TestsConstructor.cs</a:t>
+              <a:t>Controller1TestsPart02.cs</a:t>
             </a:r>
             <a:endParaRPr lang="en-US" dirty="0" smtClean="0"/>
           </a:p>
@@ -12782,31 +12923,14 @@
             <a:pPr lvl="1"/>
             <a:r>
               <a:rPr lang="en-US" dirty="0" err="1" smtClean="0"/>
-              <a:t>LargeRepository2TestsFluentMapping.cs</a:t>
+              <a:t>Controller1TestsReflection.cs</a:t>
             </a:r>
             <a:endParaRPr lang="en-US" dirty="0" smtClean="0"/>
           </a:p>
           <a:p>
-            <a:pPr lvl="1"/>
             <a:r>
               <a:rPr lang="en-US" dirty="0" err="1" smtClean="0"/>
-              <a:t>LargeRepository2TestsPart01.cs</a:t>
-            </a:r>
-            <a:endParaRPr lang="en-US" dirty="0" smtClean="0"/>
-          </a:p>
-          <a:p>
-            <a:pPr lvl="1"/>
-            <a:r>
-              <a:rPr lang="en-US" dirty="0" err="1" smtClean="0"/>
-              <a:t>LargeRepository2TestsPart02.cs</a:t>
-            </a:r>
-            <a:endParaRPr lang="en-US" dirty="0" smtClean="0"/>
-          </a:p>
-          <a:p>
-            <a:pPr lvl="1"/>
-            <a:r>
-              <a:rPr lang="en-US" dirty="0" err="1" smtClean="0"/>
-              <a:t>LargeRepository2TestsReflection.cs</a:t>
+              <a:t>Controller2Tests.cs</a:t>
             </a:r>
             <a:endParaRPr lang="en-US" dirty="0"/>
           </a:p>
@@ -12815,7 +12939,7 @@
     </p:spTree>
     <p:extLst>
       <p:ext uri="{BB962C8B-B14F-4D97-AF65-F5344CB8AC3E}">
-        <p14:creationId xmlns:p14="http://schemas.microsoft.com/office/powerpoint/2010/main" val="182597690"/>
+        <p14:creationId xmlns:p14="http://schemas.microsoft.com/office/powerpoint/2010/main" val="1662310139"/>
       </p:ext>
     </p:extLst>
   </p:cSld>
@@ -12825,6 +12949,13 @@
   <p:transition spd="slow">
     <p:wipe dir="d"/>
   </p:transition>
+  <p:timing>
+    <p:tnLst>
+      <p:par>
+        <p:cTn id="1" dur="indefinite" restart="never" nodeType="tmRoot"/>
+      </p:par>
+    </p:tnLst>
+  </p:timing>
 </p:sld>
 </file>
 
@@ -12925,7 +13056,7 @@
       </p:grpSpPr>
       <p:sp>
         <p:nvSpPr>
-          <p:cNvPr id="4" name="Title 3"/>
+          <p:cNvPr id="2" name="Title 1"/>
           <p:cNvSpPr>
             <a:spLocks noGrp="1"/>
           </p:cNvSpPr>
@@ -12940,8 +13071,115 @@
           <a:p>
             <a:r>
               <a:rPr lang="en-US" dirty="0" smtClean="0"/>
-              <a:t>Helper Methods</a:t>
-            </a:r>
+              <a:t>Core</a:t>
+            </a:r>
+            <a:endParaRPr lang="en-US" dirty="0"/>
+          </a:p>
+        </p:txBody>
+      </p:sp>
+      <p:sp>
+        <p:nvSpPr>
+          <p:cNvPr id="3" name="Content Placeholder 2"/>
+          <p:cNvSpPr>
+            <a:spLocks noGrp="1"/>
+          </p:cNvSpPr>
+          <p:nvPr>
+            <p:ph idx="1"/>
+          </p:nvPr>
+        </p:nvSpPr>
+        <p:spPr/>
+        <p:txBody>
+          <a:bodyPr>
+            <a:normAutofit fontScale="85000" lnSpcReduction="20000"/>
+          </a:bodyPr>
+          <a:lstStyle/>
+          <a:p>
+            <a:r>
+              <a:rPr lang="en-US" dirty="0"/>
+              <a:t>Extensions</a:t>
+            </a:r>
+          </a:p>
+          <a:p>
+            <a:pPr lvl="1"/>
+            <a:r>
+              <a:rPr lang="en-US" dirty="0" err="1"/>
+              <a:t>AssertExtensions.cs</a:t>
+            </a:r>
+            <a:endParaRPr lang="en-US" dirty="0"/>
+          </a:p>
+          <a:p>
+            <a:pPr lvl="1"/>
+            <a:r>
+              <a:rPr lang="en-US" dirty="0" err="1"/>
+              <a:t>RouteTestingExtensions.cs</a:t>
+            </a:r>
+            <a:endParaRPr lang="en-US" dirty="0"/>
+          </a:p>
+          <a:p>
+            <a:pPr lvl="1"/>
+            <a:r>
+              <a:rPr lang="en-US" dirty="0" err="1"/>
+              <a:t>StringExtensions.cs</a:t>
+            </a:r>
+            <a:endParaRPr lang="en-US" dirty="0"/>
+          </a:p>
+          <a:p>
+            <a:r>
+              <a:rPr lang="en-US" dirty="0" smtClean="0"/>
+              <a:t>Helpers</a:t>
+            </a:r>
+          </a:p>
+          <a:p>
+            <a:pPr lvl="1"/>
+            <a:r>
+              <a:rPr lang="en-US" dirty="0" err="1" smtClean="0"/>
+              <a:t>AttributeAndFieldValidation.cs</a:t>
+            </a:r>
+            <a:endParaRPr lang="en-US" dirty="0" smtClean="0"/>
+          </a:p>
+          <a:p>
+            <a:pPr lvl="1"/>
+            <a:r>
+              <a:rPr lang="en-US" dirty="0" err="1" smtClean="0"/>
+              <a:t>ControllerRecordFakes.cs</a:t>
+            </a:r>
+            <a:endParaRPr lang="en-US" dirty="0" smtClean="0"/>
+          </a:p>
+          <a:p>
+            <a:pPr lvl="1"/>
+            <a:r>
+              <a:rPr lang="en-US" dirty="0" err="1" smtClean="0"/>
+              <a:t>CreateValidEntities.cs</a:t>
+            </a:r>
+            <a:endParaRPr lang="en-US" dirty="0" smtClean="0"/>
+          </a:p>
+          <a:p>
+            <a:pPr lvl="1"/>
+            <a:r>
+              <a:rPr lang="en-US" dirty="0" err="1" smtClean="0"/>
+              <a:t>NameAndType.cs</a:t>
+            </a:r>
+            <a:endParaRPr lang="en-US" dirty="0" smtClean="0"/>
+          </a:p>
+          <a:p>
+            <a:pPr lvl="1"/>
+            <a:r>
+              <a:rPr lang="en-US" dirty="0" err="1" smtClean="0"/>
+              <a:t>SpecificGuid.cs</a:t>
+            </a:r>
+            <a:endParaRPr lang="en-US" dirty="0"/>
+          </a:p>
+          <a:p>
+            <a:r>
+              <a:rPr lang="en-US" dirty="0" err="1"/>
+              <a:t>AbstractRepositoryTests.cs</a:t>
+            </a:r>
+            <a:r>
+              <a:rPr lang="en-US" dirty="0"/>
+              <a:t> (until moved to UCDArch)</a:t>
+            </a:r>
+          </a:p>
+          <a:p>
             <a:endParaRPr lang="en-US" dirty="0"/>
           </a:p>
         </p:txBody>
@@ -12949,7 +13187,7 @@
     </p:spTree>
     <p:extLst>
       <p:ext uri="{BB962C8B-B14F-4D97-AF65-F5344CB8AC3E}">
-        <p14:creationId xmlns:p14="http://schemas.microsoft.com/office/powerpoint/2010/main" val="3224635503"/>
+        <p14:creationId xmlns:p14="http://schemas.microsoft.com/office/powerpoint/2010/main" val="955249806"/>
       </p:ext>
     </p:extLst>
   </p:cSld>
@@ -12981,7 +13219,7 @@
       </p:grpSpPr>
       <p:sp>
         <p:nvSpPr>
-          <p:cNvPr id="4" name="Title 3"/>
+          <p:cNvPr id="2" name="Title 1"/>
           <p:cNvSpPr>
             <a:spLocks noGrp="1"/>
           </p:cNvSpPr>
@@ -12996,7 +13234,7 @@
           <a:p>
             <a:r>
               <a:rPr lang="en-US" dirty="0" smtClean="0"/>
-              <a:t>Helper Methods</a:t>
+              <a:t>Interface Tests</a:t>
             </a:r>
             <a:endParaRPr lang="en-US" dirty="0"/>
           </a:p>
@@ -13004,7 +13242,7 @@
       </p:sp>
       <p:sp>
         <p:nvSpPr>
-          <p:cNvPr id="5" name="Content Placeholder 4"/>
+          <p:cNvPr id="3" name="Content Placeholder 2"/>
           <p:cNvSpPr>
             <a:spLocks noGrp="1"/>
           </p:cNvSpPr>
@@ -13014,76 +13252,25 @@
         </p:nvSpPr>
         <p:spPr/>
         <p:txBody>
-          <a:bodyPr>
-            <a:normAutofit lnSpcReduction="10000"/>
-          </a:bodyPr>
+          <a:bodyPr/>
           <a:lstStyle/>
           <a:p>
             <a:r>
+              <a:rPr lang="en-US" dirty="0" smtClean="0"/>
+              <a:t>&lt;</a:t>
+            </a:r>
+            <a:r>
               <a:rPr lang="en-US" dirty="0" err="1" smtClean="0"/>
-              <a:t>UCDArch.Testing</a:t>
+              <a:t>InterfaceName</a:t>
             </a:r>
             <a:r>
               <a:rPr lang="en-US" dirty="0" smtClean="0"/>
-              <a:t>. More may be moved there</a:t>
-            </a:r>
-          </a:p>
-          <a:p>
-            <a:pPr lvl="1"/>
+              <a:t>&gt;</a:t>
+            </a:r>
             <a:r>
               <a:rPr lang="en-US" dirty="0" err="1" smtClean="0"/>
-              <a:t>ControllerRecordFakes.cs</a:t>
-            </a:r>
-            <a:endParaRPr lang="en-US" dirty="0" smtClean="0"/>
-          </a:p>
-          <a:p>
-            <a:pPr lvl="1"/>
-            <a:r>
-              <a:rPr lang="en-US" dirty="0" err="1" smtClean="0"/>
-              <a:t>FakeHttpPostedFileBase.cs</a:t>
-            </a:r>
-            <a:endParaRPr lang="en-US" dirty="0" smtClean="0"/>
-          </a:p>
-          <a:p>
-            <a:pPr lvl="1"/>
-            <a:r>
-              <a:rPr lang="en-US" dirty="0" err="1" smtClean="0"/>
-              <a:t>FakeIdentityAndFiles.cs</a:t>
-            </a:r>
-            <a:endParaRPr lang="en-US" dirty="0" smtClean="0"/>
-          </a:p>
-          <a:p>
-            <a:r>
-              <a:rPr lang="en-US" dirty="0" err="1" smtClean="0"/>
-              <a:t>AttributeAndFieldValidation.cs</a:t>
-            </a:r>
-            <a:endParaRPr lang="en-US" dirty="0" smtClean="0"/>
-          </a:p>
-          <a:p>
-            <a:r>
-              <a:rPr lang="en-US" dirty="0" err="1" smtClean="0"/>
-              <a:t>CreateValidEntities.cs</a:t>
-            </a:r>
-            <a:endParaRPr lang="en-US" dirty="0" smtClean="0"/>
-          </a:p>
-          <a:p>
-            <a:r>
-              <a:rPr lang="en-US" dirty="0" err="1" smtClean="0"/>
-              <a:t>NameAndType.cs</a:t>
-            </a:r>
-            <a:endParaRPr lang="en-US" dirty="0" smtClean="0"/>
-          </a:p>
-          <a:p>
-            <a:r>
-              <a:rPr lang="en-US" dirty="0" err="1"/>
-              <a:t>SpecificGuid.cs</a:t>
-            </a:r>
-            <a:endParaRPr lang="en-US" dirty="0"/>
-          </a:p>
-          <a:p>
-            <a:endParaRPr lang="en-US" dirty="0" smtClean="0"/>
-          </a:p>
-          <a:p>
+              <a:t>Tests.cs</a:t>
+            </a:r>
             <a:endParaRPr lang="en-US" dirty="0"/>
           </a:p>
         </p:txBody>
@@ -13091,7 +13278,7 @@
     </p:spTree>
     <p:extLst>
       <p:ext uri="{BB962C8B-B14F-4D97-AF65-F5344CB8AC3E}">
-        <p14:creationId xmlns:p14="http://schemas.microsoft.com/office/powerpoint/2010/main" val="1623181919"/>
+        <p14:creationId xmlns:p14="http://schemas.microsoft.com/office/powerpoint/2010/main" val="1550280511"/>
       </p:ext>
     </p:extLst>
   </p:cSld>
@@ -13123,7 +13310,7 @@
       </p:grpSpPr>
       <p:sp>
         <p:nvSpPr>
-          <p:cNvPr id="4" name="Title 3"/>
+          <p:cNvPr id="2" name="Title 1"/>
           <p:cNvSpPr>
             <a:spLocks noGrp="1"/>
           </p:cNvSpPr>
@@ -13137,17 +13324,49 @@
           <a:lstStyle/>
           <a:p>
             <a:r>
+              <a:rPr lang="en-US" dirty="0" err="1" smtClean="0"/>
+              <a:t>Misc</a:t>
+            </a:r>
+            <a:r>
               <a:rPr lang="en-US" dirty="0" smtClean="0"/>
-              <a:t>Resharper Templates</a:t>
+              <a:t> Tests</a:t>
             </a:r>
             <a:endParaRPr lang="en-US" dirty="0"/>
+          </a:p>
+        </p:txBody>
+      </p:sp>
+      <p:sp>
+        <p:nvSpPr>
+          <p:cNvPr id="3" name="Content Placeholder 2"/>
+          <p:cNvSpPr>
+            <a:spLocks noGrp="1"/>
+          </p:cNvSpPr>
+          <p:nvPr>
+            <p:ph idx="1"/>
+          </p:nvPr>
+        </p:nvSpPr>
+        <p:spPr/>
+        <p:txBody>
+          <a:bodyPr/>
+          <a:lstStyle/>
+          <a:p>
+            <a:r>
+              <a:rPr lang="en-US" dirty="0" smtClean="0"/>
+              <a:t>Test that Role Attributes work as expected.</a:t>
+            </a:r>
+          </a:p>
+          <a:p>
+            <a:r>
+              <a:rPr lang="en-US" dirty="0" smtClean="0"/>
+              <a:t>Other Tests that don’t really fall in other categories</a:t>
+            </a:r>
           </a:p>
         </p:txBody>
       </p:sp>
     </p:spTree>
     <p:extLst>
       <p:ext uri="{BB962C8B-B14F-4D97-AF65-F5344CB8AC3E}">
-        <p14:creationId xmlns:p14="http://schemas.microsoft.com/office/powerpoint/2010/main" val="1132565374"/>
+        <p14:creationId xmlns:p14="http://schemas.microsoft.com/office/powerpoint/2010/main" val="1230454238"/>
       </p:ext>
     </p:extLst>
   </p:cSld>
@@ -13179,7 +13398,7 @@
       </p:grpSpPr>
       <p:sp>
         <p:nvSpPr>
-          <p:cNvPr id="4" name="Title 3"/>
+          <p:cNvPr id="2" name="Title 1"/>
           <p:cNvSpPr>
             <a:spLocks noGrp="1"/>
           </p:cNvSpPr>
@@ -13193,8 +13412,8 @@
           <a:lstStyle/>
           <a:p>
             <a:r>
-              <a:rPr lang="en-US" dirty="0" smtClean="0"/>
-              <a:t>Resharper Templates</a:t>
+              <a:rPr lang="en-US" dirty="0" err="1" smtClean="0"/>
+              <a:t>RepositoryTests</a:t>
             </a:r>
             <a:endParaRPr lang="en-US" dirty="0"/>
           </a:p>
@@ -13202,7 +13421,7 @@
       </p:sp>
       <p:sp>
         <p:nvSpPr>
-          <p:cNvPr id="5" name="Content Placeholder 4"/>
+          <p:cNvPr id="3" name="Content Placeholder 2"/>
           <p:cNvSpPr>
             <a:spLocks noGrp="1"/>
           </p:cNvSpPr>
@@ -13212,33 +13431,30 @@
         </p:nvSpPr>
         <p:spPr/>
         <p:txBody>
-          <a:bodyPr>
-            <a:normAutofit/>
-          </a:bodyPr>
+          <a:bodyPr/>
           <a:lstStyle/>
           <a:p>
             <a:r>
+              <a:rPr lang="en-US" dirty="0" err="1" smtClean="0"/>
+              <a:t>SmallRepository1Tests.cs</a:t>
+            </a:r>
+            <a:endParaRPr lang="en-US" dirty="0" smtClean="0"/>
+          </a:p>
+          <a:p>
+            <a:r>
+              <a:rPr lang="en-US" dirty="0" err="1" smtClean="0"/>
+              <a:t>LargeRepository2Tests</a:t>
+            </a:r>
+            <a:r>
               <a:rPr lang="en-US" dirty="0" smtClean="0"/>
-              <a:t>Generate Files or Code, prompting values to be replaced</a:t>
-            </a:r>
-          </a:p>
-          <a:p>
-            <a:r>
-              <a:rPr lang="en-US" dirty="0" smtClean="0"/>
-              <a:t>My templates start with Jason so I can find them easily. If you use mine, feel free to rename or edit them.</a:t>
-            </a:r>
-          </a:p>
-          <a:p>
-            <a:r>
-              <a:rPr lang="en-US" dirty="0" smtClean="0"/>
-              <a:t>Two main Types of Templates</a:t>
+              <a:t> (partial Classes)</a:t>
             </a:r>
           </a:p>
           <a:p>
             <a:pPr lvl="1"/>
             <a:r>
               <a:rPr lang="en-US" dirty="0" err="1" smtClean="0"/>
-              <a:t>FileTemplates</a:t>
+              <a:t>LargeRepository2TestsInit.cs</a:t>
             </a:r>
             <a:endParaRPr lang="en-US" dirty="0" smtClean="0"/>
           </a:p>
@@ -13246,16 +13462,48 @@
             <a:pPr lvl="1"/>
             <a:r>
               <a:rPr lang="en-US" dirty="0" err="1" smtClean="0"/>
-              <a:t>LiveTemplates</a:t>
+              <a:t>LargeRepository2TestsConstructor.cs</a:t>
             </a:r>
             <a:endParaRPr lang="en-US" dirty="0" smtClean="0"/>
+          </a:p>
+          <a:p>
+            <a:pPr lvl="1"/>
+            <a:r>
+              <a:rPr lang="en-US" dirty="0" err="1" smtClean="0"/>
+              <a:t>LargeRepository2TestsFluentMapping.cs</a:t>
+            </a:r>
+            <a:endParaRPr lang="en-US" dirty="0" smtClean="0"/>
+          </a:p>
+          <a:p>
+            <a:pPr lvl="1"/>
+            <a:r>
+              <a:rPr lang="en-US" dirty="0" err="1" smtClean="0"/>
+              <a:t>LargeRepository2TestsPart01.cs</a:t>
+            </a:r>
+            <a:endParaRPr lang="en-US" dirty="0" smtClean="0"/>
+          </a:p>
+          <a:p>
+            <a:pPr lvl="1"/>
+            <a:r>
+              <a:rPr lang="en-US" dirty="0" err="1" smtClean="0"/>
+              <a:t>LargeRepository2TestsPart02.cs</a:t>
+            </a:r>
+            <a:endParaRPr lang="en-US" dirty="0" smtClean="0"/>
+          </a:p>
+          <a:p>
+            <a:pPr lvl="1"/>
+            <a:r>
+              <a:rPr lang="en-US" dirty="0" err="1" smtClean="0"/>
+              <a:t>LargeRepository2TestsReflection.cs</a:t>
+            </a:r>
+            <a:endParaRPr lang="en-US" dirty="0"/>
           </a:p>
         </p:txBody>
       </p:sp>
     </p:spTree>
     <p:extLst>
       <p:ext uri="{BB962C8B-B14F-4D97-AF65-F5344CB8AC3E}">
-        <p14:creationId xmlns:p14="http://schemas.microsoft.com/office/powerpoint/2010/main" val="3452364141"/>
+        <p14:creationId xmlns:p14="http://schemas.microsoft.com/office/powerpoint/2010/main" val="182597690"/>
       </p:ext>
     </p:extLst>
   </p:cSld>
@@ -13301,8 +13549,12 @@
           <a:lstStyle/>
           <a:p>
             <a:r>
+              <a:rPr lang="en-US" dirty="0" err="1" smtClean="0"/>
+              <a:t>ViewModel</a:t>
+            </a:r>
+            <a:r>
               <a:rPr lang="en-US" dirty="0" smtClean="0"/>
-              <a:t>File Templates</a:t>
+              <a:t> Tests</a:t>
             </a:r>
             <a:endParaRPr lang="en-US" dirty="0"/>
           </a:p>
@@ -13324,41 +13576,27 @@
           <a:lstStyle/>
           <a:p>
             <a:r>
-              <a:rPr lang="en-US" dirty="0" err="1"/>
-              <a:t>JasonControllerTest</a:t>
-            </a:r>
-            <a:endParaRPr lang="en-US" dirty="0"/>
-          </a:p>
-          <a:p>
-            <a:pPr lvl="1"/>
-            <a:r>
-              <a:rPr lang="en-US" dirty="0"/>
-              <a:t>Creates a simple file with examples for Controller tests</a:t>
-            </a:r>
-          </a:p>
-          <a:p>
-            <a:r>
-              <a:rPr lang="en-US" dirty="0" err="1"/>
-              <a:t>JasonRepositoryTest</a:t>
-            </a:r>
-            <a:endParaRPr lang="en-US" dirty="0"/>
-          </a:p>
-          <a:p>
-            <a:pPr lvl="1"/>
-            <a:r>
-              <a:rPr lang="en-US" dirty="0"/>
-              <a:t>Creates a repository test file using the Abstract base class</a:t>
-            </a:r>
-          </a:p>
-          <a:p>
-            <a:pPr lvl="1"/>
-            <a:r>
               <a:rPr lang="en-US" dirty="0" smtClean="0"/>
-              <a:t>Initializes data, does CRUD tests.</a:t>
-            </a:r>
-            <a:endParaRPr lang="en-US" dirty="0"/>
-          </a:p>
-          <a:p>
+              <a:t>I’d suggest only having </a:t>
+            </a:r>
+            <a:r>
+              <a:rPr lang="en-US" dirty="0" err="1" smtClean="0"/>
+              <a:t>ViewModel</a:t>
+            </a:r>
+            <a:r>
+              <a:rPr lang="en-US" dirty="0" smtClean="0"/>
+              <a:t> Tests if the logic is particularly convoluted.</a:t>
+            </a:r>
+          </a:p>
+          <a:p>
+            <a:r>
+              <a:rPr lang="en-US" dirty="0" smtClean="0"/>
+              <a:t>These tests can usually be integrated into the </a:t>
+            </a:r>
+            <a:r>
+              <a:rPr lang="en-US" smtClean="0"/>
+              <a:t>controller tests</a:t>
+            </a:r>
             <a:endParaRPr lang="en-US" dirty="0"/>
           </a:p>
         </p:txBody>
@@ -13366,7 +13604,7 @@
     </p:spTree>
     <p:extLst>
       <p:ext uri="{BB962C8B-B14F-4D97-AF65-F5344CB8AC3E}">
-        <p14:creationId xmlns:p14="http://schemas.microsoft.com/office/powerpoint/2010/main" val="644066771"/>
+        <p14:creationId xmlns:p14="http://schemas.microsoft.com/office/powerpoint/2010/main" val="3693561942"/>
       </p:ext>
     </p:extLst>
   </p:cSld>
@@ -13398,7 +13636,7 @@
       </p:grpSpPr>
       <p:sp>
         <p:nvSpPr>
-          <p:cNvPr id="2" name="Title 1"/>
+          <p:cNvPr id="4" name="Title 3"/>
           <p:cNvSpPr>
             <a:spLocks noGrp="1"/>
           </p:cNvSpPr>
@@ -13413,161 +13651,16 @@
           <a:p>
             <a:r>
               <a:rPr lang="en-US" dirty="0" smtClean="0"/>
-              <a:t>Live Templates</a:t>
+              <a:t>Helper Methods</a:t>
             </a:r>
             <a:endParaRPr lang="en-US" dirty="0"/>
-          </a:p>
-        </p:txBody>
-      </p:sp>
-      <p:sp>
-        <p:nvSpPr>
-          <p:cNvPr id="3" name="Content Placeholder 2"/>
-          <p:cNvSpPr>
-            <a:spLocks noGrp="1"/>
-          </p:cNvSpPr>
-          <p:nvPr>
-            <p:ph idx="1"/>
-          </p:nvPr>
-        </p:nvSpPr>
-        <p:spPr/>
-        <p:txBody>
-          <a:bodyPr>
-            <a:normAutofit fontScale="62500" lnSpcReduction="20000"/>
-          </a:bodyPr>
-          <a:lstStyle/>
-          <a:p>
-            <a:r>
-              <a:rPr lang="en-US" dirty="0" err="1" smtClean="0"/>
-              <a:t>JasonBoolTests</a:t>
-            </a:r>
-            <a:endParaRPr lang="en-US" dirty="0" smtClean="0"/>
-          </a:p>
-          <a:p>
-            <a:pPr lvl="1"/>
-            <a:r>
-              <a:rPr lang="en-US" dirty="0" smtClean="0"/>
-              <a:t>Creates two tests, code for reflection in comment</a:t>
-            </a:r>
-          </a:p>
-          <a:p>
-            <a:r>
-              <a:rPr lang="en-US" dirty="0" err="1" smtClean="0"/>
-              <a:t>JasonCheckRequire</a:t>
-            </a:r>
-            <a:endParaRPr lang="en-US" dirty="0" smtClean="0"/>
-          </a:p>
-          <a:p>
-            <a:pPr lvl="1"/>
-            <a:r>
-              <a:rPr lang="en-US" dirty="0" smtClean="0"/>
-              <a:t>Single Test with expected Exception</a:t>
-            </a:r>
-          </a:p>
-          <a:p>
-            <a:r>
-              <a:rPr lang="en-US" dirty="0" err="1" smtClean="0"/>
-              <a:t>JasonDateTests</a:t>
-            </a:r>
-            <a:endParaRPr lang="en-US" dirty="0" smtClean="0"/>
-          </a:p>
-          <a:p>
-            <a:pPr lvl="1"/>
-            <a:r>
-              <a:rPr lang="en-US" dirty="0" smtClean="0"/>
-              <a:t>Three Tests, past current, future. No </a:t>
-            </a:r>
-            <a:r>
-              <a:rPr lang="en-US" dirty="0" err="1" smtClean="0"/>
-              <a:t>Nullable</a:t>
-            </a:r>
-            <a:r>
-              <a:rPr lang="en-US" dirty="0" smtClean="0"/>
-              <a:t>. Code for Reflection</a:t>
-            </a:r>
-          </a:p>
-          <a:p>
-            <a:r>
-              <a:rPr lang="en-US" dirty="0" smtClean="0"/>
-              <a:t>Evict</a:t>
-            </a:r>
-          </a:p>
-          <a:p>
-            <a:pPr lvl="1"/>
-            <a:r>
-              <a:rPr lang="en-US" dirty="0" smtClean="0"/>
-              <a:t>Code to evict entity.</a:t>
-            </a:r>
-          </a:p>
-          <a:p>
-            <a:r>
-              <a:rPr lang="en-US" dirty="0" err="1" smtClean="0"/>
-              <a:t>JasonGetArguments</a:t>
-            </a:r>
-            <a:endParaRPr lang="en-US" dirty="0" smtClean="0"/>
-          </a:p>
-          <a:p>
-            <a:pPr lvl="1"/>
-            <a:r>
-              <a:rPr lang="en-US" dirty="0" smtClean="0"/>
-              <a:t>Code to get the arguments for Repository Entity </a:t>
-            </a:r>
-            <a:r>
-              <a:rPr lang="en-US" dirty="0" err="1" smtClean="0"/>
-              <a:t>EnsurePersistent</a:t>
-            </a:r>
-            <a:r>
-              <a:rPr lang="en-US" dirty="0" smtClean="0"/>
-              <a:t>. Needs </a:t>
-            </a:r>
-            <a:r>
-              <a:rPr lang="en-US" dirty="0" err="1" smtClean="0"/>
-              <a:t>tweeking</a:t>
-            </a:r>
-            <a:r>
-              <a:rPr lang="en-US" dirty="0" smtClean="0"/>
-              <a:t>.</a:t>
-            </a:r>
-          </a:p>
-          <a:p>
-            <a:r>
-              <a:rPr lang="en-US" dirty="0" err="1" smtClean="0"/>
-              <a:t>JasonStringTests</a:t>
-            </a:r>
-            <a:r>
-              <a:rPr lang="en-US" dirty="0"/>
-              <a:t> </a:t>
-            </a:r>
-            <a:r>
-              <a:rPr lang="en-US" dirty="0" smtClean="0"/>
-              <a:t>/ </a:t>
-            </a:r>
-            <a:r>
-              <a:rPr lang="en-US" dirty="0" err="1" smtClean="0"/>
-              <a:t>JasonStringTestsLengthOnly</a:t>
-            </a:r>
-            <a:endParaRPr lang="en-US" dirty="0" smtClean="0"/>
-          </a:p>
-          <a:p>
-            <a:pPr lvl="1"/>
-            <a:r>
-              <a:rPr lang="en-US" dirty="0" smtClean="0"/>
-              <a:t>A bunch of string tests. Needs a little </a:t>
-            </a:r>
-            <a:r>
-              <a:rPr lang="en-US" dirty="0" err="1" smtClean="0"/>
-              <a:t>tweeking</a:t>
-            </a:r>
-            <a:r>
-              <a:rPr lang="en-US" dirty="0" smtClean="0"/>
-              <a:t> sometimes. Code for Reflection</a:t>
-            </a:r>
           </a:p>
         </p:txBody>
       </p:sp>
     </p:spTree>
     <p:extLst>
       <p:ext uri="{BB962C8B-B14F-4D97-AF65-F5344CB8AC3E}">
-        <p14:creationId xmlns:p14="http://schemas.microsoft.com/office/powerpoint/2010/main" val="255104650"/>
+        <p14:creationId xmlns:p14="http://schemas.microsoft.com/office/powerpoint/2010/main" val="3224635503"/>
       </p:ext>
     </p:extLst>
   </p:cSld>
@@ -13599,15 +13692,12 @@
       </p:grpSpPr>
       <p:sp>
         <p:nvSpPr>
-          <p:cNvPr id="2" name="Title 1"/>
+          <p:cNvPr id="4" name="Title 3"/>
           <p:cNvSpPr>
             <a:spLocks noGrp="1"/>
           </p:cNvSpPr>
           <p:nvPr>
             <p:ph type="title"/>
-            <p:custDataLst>
-              <p:tags r:id="rId2"/>
-            </p:custDataLst>
           </p:nvPr>
         </p:nvSpPr>
         <p:spPr/>
@@ -13617,7 +13707,7 @@
           <a:p>
             <a:r>
               <a:rPr lang="en-US" dirty="0" smtClean="0"/>
-              <a:t>Summary</a:t>
+              <a:t>Helper Methods</a:t>
             </a:r>
             <a:endParaRPr lang="en-US" dirty="0"/>
           </a:p>
@@ -13625,15 +13715,210 @@
       </p:sp>
       <p:sp>
         <p:nvSpPr>
-          <p:cNvPr id="3" name="Content Placeholder 2"/>
+          <p:cNvPr id="5" name="Content Placeholder 4"/>
           <p:cNvSpPr>
             <a:spLocks noGrp="1"/>
           </p:cNvSpPr>
           <p:nvPr>
             <p:ph idx="1"/>
-            <p:custDataLst>
-              <p:tags r:id="rId3"/>
-            </p:custDataLst>
+          </p:nvPr>
+        </p:nvSpPr>
+        <p:spPr/>
+        <p:txBody>
+          <a:bodyPr>
+            <a:normAutofit lnSpcReduction="10000"/>
+          </a:bodyPr>
+          <a:lstStyle/>
+          <a:p>
+            <a:r>
+              <a:rPr lang="en-US" dirty="0" err="1" smtClean="0"/>
+              <a:t>UCDArch.Testing</a:t>
+            </a:r>
+            <a:r>
+              <a:rPr lang="en-US" dirty="0" smtClean="0"/>
+              <a:t>. More may be moved there</a:t>
+            </a:r>
+          </a:p>
+          <a:p>
+            <a:pPr lvl="1"/>
+            <a:r>
+              <a:rPr lang="en-US" dirty="0" err="1" smtClean="0"/>
+              <a:t>ControllerRecordFakes.cs</a:t>
+            </a:r>
+            <a:endParaRPr lang="en-US" dirty="0" smtClean="0"/>
+          </a:p>
+          <a:p>
+            <a:pPr lvl="1"/>
+            <a:r>
+              <a:rPr lang="en-US" dirty="0" err="1" smtClean="0"/>
+              <a:t>FakeHttpPostedFileBase.cs</a:t>
+            </a:r>
+            <a:endParaRPr lang="en-US" dirty="0" smtClean="0"/>
+          </a:p>
+          <a:p>
+            <a:pPr lvl="1"/>
+            <a:r>
+              <a:rPr lang="en-US" dirty="0" err="1" smtClean="0"/>
+              <a:t>FakeIdentityAndFiles.cs</a:t>
+            </a:r>
+            <a:endParaRPr lang="en-US" dirty="0" smtClean="0"/>
+          </a:p>
+          <a:p>
+            <a:r>
+              <a:rPr lang="en-US" dirty="0" err="1" smtClean="0"/>
+              <a:t>AttributeAndFieldValidation.cs</a:t>
+            </a:r>
+            <a:endParaRPr lang="en-US" dirty="0" smtClean="0"/>
+          </a:p>
+          <a:p>
+            <a:r>
+              <a:rPr lang="en-US" dirty="0" err="1" smtClean="0"/>
+              <a:t>CreateValidEntities.cs</a:t>
+            </a:r>
+            <a:endParaRPr lang="en-US" dirty="0" smtClean="0"/>
+          </a:p>
+          <a:p>
+            <a:r>
+              <a:rPr lang="en-US" dirty="0" err="1" smtClean="0"/>
+              <a:t>NameAndType.cs</a:t>
+            </a:r>
+            <a:endParaRPr lang="en-US" dirty="0" smtClean="0"/>
+          </a:p>
+          <a:p>
+            <a:r>
+              <a:rPr lang="en-US" dirty="0" err="1"/>
+              <a:t>SpecificGuid.cs</a:t>
+            </a:r>
+            <a:endParaRPr lang="en-US" dirty="0"/>
+          </a:p>
+          <a:p>
+            <a:endParaRPr lang="en-US" dirty="0" smtClean="0"/>
+          </a:p>
+          <a:p>
+            <a:endParaRPr lang="en-US" dirty="0"/>
+          </a:p>
+        </p:txBody>
+      </p:sp>
+    </p:spTree>
+    <p:extLst>
+      <p:ext uri="{BB962C8B-B14F-4D97-AF65-F5344CB8AC3E}">
+        <p14:creationId xmlns:p14="http://schemas.microsoft.com/office/powerpoint/2010/main" val="1623181919"/>
+      </p:ext>
+    </p:extLst>
+  </p:cSld>
+  <p:clrMapOvr>
+    <a:masterClrMapping/>
+  </p:clrMapOvr>
+  <p:transition spd="slow">
+    <p:wipe dir="d"/>
+  </p:transition>
+</p:sld>
+</file>
+
+<file path=ppt/slides/slide37.xml><?xml version="1.0" encoding="utf-8"?>
+<p:sld xmlns:a="http://schemas.openxmlformats.org/drawingml/2006/main" xmlns:r="http://schemas.openxmlformats.org/officeDocument/2006/relationships" xmlns:p="http://schemas.openxmlformats.org/presentationml/2006/main">
+  <p:cSld>
+    <p:spTree>
+      <p:nvGrpSpPr>
+        <p:cNvPr id="1" name=""/>
+        <p:cNvGrpSpPr/>
+        <p:nvPr/>
+      </p:nvGrpSpPr>
+      <p:grpSpPr>
+        <a:xfrm>
+          <a:off x="0" y="0"/>
+          <a:ext cx="0" cy="0"/>
+          <a:chOff x="0" y="0"/>
+          <a:chExt cx="0" cy="0"/>
+        </a:xfrm>
+      </p:grpSpPr>
+      <p:sp>
+        <p:nvSpPr>
+          <p:cNvPr id="4" name="Title 3"/>
+          <p:cNvSpPr>
+            <a:spLocks noGrp="1"/>
+          </p:cNvSpPr>
+          <p:nvPr>
+            <p:ph type="title"/>
+          </p:nvPr>
+        </p:nvSpPr>
+        <p:spPr/>
+        <p:txBody>
+          <a:bodyPr/>
+          <a:lstStyle/>
+          <a:p>
+            <a:r>
+              <a:rPr lang="en-US" dirty="0" smtClean="0"/>
+              <a:t>Resharper Templates</a:t>
+            </a:r>
+            <a:endParaRPr lang="en-US" dirty="0"/>
+          </a:p>
+        </p:txBody>
+      </p:sp>
+    </p:spTree>
+    <p:extLst>
+      <p:ext uri="{BB962C8B-B14F-4D97-AF65-F5344CB8AC3E}">
+        <p14:creationId xmlns:p14="http://schemas.microsoft.com/office/powerpoint/2010/main" val="1132565374"/>
+      </p:ext>
+    </p:extLst>
+  </p:cSld>
+  <p:clrMapOvr>
+    <a:masterClrMapping/>
+  </p:clrMapOvr>
+  <p:transition spd="slow">
+    <p:wipe dir="d"/>
+  </p:transition>
+</p:sld>
+</file>
+
+<file path=ppt/slides/slide38.xml><?xml version="1.0" encoding="utf-8"?>
+<p:sld xmlns:a="http://schemas.openxmlformats.org/drawingml/2006/main" xmlns:r="http://schemas.openxmlformats.org/officeDocument/2006/relationships" xmlns:p="http://schemas.openxmlformats.org/presentationml/2006/main">
+  <p:cSld>
+    <p:spTree>
+      <p:nvGrpSpPr>
+        <p:cNvPr id="1" name=""/>
+        <p:cNvGrpSpPr/>
+        <p:nvPr/>
+      </p:nvGrpSpPr>
+      <p:grpSpPr>
+        <a:xfrm>
+          <a:off x="0" y="0"/>
+          <a:ext cx="0" cy="0"/>
+          <a:chOff x="0" y="0"/>
+          <a:chExt cx="0" cy="0"/>
+        </a:xfrm>
+      </p:grpSpPr>
+      <p:sp>
+        <p:nvSpPr>
+          <p:cNvPr id="4" name="Title 3"/>
+          <p:cNvSpPr>
+            <a:spLocks noGrp="1"/>
+          </p:cNvSpPr>
+          <p:nvPr>
+            <p:ph type="title"/>
+          </p:nvPr>
+        </p:nvSpPr>
+        <p:spPr/>
+        <p:txBody>
+          <a:bodyPr/>
+          <a:lstStyle/>
+          <a:p>
+            <a:r>
+              <a:rPr lang="en-US" dirty="0" smtClean="0"/>
+              <a:t>Resharper Templates</a:t>
+            </a:r>
+            <a:endParaRPr lang="en-US" dirty="0"/>
+          </a:p>
+        </p:txBody>
+      </p:sp>
+      <p:sp>
+        <p:nvSpPr>
+          <p:cNvPr id="5" name="Content Placeholder 4"/>
+          <p:cNvSpPr>
+            <a:spLocks noGrp="1"/>
+          </p:cNvSpPr>
+          <p:nvPr>
+            <p:ph idx="1"/>
           </p:nvPr>
         </p:nvSpPr>
         <p:spPr/>
@@ -13645,6 +13930,581 @@
           <a:p>
             <a:r>
               <a:rPr lang="en-US" dirty="0" smtClean="0"/>
+              <a:t>Generate Files or Code, prompting values to be replaced</a:t>
+            </a:r>
+          </a:p>
+          <a:p>
+            <a:r>
+              <a:rPr lang="en-US" dirty="0" smtClean="0"/>
+              <a:t>My templates start with Jason so I can find them easily. If you use mine, feel free to rename or edit them.</a:t>
+            </a:r>
+          </a:p>
+          <a:p>
+            <a:r>
+              <a:rPr lang="en-US" dirty="0" smtClean="0"/>
+              <a:t>Two main Types of Templates</a:t>
+            </a:r>
+          </a:p>
+          <a:p>
+            <a:pPr lvl="1"/>
+            <a:r>
+              <a:rPr lang="en-US" dirty="0" err="1" smtClean="0"/>
+              <a:t>FileTemplates</a:t>
+            </a:r>
+            <a:endParaRPr lang="en-US" dirty="0" smtClean="0"/>
+          </a:p>
+          <a:p>
+            <a:pPr lvl="1"/>
+            <a:r>
+              <a:rPr lang="en-US" dirty="0" err="1" smtClean="0"/>
+              <a:t>LiveTemplates</a:t>
+            </a:r>
+            <a:endParaRPr lang="en-US" dirty="0" smtClean="0"/>
+          </a:p>
+        </p:txBody>
+      </p:sp>
+    </p:spTree>
+    <p:extLst>
+      <p:ext uri="{BB962C8B-B14F-4D97-AF65-F5344CB8AC3E}">
+        <p14:creationId xmlns:p14="http://schemas.microsoft.com/office/powerpoint/2010/main" val="3452364141"/>
+      </p:ext>
+    </p:extLst>
+  </p:cSld>
+  <p:clrMapOvr>
+    <a:masterClrMapping/>
+  </p:clrMapOvr>
+  <p:transition spd="slow">
+    <p:wipe dir="d"/>
+  </p:transition>
+</p:sld>
+</file>
+
+<file path=ppt/slides/slide39.xml><?xml version="1.0" encoding="utf-8"?>
+<p:sld xmlns:a="http://schemas.openxmlformats.org/drawingml/2006/main" xmlns:r="http://schemas.openxmlformats.org/officeDocument/2006/relationships" xmlns:p="http://schemas.openxmlformats.org/presentationml/2006/main">
+  <p:cSld>
+    <p:spTree>
+      <p:nvGrpSpPr>
+        <p:cNvPr id="1" name=""/>
+        <p:cNvGrpSpPr/>
+        <p:nvPr/>
+      </p:nvGrpSpPr>
+      <p:grpSpPr>
+        <a:xfrm>
+          <a:off x="0" y="0"/>
+          <a:ext cx="0" cy="0"/>
+          <a:chOff x="0" y="0"/>
+          <a:chExt cx="0" cy="0"/>
+        </a:xfrm>
+      </p:grpSpPr>
+      <p:sp>
+        <p:nvSpPr>
+          <p:cNvPr id="2" name="Title 1"/>
+          <p:cNvSpPr>
+            <a:spLocks noGrp="1"/>
+          </p:cNvSpPr>
+          <p:nvPr>
+            <p:ph type="title"/>
+          </p:nvPr>
+        </p:nvSpPr>
+        <p:spPr/>
+        <p:txBody>
+          <a:bodyPr/>
+          <a:lstStyle/>
+          <a:p>
+            <a:r>
+              <a:rPr lang="en-US" dirty="0" smtClean="0"/>
+              <a:t>File Templates</a:t>
+            </a:r>
+            <a:endParaRPr lang="en-US" dirty="0"/>
+          </a:p>
+        </p:txBody>
+      </p:sp>
+      <p:sp>
+        <p:nvSpPr>
+          <p:cNvPr id="3" name="Content Placeholder 2"/>
+          <p:cNvSpPr>
+            <a:spLocks noGrp="1"/>
+          </p:cNvSpPr>
+          <p:nvPr>
+            <p:ph idx="1"/>
+          </p:nvPr>
+        </p:nvSpPr>
+        <p:spPr/>
+        <p:txBody>
+          <a:bodyPr/>
+          <a:lstStyle/>
+          <a:p>
+            <a:r>
+              <a:rPr lang="en-US" dirty="0" err="1"/>
+              <a:t>JasonControllerTest</a:t>
+            </a:r>
+            <a:endParaRPr lang="en-US" dirty="0"/>
+          </a:p>
+          <a:p>
+            <a:pPr lvl="1"/>
+            <a:r>
+              <a:rPr lang="en-US" dirty="0"/>
+              <a:t>Creates a simple file with examples for Controller tests</a:t>
+            </a:r>
+          </a:p>
+          <a:p>
+            <a:r>
+              <a:rPr lang="en-US" dirty="0" err="1"/>
+              <a:t>JasonRepositoryTest</a:t>
+            </a:r>
+            <a:endParaRPr lang="en-US" dirty="0"/>
+          </a:p>
+          <a:p>
+            <a:pPr lvl="1"/>
+            <a:r>
+              <a:rPr lang="en-US" dirty="0"/>
+              <a:t>Creates a repository test file using the Abstract base class</a:t>
+            </a:r>
+          </a:p>
+          <a:p>
+            <a:pPr lvl="1"/>
+            <a:r>
+              <a:rPr lang="en-US" dirty="0" smtClean="0"/>
+              <a:t>Initializes data, does CRUD tests.</a:t>
+            </a:r>
+            <a:endParaRPr lang="en-US" dirty="0"/>
+          </a:p>
+          <a:p>
+            <a:endParaRPr lang="en-US" dirty="0"/>
+          </a:p>
+        </p:txBody>
+      </p:sp>
+    </p:spTree>
+    <p:extLst>
+      <p:ext uri="{BB962C8B-B14F-4D97-AF65-F5344CB8AC3E}">
+        <p14:creationId xmlns:p14="http://schemas.microsoft.com/office/powerpoint/2010/main" val="644066771"/>
+      </p:ext>
+    </p:extLst>
+  </p:cSld>
+  <p:clrMapOvr>
+    <a:masterClrMapping/>
+  </p:clrMapOvr>
+  <p:transition spd="slow">
+    <p:wipe dir="d"/>
+  </p:transition>
+</p:sld>
+</file>
+
+<file path=ppt/slides/slide4.xml><?xml version="1.0" encoding="utf-8"?>
+<p:sld xmlns:a="http://schemas.openxmlformats.org/drawingml/2006/main" xmlns:r="http://schemas.openxmlformats.org/officeDocument/2006/relationships" xmlns:p="http://schemas.openxmlformats.org/presentationml/2006/main">
+  <p:cSld>
+    <p:spTree>
+      <p:nvGrpSpPr>
+        <p:cNvPr id="1" name=""/>
+        <p:cNvGrpSpPr/>
+        <p:nvPr/>
+      </p:nvGrpSpPr>
+      <p:grpSpPr>
+        <a:xfrm>
+          <a:off x="0" y="0"/>
+          <a:ext cx="0" cy="0"/>
+          <a:chOff x="0" y="0"/>
+          <a:chExt cx="0" cy="0"/>
+        </a:xfrm>
+      </p:grpSpPr>
+      <p:sp>
+        <p:nvSpPr>
+          <p:cNvPr id="4" name="Title 3"/>
+          <p:cNvSpPr>
+            <a:spLocks noGrp="1"/>
+          </p:cNvSpPr>
+          <p:nvPr>
+            <p:ph type="title"/>
+          </p:nvPr>
+        </p:nvSpPr>
+        <p:spPr/>
+        <p:txBody>
+          <a:bodyPr/>
+          <a:lstStyle/>
+          <a:p>
+            <a:r>
+              <a:rPr lang="en-US" dirty="0" smtClean="0"/>
+              <a:t>Structure Of Unit Tests</a:t>
+            </a:r>
+            <a:endParaRPr lang="en-US" dirty="0"/>
+          </a:p>
+        </p:txBody>
+      </p:sp>
+      <p:sp>
+        <p:nvSpPr>
+          <p:cNvPr id="5" name="Content Placeholder 4"/>
+          <p:cNvSpPr>
+            <a:spLocks noGrp="1"/>
+          </p:cNvSpPr>
+          <p:nvPr>
+            <p:ph idx="1"/>
+          </p:nvPr>
+        </p:nvSpPr>
+        <p:spPr/>
+        <p:txBody>
+          <a:bodyPr>
+            <a:normAutofit fontScale="85000" lnSpcReduction="10000"/>
+          </a:bodyPr>
+          <a:lstStyle/>
+          <a:p>
+            <a:r>
+              <a:rPr lang="en-US" dirty="0" smtClean="0"/>
+              <a:t>Arrange</a:t>
+            </a:r>
+          </a:p>
+          <a:p>
+            <a:pPr lvl="1"/>
+            <a:r>
+              <a:rPr lang="en-US" dirty="0" smtClean="0"/>
+              <a:t>Setup data specific to that test</a:t>
+            </a:r>
+          </a:p>
+          <a:p>
+            <a:pPr lvl="1"/>
+            <a:r>
+              <a:rPr lang="en-US" dirty="0" smtClean="0"/>
+              <a:t>Call Methods to setup common values</a:t>
+            </a:r>
+          </a:p>
+          <a:p>
+            <a:pPr lvl="1"/>
+            <a:r>
+              <a:rPr lang="en-US" dirty="0" smtClean="0"/>
+              <a:t>Mock and Fake </a:t>
+            </a:r>
+          </a:p>
+          <a:p>
+            <a:r>
+              <a:rPr lang="en-US" dirty="0" smtClean="0"/>
+              <a:t>Act</a:t>
+            </a:r>
+          </a:p>
+          <a:p>
+            <a:r>
+              <a:rPr lang="en-US" dirty="0" smtClean="0"/>
+              <a:t>Assert</a:t>
+            </a:r>
+          </a:p>
+          <a:p>
+            <a:pPr lvl="1"/>
+            <a:r>
+              <a:rPr lang="en-US" dirty="0" smtClean="0"/>
+              <a:t>Check for expected values</a:t>
+            </a:r>
+          </a:p>
+          <a:p>
+            <a:pPr lvl="1"/>
+            <a:r>
+              <a:rPr lang="en-US" dirty="0" smtClean="0"/>
+              <a:t>Check that specific mocked methods were called</a:t>
+            </a:r>
+          </a:p>
+          <a:p>
+            <a:pPr lvl="1"/>
+            <a:r>
+              <a:rPr lang="en-US" dirty="0" smtClean="0"/>
+              <a:t>Get and check parameters passed to mocked methods</a:t>
+            </a:r>
+          </a:p>
+          <a:p>
+            <a:pPr lvl="1"/>
+            <a:r>
+              <a:rPr lang="en-US" dirty="0" smtClean="0"/>
+              <a:t>Inconclusive check. Fails locally, but not on the builder.</a:t>
+            </a:r>
+            <a:endParaRPr lang="en-US" dirty="0"/>
+          </a:p>
+        </p:txBody>
+      </p:sp>
+    </p:spTree>
+    <p:extLst>
+      <p:ext uri="{BB962C8B-B14F-4D97-AF65-F5344CB8AC3E}">
+        <p14:creationId xmlns:p14="http://schemas.microsoft.com/office/powerpoint/2010/main" val="2357266288"/>
+      </p:ext>
+    </p:extLst>
+  </p:cSld>
+  <p:clrMapOvr>
+    <a:masterClrMapping/>
+  </p:clrMapOvr>
+  <p:transition spd="slow">
+    <p:wipe dir="d"/>
+  </p:transition>
+  <p:timing>
+    <p:tnLst>
+      <p:par>
+        <p:cTn id="1" dur="indefinite" restart="never" nodeType="tmRoot"/>
+      </p:par>
+    </p:tnLst>
+  </p:timing>
+</p:sld>
+</file>
+
+<file path=ppt/slides/slide40.xml><?xml version="1.0" encoding="utf-8"?>
+<p:sld xmlns:a="http://schemas.openxmlformats.org/drawingml/2006/main" xmlns:r="http://schemas.openxmlformats.org/officeDocument/2006/relationships" xmlns:p="http://schemas.openxmlformats.org/presentationml/2006/main">
+  <p:cSld>
+    <p:spTree>
+      <p:nvGrpSpPr>
+        <p:cNvPr id="1" name=""/>
+        <p:cNvGrpSpPr/>
+        <p:nvPr/>
+      </p:nvGrpSpPr>
+      <p:grpSpPr>
+        <a:xfrm>
+          <a:off x="0" y="0"/>
+          <a:ext cx="0" cy="0"/>
+          <a:chOff x="0" y="0"/>
+          <a:chExt cx="0" cy="0"/>
+        </a:xfrm>
+      </p:grpSpPr>
+      <p:sp>
+        <p:nvSpPr>
+          <p:cNvPr id="2" name="Title 1"/>
+          <p:cNvSpPr>
+            <a:spLocks noGrp="1"/>
+          </p:cNvSpPr>
+          <p:nvPr>
+            <p:ph type="title"/>
+          </p:nvPr>
+        </p:nvSpPr>
+        <p:spPr/>
+        <p:txBody>
+          <a:bodyPr/>
+          <a:lstStyle/>
+          <a:p>
+            <a:r>
+              <a:rPr lang="en-US" dirty="0" smtClean="0"/>
+              <a:t>Live Templates</a:t>
+            </a:r>
+            <a:endParaRPr lang="en-US" dirty="0"/>
+          </a:p>
+        </p:txBody>
+      </p:sp>
+      <p:sp>
+        <p:nvSpPr>
+          <p:cNvPr id="3" name="Content Placeholder 2"/>
+          <p:cNvSpPr>
+            <a:spLocks noGrp="1"/>
+          </p:cNvSpPr>
+          <p:nvPr>
+            <p:ph idx="1"/>
+          </p:nvPr>
+        </p:nvSpPr>
+        <p:spPr/>
+        <p:txBody>
+          <a:bodyPr>
+            <a:normAutofit fontScale="62500" lnSpcReduction="20000"/>
+          </a:bodyPr>
+          <a:lstStyle/>
+          <a:p>
+            <a:r>
+              <a:rPr lang="en-US" dirty="0" err="1" smtClean="0"/>
+              <a:t>JasonBoolTests</a:t>
+            </a:r>
+            <a:endParaRPr lang="en-US" dirty="0" smtClean="0"/>
+          </a:p>
+          <a:p>
+            <a:pPr lvl="1"/>
+            <a:r>
+              <a:rPr lang="en-US" dirty="0" smtClean="0"/>
+              <a:t>Creates two tests, code for reflection in comment</a:t>
+            </a:r>
+          </a:p>
+          <a:p>
+            <a:r>
+              <a:rPr lang="en-US" dirty="0" err="1" smtClean="0"/>
+              <a:t>JasonCheckRequire</a:t>
+            </a:r>
+            <a:endParaRPr lang="en-US" dirty="0" smtClean="0"/>
+          </a:p>
+          <a:p>
+            <a:pPr lvl="1"/>
+            <a:r>
+              <a:rPr lang="en-US" dirty="0" smtClean="0"/>
+              <a:t>Single Test with expected Exception</a:t>
+            </a:r>
+          </a:p>
+          <a:p>
+            <a:r>
+              <a:rPr lang="en-US" dirty="0" err="1" smtClean="0"/>
+              <a:t>JasonDateTests</a:t>
+            </a:r>
+            <a:endParaRPr lang="en-US" dirty="0" smtClean="0"/>
+          </a:p>
+          <a:p>
+            <a:pPr lvl="1"/>
+            <a:r>
+              <a:rPr lang="en-US" dirty="0" smtClean="0"/>
+              <a:t>Three Tests, past current, future. No </a:t>
+            </a:r>
+            <a:r>
+              <a:rPr lang="en-US" dirty="0" err="1" smtClean="0"/>
+              <a:t>Nullable</a:t>
+            </a:r>
+            <a:r>
+              <a:rPr lang="en-US" dirty="0" smtClean="0"/>
+              <a:t>. Code for Reflection</a:t>
+            </a:r>
+          </a:p>
+          <a:p>
+            <a:r>
+              <a:rPr lang="en-US" dirty="0" smtClean="0"/>
+              <a:t>Evict</a:t>
+            </a:r>
+          </a:p>
+          <a:p>
+            <a:pPr lvl="1"/>
+            <a:r>
+              <a:rPr lang="en-US" dirty="0" smtClean="0"/>
+              <a:t>Code to evict entity.</a:t>
+            </a:r>
+          </a:p>
+          <a:p>
+            <a:r>
+              <a:rPr lang="en-US" dirty="0" err="1" smtClean="0"/>
+              <a:t>JasonGetArguments</a:t>
+            </a:r>
+            <a:endParaRPr lang="en-US" dirty="0" smtClean="0"/>
+          </a:p>
+          <a:p>
+            <a:pPr lvl="1"/>
+            <a:r>
+              <a:rPr lang="en-US" dirty="0" smtClean="0"/>
+              <a:t>Code to get the arguments for Repository Entity </a:t>
+            </a:r>
+            <a:r>
+              <a:rPr lang="en-US" dirty="0" err="1" smtClean="0"/>
+              <a:t>EnsurePersistent</a:t>
+            </a:r>
+            <a:r>
+              <a:rPr lang="en-US" dirty="0" smtClean="0"/>
+              <a:t>. Needs </a:t>
+            </a:r>
+            <a:r>
+              <a:rPr lang="en-US" dirty="0" err="1" smtClean="0"/>
+              <a:t>tweeking</a:t>
+            </a:r>
+            <a:r>
+              <a:rPr lang="en-US" dirty="0" smtClean="0"/>
+              <a:t>.</a:t>
+            </a:r>
+          </a:p>
+          <a:p>
+            <a:r>
+              <a:rPr lang="en-US" dirty="0" err="1" smtClean="0"/>
+              <a:t>JasonStringTests</a:t>
+            </a:r>
+            <a:r>
+              <a:rPr lang="en-US" dirty="0"/>
+              <a:t> </a:t>
+            </a:r>
+            <a:r>
+              <a:rPr lang="en-US" dirty="0" smtClean="0"/>
+              <a:t>/ </a:t>
+            </a:r>
+            <a:r>
+              <a:rPr lang="en-US" dirty="0" err="1" smtClean="0"/>
+              <a:t>JasonStringTestsLengthOnly</a:t>
+            </a:r>
+            <a:endParaRPr lang="en-US" dirty="0" smtClean="0"/>
+          </a:p>
+          <a:p>
+            <a:pPr lvl="1"/>
+            <a:r>
+              <a:rPr lang="en-US" dirty="0" smtClean="0"/>
+              <a:t>A bunch of string tests. Needs a little </a:t>
+            </a:r>
+            <a:r>
+              <a:rPr lang="en-US" dirty="0" err="1" smtClean="0"/>
+              <a:t>tweeking</a:t>
+            </a:r>
+            <a:r>
+              <a:rPr lang="en-US" dirty="0" smtClean="0"/>
+              <a:t> sometimes. Code for Reflection</a:t>
+            </a:r>
+          </a:p>
+        </p:txBody>
+      </p:sp>
+    </p:spTree>
+    <p:extLst>
+      <p:ext uri="{BB962C8B-B14F-4D97-AF65-F5344CB8AC3E}">
+        <p14:creationId xmlns:p14="http://schemas.microsoft.com/office/powerpoint/2010/main" val="255104650"/>
+      </p:ext>
+    </p:extLst>
+  </p:cSld>
+  <p:clrMapOvr>
+    <a:masterClrMapping/>
+  </p:clrMapOvr>
+  <p:transition spd="slow">
+    <p:wipe dir="d"/>
+  </p:transition>
+</p:sld>
+</file>
+
+<file path=ppt/slides/slide41.xml><?xml version="1.0" encoding="utf-8"?>
+<p:sld xmlns:a="http://schemas.openxmlformats.org/drawingml/2006/main" xmlns:r="http://schemas.openxmlformats.org/officeDocument/2006/relationships" xmlns:p="http://schemas.openxmlformats.org/presentationml/2006/main">
+  <p:cSld>
+    <p:spTree>
+      <p:nvGrpSpPr>
+        <p:cNvPr id="1" name=""/>
+        <p:cNvGrpSpPr/>
+        <p:nvPr/>
+      </p:nvGrpSpPr>
+      <p:grpSpPr>
+        <a:xfrm>
+          <a:off x="0" y="0"/>
+          <a:ext cx="0" cy="0"/>
+          <a:chOff x="0" y="0"/>
+          <a:chExt cx="0" cy="0"/>
+        </a:xfrm>
+      </p:grpSpPr>
+      <p:sp>
+        <p:nvSpPr>
+          <p:cNvPr id="2" name="Title 1"/>
+          <p:cNvSpPr>
+            <a:spLocks noGrp="1"/>
+          </p:cNvSpPr>
+          <p:nvPr>
+            <p:ph type="title"/>
+            <p:custDataLst>
+              <p:tags r:id="rId2"/>
+            </p:custDataLst>
+          </p:nvPr>
+        </p:nvSpPr>
+        <p:spPr/>
+        <p:txBody>
+          <a:bodyPr/>
+          <a:lstStyle/>
+          <a:p>
+            <a:r>
+              <a:rPr lang="en-US" dirty="0" smtClean="0"/>
+              <a:t>Summary</a:t>
+            </a:r>
+            <a:endParaRPr lang="en-US" dirty="0"/>
+          </a:p>
+        </p:txBody>
+      </p:sp>
+      <p:sp>
+        <p:nvSpPr>
+          <p:cNvPr id="3" name="Content Placeholder 2"/>
+          <p:cNvSpPr>
+            <a:spLocks noGrp="1"/>
+          </p:cNvSpPr>
+          <p:nvPr>
+            <p:ph idx="1"/>
+            <p:custDataLst>
+              <p:tags r:id="rId3"/>
+            </p:custDataLst>
+          </p:nvPr>
+        </p:nvSpPr>
+        <p:spPr/>
+        <p:txBody>
+          <a:bodyPr>
+            <a:normAutofit/>
+          </a:bodyPr>
+          <a:lstStyle/>
+          <a:p>
+            <a:r>
+              <a:rPr lang="en-US" dirty="0" smtClean="0"/>
               <a:t>This is the basic structure for Unit Tests that I have been using.</a:t>
             </a:r>
           </a:p>
@@ -13659,7 +14519,6 @@
               <a:rPr lang="en-US" dirty="0" smtClean="0"/>
               <a:t>If you come up with other ways to get better coverage, less fragile tests, or other improvements please share.</a:t>
             </a:r>
-            <a:endParaRPr lang="en-US" dirty="0" smtClean="0"/>
           </a:p>
         </p:txBody>
       </p:sp>
@@ -14058,7 +14917,7 @@
 </p:sld>
 </file>
 
-<file path=ppt/slides/slide37.xml><?xml version="1.0" encoding="utf-8"?>
+<file path=ppt/slides/slide42.xml><?xml version="1.0" encoding="utf-8"?>
 <p:sld xmlns:a="http://schemas.openxmlformats.org/drawingml/2006/main" xmlns:r="http://schemas.openxmlformats.org/officeDocument/2006/relationships" xmlns:p="http://schemas.openxmlformats.org/presentationml/2006/main">
   <p:cSld>
     <p:spTree>
@@ -14199,7 +15058,7 @@
 </p:sld>
 </file>
 
-<file path=ppt/slides/slide38.xml><?xml version="1.0" encoding="utf-8"?>
+<file path=ppt/slides/slide43.xml><?xml version="1.0" encoding="utf-8"?>
 <p:sld xmlns:a="http://schemas.openxmlformats.org/drawingml/2006/main" xmlns:r="http://schemas.openxmlformats.org/officeDocument/2006/relationships" xmlns:p="http://schemas.openxmlformats.org/presentationml/2006/main">
   <p:cSld>
     <p:spTree>
@@ -14264,148 +15123,6 @@
       </p:par>
     </p:tnLst>
   </p:timing>
-</p:sld>
-</file>
-
-<file path=ppt/slides/slide4.xml><?xml version="1.0" encoding="utf-8"?>
-<p:sld xmlns:a="http://schemas.openxmlformats.org/drawingml/2006/main" xmlns:r="http://schemas.openxmlformats.org/officeDocument/2006/relationships" xmlns:p="http://schemas.openxmlformats.org/presentationml/2006/main">
-  <p:cSld>
-    <p:spTree>
-      <p:nvGrpSpPr>
-        <p:cNvPr id="1" name=""/>
-        <p:cNvGrpSpPr/>
-        <p:nvPr/>
-      </p:nvGrpSpPr>
-      <p:grpSpPr>
-        <a:xfrm>
-          <a:off x="0" y="0"/>
-          <a:ext cx="0" cy="0"/>
-          <a:chOff x="0" y="0"/>
-          <a:chExt cx="0" cy="0"/>
-        </a:xfrm>
-      </p:grpSpPr>
-      <p:sp>
-        <p:nvSpPr>
-          <p:cNvPr id="4" name="Title 3"/>
-          <p:cNvSpPr>
-            <a:spLocks noGrp="1"/>
-          </p:cNvSpPr>
-          <p:nvPr>
-            <p:ph type="title"/>
-          </p:nvPr>
-        </p:nvSpPr>
-        <p:spPr/>
-        <p:txBody>
-          <a:bodyPr/>
-          <a:lstStyle/>
-          <a:p>
-            <a:r>
-              <a:rPr lang="en-US" dirty="0" smtClean="0"/>
-              <a:t>Structure Of Unit Tests</a:t>
-            </a:r>
-            <a:endParaRPr lang="en-US" dirty="0"/>
-          </a:p>
-        </p:txBody>
-      </p:sp>
-      <p:sp>
-        <p:nvSpPr>
-          <p:cNvPr id="5" name="Content Placeholder 4"/>
-          <p:cNvSpPr>
-            <a:spLocks noGrp="1"/>
-          </p:cNvSpPr>
-          <p:nvPr>
-            <p:ph idx="1"/>
-          </p:nvPr>
-        </p:nvSpPr>
-        <p:spPr/>
-        <p:txBody>
-          <a:bodyPr>
-            <a:normAutofit fontScale="85000" lnSpcReduction="10000"/>
-          </a:bodyPr>
-          <a:lstStyle/>
-          <a:p>
-            <a:r>
-              <a:rPr lang="en-US" dirty="0" smtClean="0"/>
-              <a:t>Arrange</a:t>
-            </a:r>
-          </a:p>
-          <a:p>
-            <a:pPr lvl="1"/>
-            <a:r>
-              <a:rPr lang="en-US" dirty="0" smtClean="0"/>
-              <a:t>Setup data specific to that test</a:t>
-            </a:r>
-          </a:p>
-          <a:p>
-            <a:pPr lvl="1"/>
-            <a:r>
-              <a:rPr lang="en-US" dirty="0" smtClean="0"/>
-              <a:t>Call Methods to setup common values</a:t>
-            </a:r>
-          </a:p>
-          <a:p>
-            <a:pPr lvl="1"/>
-            <a:r>
-              <a:rPr lang="en-US" dirty="0" smtClean="0"/>
-              <a:t>Mock and Fake </a:t>
-            </a:r>
-          </a:p>
-          <a:p>
-            <a:r>
-              <a:rPr lang="en-US" dirty="0" smtClean="0"/>
-              <a:t>Act</a:t>
-            </a:r>
-          </a:p>
-          <a:p>
-            <a:r>
-              <a:rPr lang="en-US" dirty="0" smtClean="0"/>
-              <a:t>Assert</a:t>
-            </a:r>
-          </a:p>
-          <a:p>
-            <a:pPr lvl="1"/>
-            <a:r>
-              <a:rPr lang="en-US" dirty="0" smtClean="0"/>
-              <a:t>Check for expected values</a:t>
-            </a:r>
-          </a:p>
-          <a:p>
-            <a:pPr lvl="1"/>
-            <a:r>
-              <a:rPr lang="en-US" dirty="0" smtClean="0"/>
-              <a:t>Check that specific mocked methods were called</a:t>
-            </a:r>
-          </a:p>
-          <a:p>
-            <a:pPr lvl="1"/>
-            <a:r>
-              <a:rPr lang="en-US" dirty="0" smtClean="0"/>
-              <a:t>Get and check parameters passed to mocked methods</a:t>
-            </a:r>
-          </a:p>
-          <a:p>
-            <a:pPr lvl="1"/>
-            <a:r>
-              <a:rPr lang="en-US" dirty="0" smtClean="0"/>
-              <a:t>Inconclusive check. Fails locally, but not on the builder.</a:t>
-            </a:r>
-            <a:endParaRPr lang="en-US" dirty="0"/>
-          </a:p>
-        </p:txBody>
-      </p:sp>
-    </p:spTree>
-    <p:extLst>
-      <p:ext uri="{BB962C8B-B14F-4D97-AF65-F5344CB8AC3E}">
-        <p14:creationId xmlns:p14="http://schemas.microsoft.com/office/powerpoint/2010/main" val="2357266288"/>
-      </p:ext>
-    </p:extLst>
-  </p:cSld>
-  <p:clrMapOvr>
-    <a:masterClrMapping/>
-  </p:clrMapOvr>
-  <p:transition spd="slow">
-    <p:wipe dir="d"/>
-  </p:transition>
 </p:sld>
 </file>
 
@@ -14526,6 +15243,13 @@
   <p:transition spd="slow">
     <p:wipe dir="d"/>
   </p:transition>
+  <p:timing>
+    <p:tnLst>
+      <p:par>
+        <p:cTn id="1" dur="indefinite" restart="never" nodeType="tmRoot"/>
+      </p:par>
+    </p:tnLst>
+  </p:timing>
 </p:sld>
 </file>
 
@@ -14646,6 +15370,13 @@
   <p:transition spd="slow">
     <p:wipe dir="d"/>
   </p:transition>
+  <p:timing>
+    <p:tnLst>
+      <p:par>
+        <p:cTn id="1" dur="indefinite" restart="never" nodeType="tmRoot"/>
+      </p:par>
+    </p:tnLst>
+  </p:timing>
 </p:sld>
 </file>
 
@@ -14766,6 +15497,13 @@
   <p:transition spd="slow">
     <p:wipe dir="d"/>
   </p:transition>
+  <p:timing>
+    <p:tnLst>
+      <p:par>
+        <p:cTn id="1" dur="indefinite" restart="never" nodeType="tmRoot"/>
+      </p:par>
+    </p:tnLst>
+  </p:timing>
 </p:sld>
 </file>
 
@@ -14822,6 +15560,13 @@
   <p:transition spd="slow">
     <p:wipe dir="d"/>
   </p:transition>
+  <p:timing>
+    <p:tnLst>
+      <p:par>
+        <p:cTn id="1" dur="indefinite" restart="never" nodeType="tmRoot"/>
+      </p:par>
+    </p:tnLst>
+  </p:timing>
 </p:sld>
 </file>
 
@@ -14913,6 +15658,13 @@
   <p:transition spd="slow">
     <p:wipe dir="d"/>
   </p:transition>
+  <p:timing>
+    <p:tnLst>
+      <p:par>
+        <p:cTn id="1" dur="indefinite" restart="never" nodeType="tmRoot"/>
+      </p:par>
+    </p:tnLst>
+  </p:timing>
 </p:sld>
 </file>
 

</xml_diff>

<commit_message>
Added some notes to the PPP
</commit_message>
<xml_diff>
--- a/How To Write Unit Tests.pptx
+++ b/How To Write Unit Tests.pptx
@@ -2039,7 +2039,7 @@
           <a:schemeClr val="accent3">
             <a:tint val="40000"/>
             <a:alpha val="90000"/>
-            <a:hueOff val="2679213"/>
+            <a:hueOff val="2679212"/>
             <a:satOff val="-3448"/>
             <a:lumOff val="-269"/>
             <a:alphaOff val="0"/>
@@ -2050,7 +2050,7 @@
             <a:schemeClr val="accent3">
               <a:tint val="40000"/>
               <a:alpha val="90000"/>
-              <a:hueOff val="2679213"/>
+              <a:hueOff val="2679212"/>
               <a:satOff val="-3448"/>
               <a:lumOff val="-269"/>
               <a:alphaOff val="0"/>
@@ -2246,7 +2246,7 @@
           <a:schemeClr val="accent3">
             <a:tint val="40000"/>
             <a:alpha val="90000"/>
-            <a:hueOff val="5358427"/>
+            <a:hueOff val="5358425"/>
             <a:satOff val="-6896"/>
             <a:lumOff val="-537"/>
             <a:alphaOff val="0"/>
@@ -2257,7 +2257,7 @@
             <a:schemeClr val="accent3">
               <a:tint val="40000"/>
               <a:alpha val="90000"/>
-              <a:hueOff val="5358427"/>
+              <a:hueOff val="5358425"/>
               <a:satOff val="-6896"/>
               <a:lumOff val="-537"/>
               <a:alphaOff val="0"/>
@@ -2465,7 +2465,7 @@
           <a:schemeClr val="accent3">
             <a:tint val="40000"/>
             <a:alpha val="90000"/>
-            <a:hueOff val="8037640"/>
+            <a:hueOff val="8037638"/>
             <a:satOff val="-10345"/>
             <a:lumOff val="-806"/>
             <a:alphaOff val="0"/>
@@ -2476,7 +2476,7 @@
             <a:schemeClr val="accent3">
               <a:tint val="40000"/>
               <a:alpha val="90000"/>
-              <a:hueOff val="8037640"/>
+              <a:hueOff val="8037638"/>
               <a:satOff val="-10345"/>
               <a:lumOff val="-806"/>
               <a:alphaOff val="0"/>
@@ -2672,7 +2672,7 @@
           <a:schemeClr val="accent3">
             <a:tint val="40000"/>
             <a:alpha val="90000"/>
-            <a:hueOff val="10716854"/>
+            <a:hueOff val="10716850"/>
             <a:satOff val="-13793"/>
             <a:lumOff val="-1075"/>
             <a:alphaOff val="0"/>
@@ -2683,7 +2683,7 @@
             <a:schemeClr val="accent3">
               <a:tint val="40000"/>
               <a:alpha val="90000"/>
-              <a:hueOff val="10716854"/>
+              <a:hueOff val="10716850"/>
               <a:satOff val="-13793"/>
               <a:lumOff val="-1075"/>
               <a:alphaOff val="0"/>
@@ -4232,7 +4232,7 @@
             <a:fld id="{D83FDC75-7F73-4A4A-A77C-09AADF00E0EA}" type="datetimeFigureOut">
               <a:rPr lang="en-US" smtClean="0"/>
               <a:pPr/>
-              <a:t>4/12/2011</a:t>
+              <a:t>4/13/2011</a:t>
             </a:fld>
             <a:endParaRPr lang="en-US" dirty="0"/>
           </a:p>
@@ -4399,7 +4399,7 @@
             <a:fld id="{48AEF76B-3757-4A0B-AF93-28494465C1DD}" type="datetimeFigureOut">
               <a:rPr lang="en-US" smtClean="0"/>
               <a:pPr/>
-              <a:t>4/12/2011</a:t>
+              <a:t>4/13/2011</a:t>
             </a:fld>
             <a:endParaRPr lang="en-US" dirty="0"/>
           </a:p>
@@ -4917,6 +4917,1248 @@
 </p:notes>
 </file>
 
+<file path=ppt/notesSlides/notesSlide10.xml><?xml version="1.0" encoding="utf-8"?>
+<p:notes xmlns:a="http://schemas.openxmlformats.org/drawingml/2006/main" xmlns:r="http://schemas.openxmlformats.org/officeDocument/2006/relationships" xmlns:p="http://schemas.openxmlformats.org/presentationml/2006/main">
+  <p:cSld>
+    <p:spTree>
+      <p:nvGrpSpPr>
+        <p:cNvPr id="1" name=""/>
+        <p:cNvGrpSpPr/>
+        <p:nvPr/>
+      </p:nvGrpSpPr>
+      <p:grpSpPr>
+        <a:xfrm>
+          <a:off x="0" y="0"/>
+          <a:ext cx="0" cy="0"/>
+          <a:chOff x="0" y="0"/>
+          <a:chExt cx="0" cy="0"/>
+        </a:xfrm>
+      </p:grpSpPr>
+      <p:sp>
+        <p:nvSpPr>
+          <p:cNvPr id="2" name="Slide Image Placeholder 1"/>
+          <p:cNvSpPr>
+            <a:spLocks noGrp="1" noRot="1" noChangeAspect="1"/>
+          </p:cNvSpPr>
+          <p:nvPr>
+            <p:ph type="sldImg"/>
+          </p:nvPr>
+        </p:nvSpPr>
+        <p:spPr/>
+      </p:sp>
+      <p:sp>
+        <p:nvSpPr>
+          <p:cNvPr id="3" name="Notes Placeholder 2"/>
+          <p:cNvSpPr>
+            <a:spLocks noGrp="1"/>
+          </p:cNvSpPr>
+          <p:nvPr>
+            <p:ph type="body" idx="1"/>
+          </p:nvPr>
+        </p:nvSpPr>
+        <p:spPr/>
+        <p:txBody>
+          <a:bodyPr/>
+          <a:lstStyle/>
+          <a:p>
+            <a:r>
+              <a:rPr lang="en-US" dirty="0" smtClean="0"/>
+              <a:t>The mapping file can indicate if a table is read only, or not mutable. These can be checked</a:t>
+            </a:r>
+            <a:r>
+              <a:rPr lang="en-US" baseline="0" dirty="0" smtClean="0"/>
+              <a:t> with the CRUD tests.</a:t>
+            </a:r>
+          </a:p>
+          <a:p>
+            <a:r>
+              <a:rPr lang="en-US" baseline="0" dirty="0" smtClean="0"/>
+              <a:t>If you use my base class and it fails this is usually because there is a related record that needs to be set in the </a:t>
+            </a:r>
+            <a:r>
+              <a:rPr lang="en-US" baseline="0" dirty="0" err="1" smtClean="0"/>
+              <a:t>GetValid</a:t>
+            </a:r>
+            <a:r>
+              <a:rPr lang="en-US" baseline="0" dirty="0" smtClean="0"/>
+              <a:t> method.</a:t>
+            </a:r>
+          </a:p>
+          <a:p>
+            <a:r>
+              <a:rPr lang="en-US" baseline="0" dirty="0" smtClean="0"/>
+              <a:t>Invalid Boundary tests are all the flavors, one over the max, one under the minimum, spaces only, etc.</a:t>
+            </a:r>
+            <a:endParaRPr lang="en-US" dirty="0"/>
+          </a:p>
+        </p:txBody>
+      </p:sp>
+      <p:sp>
+        <p:nvSpPr>
+          <p:cNvPr id="4" name="Slide Number Placeholder 3"/>
+          <p:cNvSpPr>
+            <a:spLocks noGrp="1"/>
+          </p:cNvSpPr>
+          <p:nvPr>
+            <p:ph type="sldNum" sz="quarter" idx="10"/>
+          </p:nvPr>
+        </p:nvSpPr>
+        <p:spPr/>
+        <p:txBody>
+          <a:bodyPr/>
+          <a:lstStyle/>
+          <a:p>
+            <a:fld id="{75693FD4-8F83-4EF7-AC3F-0DC0388986B0}" type="slidenum">
+              <a:rPr lang="en-US" smtClean="0"/>
+              <a:pPr/>
+              <a:t>11</a:t>
+            </a:fld>
+            <a:endParaRPr lang="en-US" dirty="0"/>
+          </a:p>
+        </p:txBody>
+      </p:sp>
+    </p:spTree>
+    <p:extLst>
+      <p:ext uri="{BB962C8B-B14F-4D97-AF65-F5344CB8AC3E}">
+        <p14:creationId xmlns:p14="http://schemas.microsoft.com/office/powerpoint/2010/main" val="2257538058"/>
+      </p:ext>
+    </p:extLst>
+  </p:cSld>
+  <p:clrMapOvr>
+    <a:masterClrMapping/>
+  </p:clrMapOvr>
+</p:notes>
+</file>
+
+<file path=ppt/notesSlides/notesSlide11.xml><?xml version="1.0" encoding="utf-8"?>
+<p:notes xmlns:a="http://schemas.openxmlformats.org/drawingml/2006/main" xmlns:r="http://schemas.openxmlformats.org/officeDocument/2006/relationships" xmlns:p="http://schemas.openxmlformats.org/presentationml/2006/main">
+  <p:cSld>
+    <p:spTree>
+      <p:nvGrpSpPr>
+        <p:cNvPr id="1" name=""/>
+        <p:cNvGrpSpPr/>
+        <p:nvPr/>
+      </p:nvGrpSpPr>
+      <p:grpSpPr>
+        <a:xfrm>
+          <a:off x="0" y="0"/>
+          <a:ext cx="0" cy="0"/>
+          <a:chOff x="0" y="0"/>
+          <a:chExt cx="0" cy="0"/>
+        </a:xfrm>
+      </p:grpSpPr>
+      <p:sp>
+        <p:nvSpPr>
+          <p:cNvPr id="2" name="Slide Image Placeholder 1"/>
+          <p:cNvSpPr>
+            <a:spLocks noGrp="1" noRot="1" noChangeAspect="1"/>
+          </p:cNvSpPr>
+          <p:nvPr>
+            <p:ph type="sldImg"/>
+          </p:nvPr>
+        </p:nvSpPr>
+        <p:spPr/>
+      </p:sp>
+      <p:sp>
+        <p:nvSpPr>
+          <p:cNvPr id="3" name="Notes Placeholder 2"/>
+          <p:cNvSpPr>
+            <a:spLocks noGrp="1"/>
+          </p:cNvSpPr>
+          <p:nvPr>
+            <p:ph type="body" idx="1"/>
+          </p:nvPr>
+        </p:nvSpPr>
+        <p:spPr/>
+        <p:txBody>
+          <a:bodyPr/>
+          <a:lstStyle/>
+          <a:p>
+            <a:r>
+              <a:rPr lang="en-US" dirty="0" smtClean="0"/>
+              <a:t>Valid Boundary tests are the</a:t>
+            </a:r>
+            <a:r>
+              <a:rPr lang="en-US" baseline="0" dirty="0" smtClean="0"/>
+              <a:t> </a:t>
+            </a:r>
+            <a:r>
+              <a:rPr lang="en-US" baseline="0" dirty="0" err="1" smtClean="0"/>
+              <a:t>the</a:t>
+            </a:r>
+            <a:r>
+              <a:rPr lang="en-US" baseline="0" dirty="0" smtClean="0"/>
+              <a:t> maximum, minimum, etc.</a:t>
+            </a:r>
+          </a:p>
+          <a:p>
+            <a:endParaRPr lang="en-US" baseline="0" dirty="0" smtClean="0"/>
+          </a:p>
+          <a:p>
+            <a:r>
+              <a:rPr lang="en-US" baseline="0" dirty="0" smtClean="0"/>
+              <a:t>Constructor tests – just make sure that the expected values are set (for example if you had several parameters, you may accidentally assign the parameter to a different field.</a:t>
+            </a:r>
+          </a:p>
+          <a:p>
+            <a:endParaRPr lang="en-US" baseline="0" dirty="0" smtClean="0"/>
+          </a:p>
+          <a:p>
+            <a:r>
+              <a:rPr lang="en-US" baseline="0" dirty="0" smtClean="0"/>
+              <a:t>Fluent Mapping tests. I’ll show an example in a bit</a:t>
+            </a:r>
+          </a:p>
+          <a:p>
+            <a:endParaRPr lang="en-US" baseline="0" dirty="0" smtClean="0"/>
+          </a:p>
+          <a:p>
+            <a:r>
+              <a:rPr lang="en-US" baseline="0" dirty="0" smtClean="0"/>
+              <a:t>Reflection Tests. I use to check for attributes, and to ensure I write tests for each field</a:t>
+            </a:r>
+            <a:endParaRPr lang="en-US" dirty="0"/>
+          </a:p>
+        </p:txBody>
+      </p:sp>
+      <p:sp>
+        <p:nvSpPr>
+          <p:cNvPr id="4" name="Slide Number Placeholder 3"/>
+          <p:cNvSpPr>
+            <a:spLocks noGrp="1"/>
+          </p:cNvSpPr>
+          <p:nvPr>
+            <p:ph type="sldNum" sz="quarter" idx="10"/>
+          </p:nvPr>
+        </p:nvSpPr>
+        <p:spPr/>
+        <p:txBody>
+          <a:bodyPr/>
+          <a:lstStyle/>
+          <a:p>
+            <a:fld id="{75693FD4-8F83-4EF7-AC3F-0DC0388986B0}" type="slidenum">
+              <a:rPr lang="en-US" smtClean="0"/>
+              <a:pPr/>
+              <a:t>12</a:t>
+            </a:fld>
+            <a:endParaRPr lang="en-US" dirty="0"/>
+          </a:p>
+        </p:txBody>
+      </p:sp>
+    </p:spTree>
+    <p:extLst>
+      <p:ext uri="{BB962C8B-B14F-4D97-AF65-F5344CB8AC3E}">
+        <p14:creationId xmlns:p14="http://schemas.microsoft.com/office/powerpoint/2010/main" val="2863606861"/>
+      </p:ext>
+    </p:extLst>
+  </p:cSld>
+  <p:clrMapOvr>
+    <a:masterClrMapping/>
+  </p:clrMapOvr>
+</p:notes>
+</file>
+
+<file path=ppt/notesSlides/notesSlide12.xml><?xml version="1.0" encoding="utf-8"?>
+<p:notes xmlns:a="http://schemas.openxmlformats.org/drawingml/2006/main" xmlns:r="http://schemas.openxmlformats.org/officeDocument/2006/relationships" xmlns:p="http://schemas.openxmlformats.org/presentationml/2006/main">
+  <p:cSld>
+    <p:spTree>
+      <p:nvGrpSpPr>
+        <p:cNvPr id="1" name=""/>
+        <p:cNvGrpSpPr/>
+        <p:nvPr/>
+      </p:nvGrpSpPr>
+      <p:grpSpPr>
+        <a:xfrm>
+          <a:off x="0" y="0"/>
+          <a:ext cx="0" cy="0"/>
+          <a:chOff x="0" y="0"/>
+          <a:chExt cx="0" cy="0"/>
+        </a:xfrm>
+      </p:grpSpPr>
+      <p:sp>
+        <p:nvSpPr>
+          <p:cNvPr id="2" name="Slide Image Placeholder 1"/>
+          <p:cNvSpPr>
+            <a:spLocks noGrp="1" noRot="1" noChangeAspect="1"/>
+          </p:cNvSpPr>
+          <p:nvPr>
+            <p:ph type="sldImg"/>
+          </p:nvPr>
+        </p:nvSpPr>
+        <p:spPr/>
+      </p:sp>
+      <p:sp>
+        <p:nvSpPr>
+          <p:cNvPr id="3" name="Notes Placeholder 2"/>
+          <p:cNvSpPr>
+            <a:spLocks noGrp="1"/>
+          </p:cNvSpPr>
+          <p:nvPr>
+            <p:ph type="body" idx="1"/>
+          </p:nvPr>
+        </p:nvSpPr>
+        <p:spPr/>
+        <p:txBody>
+          <a:bodyPr/>
+          <a:lstStyle/>
+          <a:p>
+            <a:r>
+              <a:rPr lang="en-US" dirty="0" smtClean="0"/>
+              <a:t>I</a:t>
+            </a:r>
+            <a:r>
+              <a:rPr lang="en-US" baseline="0" dirty="0" smtClean="0"/>
+              <a:t> prefer to group the different section in Regions, and because I tend to have a lot of regions, I have the descriptive text at the start and end of the region.</a:t>
+            </a:r>
+          </a:p>
+          <a:p>
+            <a:endParaRPr lang="en-US" baseline="0" dirty="0" smtClean="0"/>
+          </a:p>
+          <a:p>
+            <a:r>
+              <a:rPr lang="en-US" baseline="0" dirty="0" smtClean="0"/>
+              <a:t>There will always be an </a:t>
+            </a:r>
+            <a:r>
+              <a:rPr lang="en-US" baseline="0" dirty="0" err="1" smtClean="0"/>
+              <a:t>Init</a:t>
+            </a:r>
+            <a:r>
+              <a:rPr lang="en-US" baseline="0" dirty="0" smtClean="0"/>
+              <a:t> and Reflection regions when you create this with my </a:t>
+            </a:r>
+            <a:r>
+              <a:rPr lang="en-US" baseline="0" dirty="0" err="1" smtClean="0"/>
+              <a:t>Resharper</a:t>
+            </a:r>
+            <a:r>
+              <a:rPr lang="en-US" baseline="0" dirty="0" smtClean="0"/>
+              <a:t> template. Then I have each field in it’s own region. I also prefer to group the invalid and valid tests </a:t>
+            </a:r>
+            <a:r>
+              <a:rPr lang="en-US" baseline="0" dirty="0" err="1" smtClean="0"/>
+              <a:t>seperatly</a:t>
+            </a:r>
+            <a:endParaRPr lang="en-US" baseline="0" dirty="0" smtClean="0"/>
+          </a:p>
+          <a:p>
+            <a:endParaRPr lang="en-US" dirty="0"/>
+          </a:p>
+        </p:txBody>
+      </p:sp>
+      <p:sp>
+        <p:nvSpPr>
+          <p:cNvPr id="4" name="Slide Number Placeholder 3"/>
+          <p:cNvSpPr>
+            <a:spLocks noGrp="1"/>
+          </p:cNvSpPr>
+          <p:nvPr>
+            <p:ph type="sldNum" sz="quarter" idx="10"/>
+          </p:nvPr>
+        </p:nvSpPr>
+        <p:spPr/>
+        <p:txBody>
+          <a:bodyPr/>
+          <a:lstStyle/>
+          <a:p>
+            <a:fld id="{75693FD4-8F83-4EF7-AC3F-0DC0388986B0}" type="slidenum">
+              <a:rPr lang="en-US" smtClean="0"/>
+              <a:pPr/>
+              <a:t>13</a:t>
+            </a:fld>
+            <a:endParaRPr lang="en-US" dirty="0"/>
+          </a:p>
+        </p:txBody>
+      </p:sp>
+    </p:spTree>
+    <p:extLst>
+      <p:ext uri="{BB962C8B-B14F-4D97-AF65-F5344CB8AC3E}">
+        <p14:creationId xmlns:p14="http://schemas.microsoft.com/office/powerpoint/2010/main" val="1035053358"/>
+      </p:ext>
+    </p:extLst>
+  </p:cSld>
+  <p:clrMapOvr>
+    <a:masterClrMapping/>
+  </p:clrMapOvr>
+</p:notes>
+</file>
+
+<file path=ppt/notesSlides/notesSlide13.xml><?xml version="1.0" encoding="utf-8"?>
+<p:notes xmlns:a="http://schemas.openxmlformats.org/drawingml/2006/main" xmlns:r="http://schemas.openxmlformats.org/officeDocument/2006/relationships" xmlns:p="http://schemas.openxmlformats.org/presentationml/2006/main">
+  <p:cSld>
+    <p:spTree>
+      <p:nvGrpSpPr>
+        <p:cNvPr id="1" name=""/>
+        <p:cNvGrpSpPr/>
+        <p:nvPr/>
+      </p:nvGrpSpPr>
+      <p:grpSpPr>
+        <a:xfrm>
+          <a:off x="0" y="0"/>
+          <a:ext cx="0" cy="0"/>
+          <a:chOff x="0" y="0"/>
+          <a:chExt cx="0" cy="0"/>
+        </a:xfrm>
+      </p:grpSpPr>
+      <p:sp>
+        <p:nvSpPr>
+          <p:cNvPr id="2" name="Slide Image Placeholder 1"/>
+          <p:cNvSpPr>
+            <a:spLocks noGrp="1" noRot="1" noChangeAspect="1"/>
+          </p:cNvSpPr>
+          <p:nvPr>
+            <p:ph type="sldImg"/>
+          </p:nvPr>
+        </p:nvSpPr>
+        <p:spPr/>
+      </p:sp>
+      <p:sp>
+        <p:nvSpPr>
+          <p:cNvPr id="3" name="Notes Placeholder 2"/>
+          <p:cNvSpPr>
+            <a:spLocks noGrp="1"/>
+          </p:cNvSpPr>
+          <p:nvPr>
+            <p:ph type="body" idx="1"/>
+          </p:nvPr>
+        </p:nvSpPr>
+        <p:spPr/>
+        <p:txBody>
+          <a:bodyPr/>
+          <a:lstStyle/>
+          <a:p>
+            <a:r>
+              <a:rPr lang="en-US" dirty="0" smtClean="0"/>
+              <a:t>Fluent mapping is something new I started doing after finding an example</a:t>
+            </a:r>
+            <a:r>
+              <a:rPr lang="en-US" baseline="0" dirty="0" smtClean="0"/>
+              <a:t> on the net.</a:t>
+            </a:r>
+            <a:endParaRPr lang="en-US" dirty="0"/>
+          </a:p>
+        </p:txBody>
+      </p:sp>
+      <p:sp>
+        <p:nvSpPr>
+          <p:cNvPr id="4" name="Slide Number Placeholder 3"/>
+          <p:cNvSpPr>
+            <a:spLocks noGrp="1"/>
+          </p:cNvSpPr>
+          <p:nvPr>
+            <p:ph type="sldNum" sz="quarter" idx="10"/>
+          </p:nvPr>
+        </p:nvSpPr>
+        <p:spPr/>
+        <p:txBody>
+          <a:bodyPr/>
+          <a:lstStyle/>
+          <a:p>
+            <a:fld id="{75693FD4-8F83-4EF7-AC3F-0DC0388986B0}" type="slidenum">
+              <a:rPr lang="en-US" smtClean="0"/>
+              <a:pPr/>
+              <a:t>14</a:t>
+            </a:fld>
+            <a:endParaRPr lang="en-US" dirty="0"/>
+          </a:p>
+        </p:txBody>
+      </p:sp>
+    </p:spTree>
+    <p:extLst>
+      <p:ext uri="{BB962C8B-B14F-4D97-AF65-F5344CB8AC3E}">
+        <p14:creationId xmlns:p14="http://schemas.microsoft.com/office/powerpoint/2010/main" val="1818885195"/>
+      </p:ext>
+    </p:extLst>
+  </p:cSld>
+  <p:clrMapOvr>
+    <a:masterClrMapping/>
+  </p:clrMapOvr>
+</p:notes>
+</file>
+
+<file path=ppt/notesSlides/notesSlide14.xml><?xml version="1.0" encoding="utf-8"?>
+<p:notes xmlns:a="http://schemas.openxmlformats.org/drawingml/2006/main" xmlns:r="http://schemas.openxmlformats.org/officeDocument/2006/relationships" xmlns:p="http://schemas.openxmlformats.org/presentationml/2006/main">
+  <p:cSld>
+    <p:spTree>
+      <p:nvGrpSpPr>
+        <p:cNvPr id="1" name=""/>
+        <p:cNvGrpSpPr/>
+        <p:nvPr/>
+      </p:nvGrpSpPr>
+      <p:grpSpPr>
+        <a:xfrm>
+          <a:off x="0" y="0"/>
+          <a:ext cx="0" cy="0"/>
+          <a:chOff x="0" y="0"/>
+          <a:chExt cx="0" cy="0"/>
+        </a:xfrm>
+      </p:grpSpPr>
+      <p:sp>
+        <p:nvSpPr>
+          <p:cNvPr id="2" name="Slide Image Placeholder 1"/>
+          <p:cNvSpPr>
+            <a:spLocks noGrp="1" noRot="1" noChangeAspect="1"/>
+          </p:cNvSpPr>
+          <p:nvPr>
+            <p:ph type="sldImg"/>
+          </p:nvPr>
+        </p:nvSpPr>
+        <p:spPr/>
+      </p:sp>
+      <p:sp>
+        <p:nvSpPr>
+          <p:cNvPr id="3" name="Notes Placeholder 2"/>
+          <p:cNvSpPr>
+            <a:spLocks noGrp="1"/>
+          </p:cNvSpPr>
+          <p:nvPr>
+            <p:ph type="body" idx="1"/>
+          </p:nvPr>
+        </p:nvSpPr>
+        <p:spPr/>
+        <p:txBody>
+          <a:bodyPr/>
+          <a:lstStyle/>
+          <a:p>
+            <a:r>
+              <a:rPr lang="en-US" dirty="0" smtClean="0"/>
+              <a:t>These</a:t>
+            </a:r>
+            <a:r>
+              <a:rPr lang="en-US" baseline="0" dirty="0" smtClean="0"/>
+              <a:t> tests both check that the attributes are as expected and that </a:t>
+            </a:r>
+            <a:r>
+              <a:rPr lang="en-US" baseline="0" dirty="0" smtClean="0"/>
+              <a:t>the </a:t>
+            </a:r>
+            <a:r>
+              <a:rPr lang="en-US" baseline="0" dirty="0" smtClean="0"/>
+              <a:t>public methods have not been added or removed</a:t>
+            </a:r>
+            <a:r>
+              <a:rPr lang="en-US" baseline="0" dirty="0" smtClean="0"/>
+              <a:t>.</a:t>
+            </a:r>
+          </a:p>
+          <a:p>
+            <a:endParaRPr lang="en-US" baseline="0" dirty="0" smtClean="0"/>
+          </a:p>
+          <a:p>
+            <a:r>
+              <a:rPr lang="en-US" baseline="0" dirty="0" err="1" smtClean="0"/>
+              <a:t>NameAndType</a:t>
+            </a:r>
+            <a:r>
+              <a:rPr lang="en-US" baseline="0" dirty="0" smtClean="0"/>
+              <a:t> and </a:t>
+            </a:r>
+            <a:r>
+              <a:rPr lang="en-US" baseline="0" dirty="0" err="1" smtClean="0"/>
+              <a:t>AttributeAndFieldValidation</a:t>
+            </a:r>
+            <a:r>
+              <a:rPr lang="en-US" baseline="0" dirty="0" smtClean="0"/>
+              <a:t> are helper classes I created. This is order, dependent. Sometimes, the attributes get sorted differently on builder vs. your local test runner. If this happens I do have a way to solve it.</a:t>
+            </a:r>
+            <a:endParaRPr lang="en-US" dirty="0"/>
+          </a:p>
+        </p:txBody>
+      </p:sp>
+      <p:sp>
+        <p:nvSpPr>
+          <p:cNvPr id="4" name="Slide Number Placeholder 3"/>
+          <p:cNvSpPr>
+            <a:spLocks noGrp="1"/>
+          </p:cNvSpPr>
+          <p:nvPr>
+            <p:ph type="sldNum" sz="quarter" idx="10"/>
+          </p:nvPr>
+        </p:nvSpPr>
+        <p:spPr/>
+        <p:txBody>
+          <a:bodyPr/>
+          <a:lstStyle/>
+          <a:p>
+            <a:fld id="{75693FD4-8F83-4EF7-AC3F-0DC0388986B0}" type="slidenum">
+              <a:rPr lang="en-US" smtClean="0"/>
+              <a:pPr/>
+              <a:t>15</a:t>
+            </a:fld>
+            <a:endParaRPr lang="en-US" dirty="0"/>
+          </a:p>
+        </p:txBody>
+      </p:sp>
+    </p:spTree>
+    <p:extLst>
+      <p:ext uri="{BB962C8B-B14F-4D97-AF65-F5344CB8AC3E}">
+        <p14:creationId xmlns:p14="http://schemas.microsoft.com/office/powerpoint/2010/main" val="2337724366"/>
+      </p:ext>
+    </p:extLst>
+  </p:cSld>
+  <p:clrMapOvr>
+    <a:masterClrMapping/>
+  </p:clrMapOvr>
+</p:notes>
+</file>
+
+<file path=ppt/notesSlides/notesSlide15.xml><?xml version="1.0" encoding="utf-8"?>
+<p:notes xmlns:a="http://schemas.openxmlformats.org/drawingml/2006/main" xmlns:r="http://schemas.openxmlformats.org/officeDocument/2006/relationships" xmlns:p="http://schemas.openxmlformats.org/presentationml/2006/main">
+  <p:cSld>
+    <p:spTree>
+      <p:nvGrpSpPr>
+        <p:cNvPr id="1" name=""/>
+        <p:cNvGrpSpPr/>
+        <p:nvPr/>
+      </p:nvGrpSpPr>
+      <p:grpSpPr>
+        <a:xfrm>
+          <a:off x="0" y="0"/>
+          <a:ext cx="0" cy="0"/>
+          <a:chOff x="0" y="0"/>
+          <a:chExt cx="0" cy="0"/>
+        </a:xfrm>
+      </p:grpSpPr>
+      <p:sp>
+        <p:nvSpPr>
+          <p:cNvPr id="2" name="Slide Image Placeholder 1"/>
+          <p:cNvSpPr>
+            <a:spLocks noGrp="1" noRot="1" noChangeAspect="1"/>
+          </p:cNvSpPr>
+          <p:nvPr>
+            <p:ph type="sldImg"/>
+          </p:nvPr>
+        </p:nvSpPr>
+        <p:spPr/>
+      </p:sp>
+      <p:sp>
+        <p:nvSpPr>
+          <p:cNvPr id="3" name="Notes Placeholder 2"/>
+          <p:cNvSpPr>
+            <a:spLocks noGrp="1"/>
+          </p:cNvSpPr>
+          <p:nvPr>
+            <p:ph type="body" idx="1"/>
+          </p:nvPr>
+        </p:nvSpPr>
+        <p:spPr/>
+        <p:txBody>
+          <a:bodyPr/>
+          <a:lstStyle/>
+          <a:p>
+            <a:r>
+              <a:rPr lang="en-US" dirty="0" smtClean="0"/>
+              <a:t>I have a </a:t>
+            </a:r>
+            <a:r>
+              <a:rPr lang="en-US" dirty="0" err="1" smtClean="0"/>
+              <a:t>resharper</a:t>
+            </a:r>
+            <a:r>
+              <a:rPr lang="en-US" dirty="0" smtClean="0"/>
+              <a:t> template that sets up the initial </a:t>
+            </a:r>
+            <a:r>
+              <a:rPr lang="en-US" dirty="0" err="1" smtClean="0"/>
+              <a:t>stucture</a:t>
+            </a:r>
+            <a:r>
+              <a:rPr lang="en-US" dirty="0" smtClean="0"/>
+              <a:t> of these tests and also provides some examples</a:t>
+            </a:r>
+          </a:p>
+          <a:p>
+            <a:r>
+              <a:rPr lang="en-US" dirty="0" smtClean="0"/>
+              <a:t>If all</a:t>
+            </a:r>
+            <a:r>
+              <a:rPr lang="en-US" baseline="0" dirty="0" smtClean="0"/>
+              <a:t> these tests suddenly fail, or fail when you first set them up, it is probably because there is Controller injection that needs to be mocked</a:t>
+            </a:r>
+            <a:endParaRPr lang="en-US" dirty="0"/>
+          </a:p>
+        </p:txBody>
+      </p:sp>
+      <p:sp>
+        <p:nvSpPr>
+          <p:cNvPr id="4" name="Slide Number Placeholder 3"/>
+          <p:cNvSpPr>
+            <a:spLocks noGrp="1"/>
+          </p:cNvSpPr>
+          <p:nvPr>
+            <p:ph type="sldNum" sz="quarter" idx="10"/>
+          </p:nvPr>
+        </p:nvSpPr>
+        <p:spPr/>
+        <p:txBody>
+          <a:bodyPr/>
+          <a:lstStyle/>
+          <a:p>
+            <a:fld id="{75693FD4-8F83-4EF7-AC3F-0DC0388986B0}" type="slidenum">
+              <a:rPr lang="en-US" smtClean="0"/>
+              <a:pPr/>
+              <a:t>16</a:t>
+            </a:fld>
+            <a:endParaRPr lang="en-US" dirty="0"/>
+          </a:p>
+        </p:txBody>
+      </p:sp>
+    </p:spTree>
+    <p:extLst>
+      <p:ext uri="{BB962C8B-B14F-4D97-AF65-F5344CB8AC3E}">
+        <p14:creationId xmlns:p14="http://schemas.microsoft.com/office/powerpoint/2010/main" val="1651317015"/>
+      </p:ext>
+    </p:extLst>
+  </p:cSld>
+  <p:clrMapOvr>
+    <a:masterClrMapping/>
+  </p:clrMapOvr>
+</p:notes>
+</file>
+
+<file path=ppt/notesSlides/notesSlide16.xml><?xml version="1.0" encoding="utf-8"?>
+<p:notes xmlns:a="http://schemas.openxmlformats.org/drawingml/2006/main" xmlns:r="http://schemas.openxmlformats.org/officeDocument/2006/relationships" xmlns:p="http://schemas.openxmlformats.org/presentationml/2006/main">
+  <p:cSld>
+    <p:spTree>
+      <p:nvGrpSpPr>
+        <p:cNvPr id="1" name=""/>
+        <p:cNvGrpSpPr/>
+        <p:nvPr/>
+      </p:nvGrpSpPr>
+      <p:grpSpPr>
+        <a:xfrm>
+          <a:off x="0" y="0"/>
+          <a:ext cx="0" cy="0"/>
+          <a:chOff x="0" y="0"/>
+          <a:chExt cx="0" cy="0"/>
+        </a:xfrm>
+      </p:grpSpPr>
+      <p:sp>
+        <p:nvSpPr>
+          <p:cNvPr id="2" name="Slide Image Placeholder 1"/>
+          <p:cNvSpPr>
+            <a:spLocks noGrp="1" noRot="1" noChangeAspect="1"/>
+          </p:cNvSpPr>
+          <p:nvPr>
+            <p:ph type="sldImg"/>
+          </p:nvPr>
+        </p:nvSpPr>
+        <p:spPr/>
+      </p:sp>
+      <p:sp>
+        <p:nvSpPr>
+          <p:cNvPr id="3" name="Notes Placeholder 2"/>
+          <p:cNvSpPr>
+            <a:spLocks noGrp="1"/>
+          </p:cNvSpPr>
+          <p:nvPr>
+            <p:ph type="body" idx="1"/>
+          </p:nvPr>
+        </p:nvSpPr>
+        <p:spPr/>
+        <p:txBody>
+          <a:bodyPr/>
+          <a:lstStyle/>
+          <a:p>
+            <a:r>
+              <a:rPr lang="en-US" dirty="0" smtClean="0"/>
+              <a:t>If the only parameter is the id, these tests work fine.</a:t>
+            </a:r>
+            <a:r>
+              <a:rPr lang="en-US" baseline="0" dirty="0" smtClean="0"/>
+              <a:t> If you have </a:t>
+            </a:r>
+            <a:r>
+              <a:rPr lang="en-US" baseline="0" dirty="0" err="1" smtClean="0"/>
+              <a:t>QueryString</a:t>
+            </a:r>
+            <a:r>
+              <a:rPr lang="en-US" baseline="0" dirty="0" smtClean="0"/>
+              <a:t> parameters, I have an overload in the helpers that can ignore the parameters.</a:t>
+            </a:r>
+            <a:endParaRPr lang="en-US" dirty="0"/>
+          </a:p>
+        </p:txBody>
+      </p:sp>
+      <p:sp>
+        <p:nvSpPr>
+          <p:cNvPr id="4" name="Slide Number Placeholder 3"/>
+          <p:cNvSpPr>
+            <a:spLocks noGrp="1"/>
+          </p:cNvSpPr>
+          <p:nvPr>
+            <p:ph type="sldNum" sz="quarter" idx="10"/>
+          </p:nvPr>
+        </p:nvSpPr>
+        <p:spPr/>
+        <p:txBody>
+          <a:bodyPr/>
+          <a:lstStyle/>
+          <a:p>
+            <a:fld id="{75693FD4-8F83-4EF7-AC3F-0DC0388986B0}" type="slidenum">
+              <a:rPr lang="en-US" smtClean="0"/>
+              <a:pPr/>
+              <a:t>17</a:t>
+            </a:fld>
+            <a:endParaRPr lang="en-US" dirty="0"/>
+          </a:p>
+        </p:txBody>
+      </p:sp>
+    </p:spTree>
+    <p:extLst>
+      <p:ext uri="{BB962C8B-B14F-4D97-AF65-F5344CB8AC3E}">
+        <p14:creationId xmlns:p14="http://schemas.microsoft.com/office/powerpoint/2010/main" val="2748494377"/>
+      </p:ext>
+    </p:extLst>
+  </p:cSld>
+  <p:clrMapOvr>
+    <a:masterClrMapping/>
+  </p:clrMapOvr>
+</p:notes>
+</file>
+
+<file path=ppt/notesSlides/notesSlide17.xml><?xml version="1.0" encoding="utf-8"?>
+<p:notes xmlns:a="http://schemas.openxmlformats.org/drawingml/2006/main" xmlns:r="http://schemas.openxmlformats.org/officeDocument/2006/relationships" xmlns:p="http://schemas.openxmlformats.org/presentationml/2006/main">
+  <p:cSld>
+    <p:spTree>
+      <p:nvGrpSpPr>
+        <p:cNvPr id="1" name=""/>
+        <p:cNvGrpSpPr/>
+        <p:nvPr/>
+      </p:nvGrpSpPr>
+      <p:grpSpPr>
+        <a:xfrm>
+          <a:off x="0" y="0"/>
+          <a:ext cx="0" cy="0"/>
+          <a:chOff x="0" y="0"/>
+          <a:chExt cx="0" cy="0"/>
+        </a:xfrm>
+      </p:grpSpPr>
+      <p:sp>
+        <p:nvSpPr>
+          <p:cNvPr id="2" name="Slide Image Placeholder 1"/>
+          <p:cNvSpPr>
+            <a:spLocks noGrp="1" noRot="1" noChangeAspect="1"/>
+          </p:cNvSpPr>
+          <p:nvPr>
+            <p:ph type="sldImg"/>
+          </p:nvPr>
+        </p:nvSpPr>
+        <p:spPr/>
+      </p:sp>
+      <p:sp>
+        <p:nvSpPr>
+          <p:cNvPr id="3" name="Notes Placeholder 2"/>
+          <p:cNvSpPr>
+            <a:spLocks noGrp="1"/>
+          </p:cNvSpPr>
+          <p:nvPr>
+            <p:ph type="body" idx="1"/>
+          </p:nvPr>
+        </p:nvSpPr>
+        <p:spPr/>
+        <p:txBody>
+          <a:bodyPr/>
+          <a:lstStyle/>
+          <a:p>
+            <a:r>
+              <a:rPr lang="en-US" dirty="0" smtClean="0"/>
+              <a:t>The helpers</a:t>
+            </a:r>
+            <a:r>
+              <a:rPr lang="en-US" baseline="0" dirty="0" smtClean="0"/>
+              <a:t> are the ones to fake data (base class in </a:t>
+            </a:r>
+            <a:r>
+              <a:rPr lang="en-US" baseline="0" dirty="0" err="1" smtClean="0"/>
+              <a:t>UCDArch.Testing</a:t>
+            </a:r>
+            <a:r>
+              <a:rPr lang="en-US" baseline="0" dirty="0" smtClean="0"/>
+              <a:t>)</a:t>
+            </a:r>
+            <a:endParaRPr lang="en-US" dirty="0" smtClean="0"/>
+          </a:p>
+          <a:p>
+            <a:endParaRPr lang="en-US" dirty="0" smtClean="0"/>
+          </a:p>
+          <a:p>
+            <a:r>
+              <a:rPr lang="en-US" dirty="0" smtClean="0"/>
+              <a:t>Doing</a:t>
+            </a:r>
+            <a:r>
+              <a:rPr lang="en-US" baseline="0" dirty="0" smtClean="0"/>
+              <a:t> boundary tests for controller methods gets uglier as the complexity of the method increases. Using interface methods reduces some of this complexity. Avoid static methods as much as possible as they can’t be mocked (not easily)</a:t>
+            </a:r>
+          </a:p>
+          <a:p>
+            <a:endParaRPr lang="en-US" baseline="0" dirty="0" smtClean="0"/>
+          </a:p>
+          <a:p>
+            <a:r>
+              <a:rPr lang="en-US" dirty="0" smtClean="0"/>
+              <a:t>Any repository mocking is usually done in the class initialization.</a:t>
+            </a:r>
+          </a:p>
+          <a:p>
+            <a:r>
+              <a:rPr lang="en-US" dirty="0" smtClean="0"/>
+              <a:t>Basically, any parameters passed to the controller’s class (injection) has to be mocked in the test </a:t>
+            </a:r>
+            <a:r>
+              <a:rPr lang="en-US" dirty="0" err="1" smtClean="0"/>
+              <a:t>init.</a:t>
+            </a:r>
+            <a:endParaRPr lang="en-US" dirty="0" smtClean="0"/>
+          </a:p>
+          <a:p>
+            <a:endParaRPr lang="en-US" dirty="0" smtClean="0"/>
+          </a:p>
+          <a:p>
+            <a:r>
+              <a:rPr lang="en-US" dirty="0" smtClean="0"/>
+              <a:t>If</a:t>
+            </a:r>
+            <a:r>
+              <a:rPr lang="en-US" baseline="0" dirty="0" smtClean="0"/>
+              <a:t> Possible create a method to fake all the data you will need for all your tests, it really cleans up the arrange part of the tests. </a:t>
+            </a:r>
+          </a:p>
+          <a:p>
+            <a:endParaRPr lang="en-US" baseline="0" dirty="0" smtClean="0"/>
+          </a:p>
+          <a:p>
+            <a:r>
+              <a:rPr lang="en-US" baseline="0" dirty="0" smtClean="0"/>
+              <a:t>If the controller is checking the </a:t>
+            </a:r>
+            <a:r>
+              <a:rPr lang="en-US" baseline="0" dirty="0" err="1" smtClean="0"/>
+              <a:t>CurrentUser’s</a:t>
+            </a:r>
+            <a:r>
+              <a:rPr lang="en-US" baseline="0" dirty="0" smtClean="0"/>
+              <a:t> identity this needs to be mocked. There is a </a:t>
+            </a:r>
+            <a:r>
+              <a:rPr lang="en-US" baseline="0" dirty="0" err="1" smtClean="0"/>
+              <a:t>methed</a:t>
+            </a:r>
+            <a:r>
+              <a:rPr lang="en-US" baseline="0" dirty="0" smtClean="0"/>
+              <a:t> in </a:t>
+            </a:r>
+            <a:r>
+              <a:rPr lang="en-US" baseline="0" dirty="0" err="1" smtClean="0"/>
+              <a:t>UCDArch.Testing</a:t>
+            </a:r>
+            <a:r>
+              <a:rPr lang="en-US" baseline="0" dirty="0" smtClean="0"/>
+              <a:t> to mock this as well as any files that may be returned.</a:t>
+            </a:r>
+          </a:p>
+          <a:p>
+            <a:endParaRPr lang="en-US" baseline="0" dirty="0" smtClean="0"/>
+          </a:p>
+          <a:p>
+            <a:r>
+              <a:rPr lang="en-US" baseline="0" dirty="0" smtClean="0"/>
+              <a:t>Usually we test what is returned (redirect/view), error messages, and that expected code is executed.</a:t>
+            </a:r>
+            <a:endParaRPr lang="en-US" dirty="0"/>
+          </a:p>
+        </p:txBody>
+      </p:sp>
+      <p:sp>
+        <p:nvSpPr>
+          <p:cNvPr id="4" name="Slide Number Placeholder 3"/>
+          <p:cNvSpPr>
+            <a:spLocks noGrp="1"/>
+          </p:cNvSpPr>
+          <p:nvPr>
+            <p:ph type="sldNum" sz="quarter" idx="10"/>
+          </p:nvPr>
+        </p:nvSpPr>
+        <p:spPr/>
+        <p:txBody>
+          <a:bodyPr/>
+          <a:lstStyle/>
+          <a:p>
+            <a:fld id="{75693FD4-8F83-4EF7-AC3F-0DC0388986B0}" type="slidenum">
+              <a:rPr lang="en-US" smtClean="0"/>
+              <a:pPr/>
+              <a:t>18</a:t>
+            </a:fld>
+            <a:endParaRPr lang="en-US" dirty="0"/>
+          </a:p>
+        </p:txBody>
+      </p:sp>
+    </p:spTree>
+    <p:extLst>
+      <p:ext uri="{BB962C8B-B14F-4D97-AF65-F5344CB8AC3E}">
+        <p14:creationId xmlns:p14="http://schemas.microsoft.com/office/powerpoint/2010/main" val="2448196234"/>
+      </p:ext>
+    </p:extLst>
+  </p:cSld>
+  <p:clrMapOvr>
+    <a:masterClrMapping/>
+  </p:clrMapOvr>
+</p:notes>
+</file>
+
+<file path=ppt/notesSlides/notesSlide18.xml><?xml version="1.0" encoding="utf-8"?>
+<p:notes xmlns:a="http://schemas.openxmlformats.org/drawingml/2006/main" xmlns:r="http://schemas.openxmlformats.org/officeDocument/2006/relationships" xmlns:p="http://schemas.openxmlformats.org/presentationml/2006/main">
+  <p:cSld>
+    <p:spTree>
+      <p:nvGrpSpPr>
+        <p:cNvPr id="1" name=""/>
+        <p:cNvGrpSpPr/>
+        <p:nvPr/>
+      </p:nvGrpSpPr>
+      <p:grpSpPr>
+        <a:xfrm>
+          <a:off x="0" y="0"/>
+          <a:ext cx="0" cy="0"/>
+          <a:chOff x="0" y="0"/>
+          <a:chExt cx="0" cy="0"/>
+        </a:xfrm>
+      </p:grpSpPr>
+      <p:sp>
+        <p:nvSpPr>
+          <p:cNvPr id="2" name="Slide Image Placeholder 1"/>
+          <p:cNvSpPr>
+            <a:spLocks noGrp="1" noRot="1" noChangeAspect="1"/>
+          </p:cNvSpPr>
+          <p:nvPr>
+            <p:ph type="sldImg"/>
+          </p:nvPr>
+        </p:nvSpPr>
+        <p:spPr/>
+      </p:sp>
+      <p:sp>
+        <p:nvSpPr>
+          <p:cNvPr id="3" name="Notes Placeholder 2"/>
+          <p:cNvSpPr>
+            <a:spLocks noGrp="1"/>
+          </p:cNvSpPr>
+          <p:nvPr>
+            <p:ph type="body" idx="1"/>
+          </p:nvPr>
+        </p:nvSpPr>
+        <p:spPr/>
+        <p:txBody>
+          <a:bodyPr/>
+          <a:lstStyle/>
+          <a:p>
+            <a:r>
+              <a:rPr lang="en-US" dirty="0" err="1" smtClean="0"/>
+              <a:t>Uck</a:t>
+            </a:r>
+            <a:r>
+              <a:rPr lang="en-US" dirty="0" smtClean="0"/>
+              <a:t>, I know. It can be worse which makes the test even more fragile.</a:t>
+            </a:r>
+          </a:p>
+          <a:p>
+            <a:endParaRPr lang="en-US" dirty="0" smtClean="0"/>
+          </a:p>
+          <a:p>
+            <a:r>
+              <a:rPr lang="en-US" dirty="0" err="1" smtClean="0"/>
+              <a:t>HasSameId</a:t>
+            </a:r>
+            <a:r>
+              <a:rPr lang="en-US" dirty="0" smtClean="0"/>
+              <a:t> is mocked to return false, if </a:t>
+            </a:r>
+            <a:r>
+              <a:rPr lang="en-US" dirty="0" err="1" smtClean="0"/>
+              <a:t>HasAccess</a:t>
+            </a:r>
+            <a:r>
+              <a:rPr lang="en-US" dirty="0" smtClean="0"/>
+              <a:t> was mocked to return false, it would return the same way, but the “</a:t>
+            </a:r>
+            <a:r>
+              <a:rPr lang="en-US" dirty="0" err="1" smtClean="0"/>
+              <a:t>AssertWasCalled</a:t>
+            </a:r>
+            <a:r>
+              <a:rPr lang="en-US" dirty="0" smtClean="0"/>
+              <a:t>” for </a:t>
+            </a:r>
+            <a:r>
+              <a:rPr lang="en-US" dirty="0" err="1" smtClean="0"/>
+              <a:t>HasSameId</a:t>
+            </a:r>
+            <a:r>
+              <a:rPr lang="en-US" dirty="0" smtClean="0"/>
+              <a:t> would not</a:t>
+            </a:r>
+            <a:r>
+              <a:rPr lang="en-US" baseline="0" dirty="0" smtClean="0"/>
+              <a:t> have been reached.</a:t>
+            </a:r>
+            <a:endParaRPr lang="en-US" dirty="0"/>
+          </a:p>
+        </p:txBody>
+      </p:sp>
+      <p:sp>
+        <p:nvSpPr>
+          <p:cNvPr id="4" name="Slide Number Placeholder 3"/>
+          <p:cNvSpPr>
+            <a:spLocks noGrp="1"/>
+          </p:cNvSpPr>
+          <p:nvPr>
+            <p:ph type="sldNum" sz="quarter" idx="10"/>
+          </p:nvPr>
+        </p:nvSpPr>
+        <p:spPr/>
+        <p:txBody>
+          <a:bodyPr/>
+          <a:lstStyle/>
+          <a:p>
+            <a:fld id="{75693FD4-8F83-4EF7-AC3F-0DC0388986B0}" type="slidenum">
+              <a:rPr lang="en-US" smtClean="0"/>
+              <a:pPr/>
+              <a:t>19</a:t>
+            </a:fld>
+            <a:endParaRPr lang="en-US" dirty="0"/>
+          </a:p>
+        </p:txBody>
+      </p:sp>
+    </p:spTree>
+    <p:extLst>
+      <p:ext uri="{BB962C8B-B14F-4D97-AF65-F5344CB8AC3E}">
+        <p14:creationId xmlns:p14="http://schemas.microsoft.com/office/powerpoint/2010/main" val="780494779"/>
+      </p:ext>
+    </p:extLst>
+  </p:cSld>
+  <p:clrMapOvr>
+    <a:masterClrMapping/>
+  </p:clrMapOvr>
+</p:notes>
+</file>
+
+<file path=ppt/notesSlides/notesSlide19.xml><?xml version="1.0" encoding="utf-8"?>
+<p:notes xmlns:a="http://schemas.openxmlformats.org/drawingml/2006/main" xmlns:r="http://schemas.openxmlformats.org/officeDocument/2006/relationships" xmlns:p="http://schemas.openxmlformats.org/presentationml/2006/main">
+  <p:cSld>
+    <p:spTree>
+      <p:nvGrpSpPr>
+        <p:cNvPr id="1" name=""/>
+        <p:cNvGrpSpPr/>
+        <p:nvPr/>
+      </p:nvGrpSpPr>
+      <p:grpSpPr>
+        <a:xfrm>
+          <a:off x="0" y="0"/>
+          <a:ext cx="0" cy="0"/>
+          <a:chOff x="0" y="0"/>
+          <a:chExt cx="0" cy="0"/>
+        </a:xfrm>
+      </p:grpSpPr>
+      <p:sp>
+        <p:nvSpPr>
+          <p:cNvPr id="2" name="Slide Image Placeholder 1"/>
+          <p:cNvSpPr>
+            <a:spLocks noGrp="1" noRot="1" noChangeAspect="1"/>
+          </p:cNvSpPr>
+          <p:nvPr>
+            <p:ph type="sldImg"/>
+          </p:nvPr>
+        </p:nvSpPr>
+        <p:spPr/>
+      </p:sp>
+      <p:sp>
+        <p:nvSpPr>
+          <p:cNvPr id="3" name="Notes Placeholder 2"/>
+          <p:cNvSpPr>
+            <a:spLocks noGrp="1"/>
+          </p:cNvSpPr>
+          <p:nvPr>
+            <p:ph type="body" idx="1"/>
+          </p:nvPr>
+        </p:nvSpPr>
+        <p:spPr/>
+        <p:txBody>
+          <a:bodyPr/>
+          <a:lstStyle/>
+          <a:p>
+            <a:r>
+              <a:rPr lang="en-US" dirty="0" smtClean="0"/>
+              <a:t>Controller Attributes are never run from unit tests, Reflection at least lets us know the attribute is there or not.</a:t>
+            </a:r>
+          </a:p>
+          <a:p>
+            <a:r>
+              <a:rPr lang="en-US" dirty="0" smtClean="0"/>
+              <a:t>Similar</a:t>
+            </a:r>
+            <a:r>
+              <a:rPr lang="en-US" baseline="0" dirty="0" smtClean="0"/>
+              <a:t> to repository tests, I use these for code coverage as I have a count of the public methods.</a:t>
+            </a:r>
+          </a:p>
+          <a:p>
+            <a:endParaRPr lang="en-US" baseline="0" dirty="0" smtClean="0"/>
+          </a:p>
+          <a:p>
+            <a:r>
+              <a:rPr lang="en-US" baseline="0" dirty="0" smtClean="0"/>
+              <a:t>I check the class attributes, then each method’s attributes too.</a:t>
+            </a:r>
+          </a:p>
+          <a:p>
+            <a:endParaRPr lang="en-US" baseline="0" dirty="0" smtClean="0"/>
+          </a:p>
+          <a:p>
+            <a:r>
+              <a:rPr lang="en-US" baseline="0" dirty="0" smtClean="0"/>
+              <a:t>This is particularly important for Authorization attributes</a:t>
+            </a:r>
+            <a:endParaRPr lang="en-US" dirty="0"/>
+          </a:p>
+        </p:txBody>
+      </p:sp>
+      <p:sp>
+        <p:nvSpPr>
+          <p:cNvPr id="4" name="Slide Number Placeholder 3"/>
+          <p:cNvSpPr>
+            <a:spLocks noGrp="1"/>
+          </p:cNvSpPr>
+          <p:nvPr>
+            <p:ph type="sldNum" sz="quarter" idx="10"/>
+          </p:nvPr>
+        </p:nvSpPr>
+        <p:spPr/>
+        <p:txBody>
+          <a:bodyPr/>
+          <a:lstStyle/>
+          <a:p>
+            <a:fld id="{75693FD4-8F83-4EF7-AC3F-0DC0388986B0}" type="slidenum">
+              <a:rPr lang="en-US" smtClean="0"/>
+              <a:pPr/>
+              <a:t>20</a:t>
+            </a:fld>
+            <a:endParaRPr lang="en-US" dirty="0"/>
+          </a:p>
+        </p:txBody>
+      </p:sp>
+    </p:spTree>
+    <p:extLst>
+      <p:ext uri="{BB962C8B-B14F-4D97-AF65-F5344CB8AC3E}">
+        <p14:creationId xmlns:p14="http://schemas.microsoft.com/office/powerpoint/2010/main" val="2335397108"/>
+      </p:ext>
+    </p:extLst>
+  </p:cSld>
+  <p:clrMapOvr>
+    <a:masterClrMapping/>
+  </p:clrMapOvr>
+</p:notes>
+</file>
+
 <file path=ppt/notesSlides/notesSlide2.xml><?xml version="1.0" encoding="utf-8"?>
 <p:notes xmlns:a="http://schemas.openxmlformats.org/drawingml/2006/main" xmlns:r="http://schemas.openxmlformats.org/officeDocument/2006/relationships" xmlns:p="http://schemas.openxmlformats.org/presentationml/2006/main">
   <p:cSld>
@@ -4963,18 +6205,146 @@
               </a:spcAft>
               <a:buClrTx/>
               <a:buSzTx/>
-              <a:buFont typeface="+mj-lt"/>
-              <a:buNone/>
+              <a:buFontTx/>
+              <a:buChar char="-"/>
               <a:tabLst/>
               <a:defRPr/>
             </a:pPr>
             <a:r>
               <a:rPr lang="en-US" sz="1200" dirty="0" smtClean="0"/>
-              <a:t>This is another option</a:t>
+              <a:t>Our tests are tightly bound to </a:t>
+            </a:r>
+            <a:r>
+              <a:rPr lang="en-US" sz="1200" dirty="0" err="1" smtClean="0"/>
+              <a:t>UCDArch</a:t>
+            </a:r>
+            <a:endParaRPr lang="en-US" sz="1200" dirty="0" smtClean="0"/>
+          </a:p>
+          <a:p>
+            <a:pPr marL="228600" marR="0" indent="-228600" algn="l" defTabSz="914400" rtl="0" eaLnBrk="1" fontAlgn="auto" latinLnBrk="0" hangingPunct="1">
+              <a:lnSpc>
+                <a:spcPct val="100000"/>
+              </a:lnSpc>
+              <a:spcBef>
+                <a:spcPts val="0"/>
+              </a:spcBef>
+              <a:spcAft>
+                <a:spcPts val="0"/>
+              </a:spcAft>
+              <a:buClrTx/>
+              <a:buSzTx/>
+              <a:buFontTx/>
+              <a:buChar char="-"/>
+              <a:tabLst/>
+              <a:defRPr/>
+            </a:pPr>
+            <a:r>
+              <a:rPr lang="en-US" sz="1200" dirty="0" smtClean="0"/>
+              <a:t>1) basically how to</a:t>
             </a:r>
             <a:r>
               <a:rPr lang="en-US" sz="1200" baseline="0" dirty="0" smtClean="0"/>
-              <a:t> for an Overview slide.</a:t>
+              <a:t> format the tests</a:t>
+            </a:r>
+          </a:p>
+          <a:p>
+            <a:pPr marL="228600" marR="0" indent="-228600" algn="l" defTabSz="914400" rtl="0" eaLnBrk="1" fontAlgn="auto" latinLnBrk="0" hangingPunct="1">
+              <a:lnSpc>
+                <a:spcPct val="100000"/>
+              </a:lnSpc>
+              <a:spcBef>
+                <a:spcPts val="0"/>
+              </a:spcBef>
+              <a:spcAft>
+                <a:spcPts val="0"/>
+              </a:spcAft>
+              <a:buClrTx/>
+              <a:buSzTx/>
+              <a:buFontTx/>
+              <a:buChar char="-"/>
+              <a:tabLst/>
+              <a:defRPr/>
+            </a:pPr>
+            <a:r>
+              <a:rPr lang="en-US" sz="1200" baseline="0" dirty="0" smtClean="0"/>
+              <a:t>2) the different types of tests (repository, controller, etc.)</a:t>
+            </a:r>
+          </a:p>
+          <a:p>
+            <a:pPr marL="228600" marR="0" indent="-228600" algn="l" defTabSz="914400" rtl="0" eaLnBrk="1" fontAlgn="auto" latinLnBrk="0" hangingPunct="1">
+              <a:lnSpc>
+                <a:spcPct val="100000"/>
+              </a:lnSpc>
+              <a:spcBef>
+                <a:spcPts val="0"/>
+              </a:spcBef>
+              <a:spcAft>
+                <a:spcPts val="0"/>
+              </a:spcAft>
+              <a:buClrTx/>
+              <a:buSzTx/>
+              <a:buFontTx/>
+              <a:buChar char="-"/>
+              <a:tabLst/>
+              <a:defRPr/>
+            </a:pPr>
+            <a:r>
+              <a:rPr lang="en-US" sz="1200" baseline="0" dirty="0" smtClean="0"/>
+              <a:t>3) the different folders within the test project and where code and tests are located</a:t>
+            </a:r>
+          </a:p>
+          <a:p>
+            <a:pPr marL="228600" marR="0" indent="-228600" algn="l" defTabSz="914400" rtl="0" eaLnBrk="1" fontAlgn="auto" latinLnBrk="0" hangingPunct="1">
+              <a:lnSpc>
+                <a:spcPct val="100000"/>
+              </a:lnSpc>
+              <a:spcBef>
+                <a:spcPts val="0"/>
+              </a:spcBef>
+              <a:spcAft>
+                <a:spcPts val="0"/>
+              </a:spcAft>
+              <a:buClrTx/>
+              <a:buSzTx/>
+              <a:buFontTx/>
+              <a:buChar char="-"/>
+              <a:tabLst/>
+              <a:defRPr/>
+            </a:pPr>
+            <a:r>
+              <a:rPr lang="en-US" sz="1200" baseline="0" dirty="0" smtClean="0"/>
+              <a:t>4) Some of the helpers and abstract base classes we use</a:t>
+            </a:r>
+          </a:p>
+          <a:p>
+            <a:pPr marL="228600" marR="0" indent="-228600" algn="l" defTabSz="914400" rtl="0" eaLnBrk="1" fontAlgn="auto" latinLnBrk="0" hangingPunct="1">
+              <a:lnSpc>
+                <a:spcPct val="100000"/>
+              </a:lnSpc>
+              <a:spcBef>
+                <a:spcPts val="0"/>
+              </a:spcBef>
+              <a:spcAft>
+                <a:spcPts val="0"/>
+              </a:spcAft>
+              <a:buClrTx/>
+              <a:buSzTx/>
+              <a:buFontTx/>
+              <a:buChar char="-"/>
+              <a:tabLst/>
+              <a:defRPr/>
+            </a:pPr>
+            <a:r>
+              <a:rPr lang="en-US" sz="1200" baseline="0" dirty="0" smtClean="0"/>
+              <a:t>5) </a:t>
+            </a:r>
+            <a:r>
+              <a:rPr lang="en-US" sz="1200" baseline="0" dirty="0" err="1" smtClean="0"/>
+              <a:t>Resharper</a:t>
+            </a:r>
+            <a:r>
+              <a:rPr lang="en-US" sz="1200" baseline="0" dirty="0" smtClean="0"/>
+              <a:t> templates that aid in creating tests</a:t>
             </a:r>
             <a:endParaRPr lang="en-US" sz="1200" dirty="0" smtClean="0"/>
           </a:p>
@@ -5005,6 +6375,957 @@
         </p:spPr>
       </p:sp>
     </p:spTree>
+  </p:cSld>
+  <p:clrMapOvr>
+    <a:masterClrMapping/>
+  </p:clrMapOvr>
+</p:notes>
+</file>
+
+<file path=ppt/notesSlides/notesSlide20.xml><?xml version="1.0" encoding="utf-8"?>
+<p:notes xmlns:a="http://schemas.openxmlformats.org/drawingml/2006/main" xmlns:r="http://schemas.openxmlformats.org/officeDocument/2006/relationships" xmlns:p="http://schemas.openxmlformats.org/presentationml/2006/main">
+  <p:cSld>
+    <p:spTree>
+      <p:nvGrpSpPr>
+        <p:cNvPr id="1" name=""/>
+        <p:cNvGrpSpPr/>
+        <p:nvPr/>
+      </p:nvGrpSpPr>
+      <p:grpSpPr>
+        <a:xfrm>
+          <a:off x="0" y="0"/>
+          <a:ext cx="0" cy="0"/>
+          <a:chOff x="0" y="0"/>
+          <a:chExt cx="0" cy="0"/>
+        </a:xfrm>
+      </p:grpSpPr>
+      <p:sp>
+        <p:nvSpPr>
+          <p:cNvPr id="2" name="Slide Image Placeholder 1"/>
+          <p:cNvSpPr>
+            <a:spLocks noGrp="1" noRot="1" noChangeAspect="1"/>
+          </p:cNvSpPr>
+          <p:nvPr>
+            <p:ph type="sldImg"/>
+          </p:nvPr>
+        </p:nvSpPr>
+        <p:spPr/>
+      </p:sp>
+      <p:sp>
+        <p:nvSpPr>
+          <p:cNvPr id="3" name="Notes Placeholder 2"/>
+          <p:cNvSpPr>
+            <a:spLocks noGrp="1"/>
+          </p:cNvSpPr>
+          <p:nvPr>
+            <p:ph type="body" idx="1"/>
+          </p:nvPr>
+        </p:nvSpPr>
+        <p:spPr/>
+        <p:txBody>
+          <a:bodyPr/>
+          <a:lstStyle/>
+          <a:p>
+            <a:r>
+              <a:rPr lang="en-US" dirty="0" smtClean="0"/>
+              <a:t>For each of the 4 attributes found, I would have a test like the bottom one.</a:t>
+            </a:r>
+            <a:endParaRPr lang="en-US" dirty="0"/>
+          </a:p>
+        </p:txBody>
+      </p:sp>
+      <p:sp>
+        <p:nvSpPr>
+          <p:cNvPr id="4" name="Slide Number Placeholder 3"/>
+          <p:cNvSpPr>
+            <a:spLocks noGrp="1"/>
+          </p:cNvSpPr>
+          <p:nvPr>
+            <p:ph type="sldNum" sz="quarter" idx="10"/>
+          </p:nvPr>
+        </p:nvSpPr>
+        <p:spPr/>
+        <p:txBody>
+          <a:bodyPr/>
+          <a:lstStyle/>
+          <a:p>
+            <a:fld id="{75693FD4-8F83-4EF7-AC3F-0DC0388986B0}" type="slidenum">
+              <a:rPr lang="en-US" smtClean="0"/>
+              <a:pPr/>
+              <a:t>21</a:t>
+            </a:fld>
+            <a:endParaRPr lang="en-US" dirty="0"/>
+          </a:p>
+        </p:txBody>
+      </p:sp>
+    </p:spTree>
+    <p:extLst>
+      <p:ext uri="{BB962C8B-B14F-4D97-AF65-F5344CB8AC3E}">
+        <p14:creationId xmlns:p14="http://schemas.microsoft.com/office/powerpoint/2010/main" val="3640817402"/>
+      </p:ext>
+    </p:extLst>
+  </p:cSld>
+  <p:clrMapOvr>
+    <a:masterClrMapping/>
+  </p:clrMapOvr>
+</p:notes>
+</file>
+
+<file path=ppt/notesSlides/notesSlide21.xml><?xml version="1.0" encoding="utf-8"?>
+<p:notes xmlns:a="http://schemas.openxmlformats.org/drawingml/2006/main" xmlns:r="http://schemas.openxmlformats.org/officeDocument/2006/relationships" xmlns:p="http://schemas.openxmlformats.org/presentationml/2006/main">
+  <p:cSld>
+    <p:spTree>
+      <p:nvGrpSpPr>
+        <p:cNvPr id="1" name=""/>
+        <p:cNvGrpSpPr/>
+        <p:nvPr/>
+      </p:nvGrpSpPr>
+      <p:grpSpPr>
+        <a:xfrm>
+          <a:off x="0" y="0"/>
+          <a:ext cx="0" cy="0"/>
+          <a:chOff x="0" y="0"/>
+          <a:chExt cx="0" cy="0"/>
+        </a:xfrm>
+      </p:grpSpPr>
+      <p:sp>
+        <p:nvSpPr>
+          <p:cNvPr id="2" name="Slide Image Placeholder 1"/>
+          <p:cNvSpPr>
+            <a:spLocks noGrp="1" noRot="1" noChangeAspect="1"/>
+          </p:cNvSpPr>
+          <p:nvPr>
+            <p:ph type="sldImg"/>
+          </p:nvPr>
+        </p:nvSpPr>
+        <p:spPr/>
+      </p:sp>
+      <p:sp>
+        <p:nvSpPr>
+          <p:cNvPr id="3" name="Notes Placeholder 2"/>
+          <p:cNvSpPr>
+            <a:spLocks noGrp="1"/>
+          </p:cNvSpPr>
+          <p:nvPr>
+            <p:ph type="body" idx="1"/>
+          </p:nvPr>
+        </p:nvSpPr>
+        <p:spPr/>
+        <p:txBody>
+          <a:bodyPr/>
+          <a:lstStyle/>
+          <a:p>
+            <a:r>
+              <a:rPr lang="en-US" dirty="0" smtClean="0"/>
+              <a:t>If you</a:t>
+            </a:r>
+            <a:r>
+              <a:rPr lang="en-US" baseline="0" dirty="0" smtClean="0"/>
+              <a:t> are working on a controller, you may not want the builder to keep showing up errors, you could add an </a:t>
+            </a:r>
+            <a:r>
+              <a:rPr lang="en-US" baseline="0" dirty="0" err="1" smtClean="0"/>
+              <a:t>Assert.Inconclusive</a:t>
+            </a:r>
+            <a:r>
+              <a:rPr lang="en-US" baseline="0" dirty="0" smtClean="0"/>
+              <a:t>(“some message”) You will get that the test failed, but not builder.</a:t>
+            </a:r>
+          </a:p>
+          <a:p>
+            <a:endParaRPr lang="en-US" baseline="0" dirty="0" smtClean="0"/>
+          </a:p>
+          <a:p>
+            <a:r>
+              <a:rPr lang="en-US" baseline="0" dirty="0" smtClean="0"/>
+              <a:t>I like to have a number in the summary for these tests, and the mapping tests, that matches up to a number in the summary of the controller method.</a:t>
+            </a:r>
+            <a:endParaRPr lang="en-US" dirty="0"/>
+          </a:p>
+        </p:txBody>
+      </p:sp>
+      <p:sp>
+        <p:nvSpPr>
+          <p:cNvPr id="4" name="Slide Number Placeholder 3"/>
+          <p:cNvSpPr>
+            <a:spLocks noGrp="1"/>
+          </p:cNvSpPr>
+          <p:nvPr>
+            <p:ph type="sldNum" sz="quarter" idx="10"/>
+          </p:nvPr>
+        </p:nvSpPr>
+        <p:spPr/>
+        <p:txBody>
+          <a:bodyPr/>
+          <a:lstStyle/>
+          <a:p>
+            <a:fld id="{75693FD4-8F83-4EF7-AC3F-0DC0388986B0}" type="slidenum">
+              <a:rPr lang="en-US" smtClean="0"/>
+              <a:pPr/>
+              <a:t>22</a:t>
+            </a:fld>
+            <a:endParaRPr lang="en-US" dirty="0"/>
+          </a:p>
+        </p:txBody>
+      </p:sp>
+    </p:spTree>
+    <p:extLst>
+      <p:ext uri="{BB962C8B-B14F-4D97-AF65-F5344CB8AC3E}">
+        <p14:creationId xmlns:p14="http://schemas.microsoft.com/office/powerpoint/2010/main" val="1037723208"/>
+      </p:ext>
+    </p:extLst>
+  </p:cSld>
+  <p:clrMapOvr>
+    <a:masterClrMapping/>
+  </p:clrMapOvr>
+</p:notes>
+</file>
+
+<file path=ppt/notesSlides/notesSlide22.xml><?xml version="1.0" encoding="utf-8"?>
+<p:notes xmlns:a="http://schemas.openxmlformats.org/drawingml/2006/main" xmlns:r="http://schemas.openxmlformats.org/officeDocument/2006/relationships" xmlns:p="http://schemas.openxmlformats.org/presentationml/2006/main">
+  <p:cSld>
+    <p:spTree>
+      <p:nvGrpSpPr>
+        <p:cNvPr id="1" name=""/>
+        <p:cNvGrpSpPr/>
+        <p:nvPr/>
+      </p:nvGrpSpPr>
+      <p:grpSpPr>
+        <a:xfrm>
+          <a:off x="0" y="0"/>
+          <a:ext cx="0" cy="0"/>
+          <a:chOff x="0" y="0"/>
+          <a:chExt cx="0" cy="0"/>
+        </a:xfrm>
+      </p:grpSpPr>
+      <p:sp>
+        <p:nvSpPr>
+          <p:cNvPr id="2" name="Slide Image Placeholder 1"/>
+          <p:cNvSpPr>
+            <a:spLocks noGrp="1" noRot="1" noChangeAspect="1"/>
+          </p:cNvSpPr>
+          <p:nvPr>
+            <p:ph type="sldImg"/>
+          </p:nvPr>
+        </p:nvSpPr>
+        <p:spPr/>
+      </p:sp>
+      <p:sp>
+        <p:nvSpPr>
+          <p:cNvPr id="3" name="Notes Placeholder 2"/>
+          <p:cNvSpPr>
+            <a:spLocks noGrp="1"/>
+          </p:cNvSpPr>
+          <p:nvPr>
+            <p:ph type="body" idx="1"/>
+          </p:nvPr>
+        </p:nvSpPr>
+        <p:spPr/>
+        <p:txBody>
+          <a:bodyPr/>
+          <a:lstStyle/>
+          <a:p>
+            <a:r>
+              <a:rPr lang="en-US" dirty="0" smtClean="0"/>
+              <a:t>Create has both a Get and</a:t>
+            </a:r>
+            <a:r>
+              <a:rPr lang="en-US" baseline="0" dirty="0" smtClean="0"/>
+              <a:t> Post, so we need to use “</a:t>
+            </a:r>
+            <a:r>
+              <a:rPr lang="en-US" baseline="0" dirty="0" err="1" smtClean="0"/>
+              <a:t>ElementAt</a:t>
+            </a:r>
+            <a:r>
+              <a:rPr lang="en-US" baseline="0" dirty="0" smtClean="0"/>
+              <a:t>()” to identify which one we are looking at.</a:t>
+            </a:r>
+            <a:endParaRPr lang="en-US" dirty="0"/>
+          </a:p>
+        </p:txBody>
+      </p:sp>
+      <p:sp>
+        <p:nvSpPr>
+          <p:cNvPr id="4" name="Slide Number Placeholder 3"/>
+          <p:cNvSpPr>
+            <a:spLocks noGrp="1"/>
+          </p:cNvSpPr>
+          <p:nvPr>
+            <p:ph type="sldNum" sz="quarter" idx="10"/>
+          </p:nvPr>
+        </p:nvSpPr>
+        <p:spPr/>
+        <p:txBody>
+          <a:bodyPr/>
+          <a:lstStyle/>
+          <a:p>
+            <a:fld id="{75693FD4-8F83-4EF7-AC3F-0DC0388986B0}" type="slidenum">
+              <a:rPr lang="en-US" smtClean="0"/>
+              <a:pPr/>
+              <a:t>23</a:t>
+            </a:fld>
+            <a:endParaRPr lang="en-US" dirty="0"/>
+          </a:p>
+        </p:txBody>
+      </p:sp>
+    </p:spTree>
+    <p:extLst>
+      <p:ext uri="{BB962C8B-B14F-4D97-AF65-F5344CB8AC3E}">
+        <p14:creationId xmlns:p14="http://schemas.microsoft.com/office/powerpoint/2010/main" val="2620657771"/>
+      </p:ext>
+    </p:extLst>
+  </p:cSld>
+  <p:clrMapOvr>
+    <a:masterClrMapping/>
+  </p:clrMapOvr>
+</p:notes>
+</file>
+
+<file path=ppt/notesSlides/notesSlide23.xml><?xml version="1.0" encoding="utf-8"?>
+<p:notes xmlns:a="http://schemas.openxmlformats.org/drawingml/2006/main" xmlns:r="http://schemas.openxmlformats.org/officeDocument/2006/relationships" xmlns:p="http://schemas.openxmlformats.org/presentationml/2006/main">
+  <p:cSld>
+    <p:spTree>
+      <p:nvGrpSpPr>
+        <p:cNvPr id="1" name=""/>
+        <p:cNvGrpSpPr/>
+        <p:nvPr/>
+      </p:nvGrpSpPr>
+      <p:grpSpPr>
+        <a:xfrm>
+          <a:off x="0" y="0"/>
+          <a:ext cx="0" cy="0"/>
+          <a:chOff x="0" y="0"/>
+          <a:chExt cx="0" cy="0"/>
+        </a:xfrm>
+      </p:grpSpPr>
+      <p:sp>
+        <p:nvSpPr>
+          <p:cNvPr id="2" name="Slide Image Placeholder 1"/>
+          <p:cNvSpPr>
+            <a:spLocks noGrp="1" noRot="1" noChangeAspect="1"/>
+          </p:cNvSpPr>
+          <p:nvPr>
+            <p:ph type="sldImg"/>
+          </p:nvPr>
+        </p:nvSpPr>
+        <p:spPr/>
+      </p:sp>
+      <p:sp>
+        <p:nvSpPr>
+          <p:cNvPr id="3" name="Notes Placeholder 2"/>
+          <p:cNvSpPr>
+            <a:spLocks noGrp="1"/>
+          </p:cNvSpPr>
+          <p:nvPr>
+            <p:ph type="body" idx="1"/>
+          </p:nvPr>
+        </p:nvSpPr>
+        <p:spPr/>
+        <p:txBody>
+          <a:bodyPr/>
+          <a:lstStyle/>
+          <a:p>
+            <a:r>
+              <a:rPr lang="en-US" dirty="0" smtClean="0"/>
+              <a:t>This post method has two attributes. </a:t>
+            </a:r>
+          </a:p>
+          <a:p>
+            <a:r>
+              <a:rPr lang="en-US" dirty="0" smtClean="0"/>
+              <a:t>We can also example values within the attribute</a:t>
+            </a:r>
+            <a:endParaRPr lang="en-US" dirty="0"/>
+          </a:p>
+        </p:txBody>
+      </p:sp>
+      <p:sp>
+        <p:nvSpPr>
+          <p:cNvPr id="4" name="Slide Number Placeholder 3"/>
+          <p:cNvSpPr>
+            <a:spLocks noGrp="1"/>
+          </p:cNvSpPr>
+          <p:nvPr>
+            <p:ph type="sldNum" sz="quarter" idx="10"/>
+          </p:nvPr>
+        </p:nvSpPr>
+        <p:spPr/>
+        <p:txBody>
+          <a:bodyPr/>
+          <a:lstStyle/>
+          <a:p>
+            <a:fld id="{75693FD4-8F83-4EF7-AC3F-0DC0388986B0}" type="slidenum">
+              <a:rPr lang="en-US" smtClean="0"/>
+              <a:pPr/>
+              <a:t>24</a:t>
+            </a:fld>
+            <a:endParaRPr lang="en-US" dirty="0"/>
+          </a:p>
+        </p:txBody>
+      </p:sp>
+    </p:spTree>
+    <p:extLst>
+      <p:ext uri="{BB962C8B-B14F-4D97-AF65-F5344CB8AC3E}">
+        <p14:creationId xmlns:p14="http://schemas.microsoft.com/office/powerpoint/2010/main" val="2365652880"/>
+      </p:ext>
+    </p:extLst>
+  </p:cSld>
+  <p:clrMapOvr>
+    <a:masterClrMapping/>
+  </p:clrMapOvr>
+</p:notes>
+</file>
+
+<file path=ppt/notesSlides/notesSlide24.xml><?xml version="1.0" encoding="utf-8"?>
+<p:notes xmlns:a="http://schemas.openxmlformats.org/drawingml/2006/main" xmlns:r="http://schemas.openxmlformats.org/officeDocument/2006/relationships" xmlns:p="http://schemas.openxmlformats.org/presentationml/2006/main">
+  <p:cSld>
+    <p:spTree>
+      <p:nvGrpSpPr>
+        <p:cNvPr id="1" name=""/>
+        <p:cNvGrpSpPr/>
+        <p:nvPr/>
+      </p:nvGrpSpPr>
+      <p:grpSpPr>
+        <a:xfrm>
+          <a:off x="0" y="0"/>
+          <a:ext cx="0" cy="0"/>
+          <a:chOff x="0" y="0"/>
+          <a:chExt cx="0" cy="0"/>
+        </a:xfrm>
+      </p:grpSpPr>
+      <p:sp>
+        <p:nvSpPr>
+          <p:cNvPr id="2" name="Slide Image Placeholder 1"/>
+          <p:cNvSpPr>
+            <a:spLocks noGrp="1" noRot="1" noChangeAspect="1"/>
+          </p:cNvSpPr>
+          <p:nvPr>
+            <p:ph type="sldImg"/>
+          </p:nvPr>
+        </p:nvSpPr>
+        <p:spPr/>
+      </p:sp>
+      <p:sp>
+        <p:nvSpPr>
+          <p:cNvPr id="3" name="Notes Placeholder 2"/>
+          <p:cNvSpPr>
+            <a:spLocks noGrp="1"/>
+          </p:cNvSpPr>
+          <p:nvPr>
+            <p:ph type="body" idx="1"/>
+          </p:nvPr>
+        </p:nvSpPr>
+        <p:spPr/>
+        <p:txBody>
+          <a:bodyPr/>
+          <a:lstStyle/>
+          <a:p>
+            <a:r>
+              <a:rPr lang="en-US" dirty="0" smtClean="0"/>
+              <a:t>If one of your interface methods sends</a:t>
+            </a:r>
+            <a:r>
+              <a:rPr lang="en-US" baseline="0" dirty="0" smtClean="0"/>
+              <a:t> an email, you probably don’t want to test it.</a:t>
+            </a:r>
+          </a:p>
+          <a:p>
+            <a:endParaRPr lang="en-US" dirty="0"/>
+          </a:p>
+        </p:txBody>
+      </p:sp>
+      <p:sp>
+        <p:nvSpPr>
+          <p:cNvPr id="4" name="Slide Number Placeholder 3"/>
+          <p:cNvSpPr>
+            <a:spLocks noGrp="1"/>
+          </p:cNvSpPr>
+          <p:nvPr>
+            <p:ph type="sldNum" sz="quarter" idx="10"/>
+          </p:nvPr>
+        </p:nvSpPr>
+        <p:spPr/>
+        <p:txBody>
+          <a:bodyPr/>
+          <a:lstStyle/>
+          <a:p>
+            <a:fld id="{75693FD4-8F83-4EF7-AC3F-0DC0388986B0}" type="slidenum">
+              <a:rPr lang="en-US" smtClean="0"/>
+              <a:pPr/>
+              <a:t>25</a:t>
+            </a:fld>
+            <a:endParaRPr lang="en-US" dirty="0"/>
+          </a:p>
+        </p:txBody>
+      </p:sp>
+    </p:spTree>
+    <p:extLst>
+      <p:ext uri="{BB962C8B-B14F-4D97-AF65-F5344CB8AC3E}">
+        <p14:creationId xmlns:p14="http://schemas.microsoft.com/office/powerpoint/2010/main" val="1835671339"/>
+      </p:ext>
+    </p:extLst>
+  </p:cSld>
+  <p:clrMapOvr>
+    <a:masterClrMapping/>
+  </p:clrMapOvr>
+</p:notes>
+</file>
+
+<file path=ppt/notesSlides/notesSlide25.xml><?xml version="1.0" encoding="utf-8"?>
+<p:notes xmlns:a="http://schemas.openxmlformats.org/drawingml/2006/main" xmlns:r="http://schemas.openxmlformats.org/officeDocument/2006/relationships" xmlns:p="http://schemas.openxmlformats.org/presentationml/2006/main">
+  <p:cSld>
+    <p:spTree>
+      <p:nvGrpSpPr>
+        <p:cNvPr id="1" name=""/>
+        <p:cNvGrpSpPr/>
+        <p:nvPr/>
+      </p:nvGrpSpPr>
+      <p:grpSpPr>
+        <a:xfrm>
+          <a:off x="0" y="0"/>
+          <a:ext cx="0" cy="0"/>
+          <a:chOff x="0" y="0"/>
+          <a:chExt cx="0" cy="0"/>
+        </a:xfrm>
+      </p:grpSpPr>
+      <p:sp>
+        <p:nvSpPr>
+          <p:cNvPr id="2" name="Slide Image Placeholder 1"/>
+          <p:cNvSpPr>
+            <a:spLocks noGrp="1" noRot="1" noChangeAspect="1"/>
+          </p:cNvSpPr>
+          <p:nvPr>
+            <p:ph type="sldImg"/>
+          </p:nvPr>
+        </p:nvSpPr>
+        <p:spPr/>
+      </p:sp>
+      <p:sp>
+        <p:nvSpPr>
+          <p:cNvPr id="3" name="Notes Placeholder 2"/>
+          <p:cNvSpPr>
+            <a:spLocks noGrp="1"/>
+          </p:cNvSpPr>
+          <p:nvPr>
+            <p:ph type="body" idx="1"/>
+          </p:nvPr>
+        </p:nvSpPr>
+        <p:spPr/>
+        <p:txBody>
+          <a:bodyPr/>
+          <a:lstStyle/>
+          <a:p>
+            <a:endParaRPr lang="en-US" dirty="0"/>
+          </a:p>
+        </p:txBody>
+      </p:sp>
+      <p:sp>
+        <p:nvSpPr>
+          <p:cNvPr id="4" name="Slide Number Placeholder 3"/>
+          <p:cNvSpPr>
+            <a:spLocks noGrp="1"/>
+          </p:cNvSpPr>
+          <p:nvPr>
+            <p:ph type="sldNum" sz="quarter" idx="10"/>
+          </p:nvPr>
+        </p:nvSpPr>
+        <p:spPr/>
+        <p:txBody>
+          <a:bodyPr/>
+          <a:lstStyle/>
+          <a:p>
+            <a:fld id="{75693FD4-8F83-4EF7-AC3F-0DC0388986B0}" type="slidenum">
+              <a:rPr lang="en-US" smtClean="0"/>
+              <a:pPr/>
+              <a:t>28</a:t>
+            </a:fld>
+            <a:endParaRPr lang="en-US" dirty="0"/>
+          </a:p>
+        </p:txBody>
+      </p:sp>
+    </p:spTree>
+    <p:extLst>
+      <p:ext uri="{BB962C8B-B14F-4D97-AF65-F5344CB8AC3E}">
+        <p14:creationId xmlns:p14="http://schemas.microsoft.com/office/powerpoint/2010/main" val="1440932894"/>
+      </p:ext>
+    </p:extLst>
+  </p:cSld>
+  <p:clrMapOvr>
+    <a:masterClrMapping/>
+  </p:clrMapOvr>
+</p:notes>
+</file>
+
+<file path=ppt/notesSlides/notesSlide26.xml><?xml version="1.0" encoding="utf-8"?>
+<p:notes xmlns:a="http://schemas.openxmlformats.org/drawingml/2006/main" xmlns:r="http://schemas.openxmlformats.org/officeDocument/2006/relationships" xmlns:p="http://schemas.openxmlformats.org/presentationml/2006/main">
+  <p:cSld>
+    <p:spTree>
+      <p:nvGrpSpPr>
+        <p:cNvPr id="1" name=""/>
+        <p:cNvGrpSpPr/>
+        <p:nvPr/>
+      </p:nvGrpSpPr>
+      <p:grpSpPr>
+        <a:xfrm>
+          <a:off x="0" y="0"/>
+          <a:ext cx="0" cy="0"/>
+          <a:chOff x="0" y="0"/>
+          <a:chExt cx="0" cy="0"/>
+        </a:xfrm>
+      </p:grpSpPr>
+      <p:sp>
+        <p:nvSpPr>
+          <p:cNvPr id="2" name="Slide Image Placeholder 1"/>
+          <p:cNvSpPr>
+            <a:spLocks noGrp="1" noRot="1" noChangeAspect="1"/>
+          </p:cNvSpPr>
+          <p:nvPr>
+            <p:ph type="sldImg"/>
+          </p:nvPr>
+        </p:nvSpPr>
+        <p:spPr/>
+      </p:sp>
+      <p:sp>
+        <p:nvSpPr>
+          <p:cNvPr id="3" name="Notes Placeholder 2"/>
+          <p:cNvSpPr>
+            <a:spLocks noGrp="1"/>
+          </p:cNvSpPr>
+          <p:nvPr>
+            <p:ph type="body" idx="1"/>
+          </p:nvPr>
+        </p:nvSpPr>
+        <p:spPr/>
+        <p:txBody>
+          <a:bodyPr/>
+          <a:lstStyle/>
+          <a:p>
+            <a:r>
+              <a:rPr lang="en-US" dirty="0" smtClean="0"/>
+              <a:t>Controller tests often get very long which causes </a:t>
+            </a:r>
+            <a:r>
+              <a:rPr lang="en-US" dirty="0" err="1" smtClean="0"/>
+              <a:t>resharper</a:t>
+            </a:r>
+            <a:r>
+              <a:rPr lang="en-US" dirty="0" smtClean="0"/>
+              <a:t> to slow down. I like to break these into partial classes.</a:t>
+            </a:r>
+            <a:endParaRPr lang="en-US" dirty="0"/>
+          </a:p>
+        </p:txBody>
+      </p:sp>
+      <p:sp>
+        <p:nvSpPr>
+          <p:cNvPr id="4" name="Slide Number Placeholder 3"/>
+          <p:cNvSpPr>
+            <a:spLocks noGrp="1"/>
+          </p:cNvSpPr>
+          <p:nvPr>
+            <p:ph type="sldNum" sz="quarter" idx="10"/>
+          </p:nvPr>
+        </p:nvSpPr>
+        <p:spPr/>
+        <p:txBody>
+          <a:bodyPr/>
+          <a:lstStyle/>
+          <a:p>
+            <a:fld id="{75693FD4-8F83-4EF7-AC3F-0DC0388986B0}" type="slidenum">
+              <a:rPr lang="en-US" smtClean="0"/>
+              <a:pPr/>
+              <a:t>29</a:t>
+            </a:fld>
+            <a:endParaRPr lang="en-US" dirty="0"/>
+          </a:p>
+        </p:txBody>
+      </p:sp>
+    </p:spTree>
+    <p:extLst>
+      <p:ext uri="{BB962C8B-B14F-4D97-AF65-F5344CB8AC3E}">
+        <p14:creationId xmlns:p14="http://schemas.microsoft.com/office/powerpoint/2010/main" val="2426448396"/>
+      </p:ext>
+    </p:extLst>
+  </p:cSld>
+  <p:clrMapOvr>
+    <a:masterClrMapping/>
+  </p:clrMapOvr>
+</p:notes>
+</file>
+
+<file path=ppt/notesSlides/notesSlide27.xml><?xml version="1.0" encoding="utf-8"?>
+<p:notes xmlns:a="http://schemas.openxmlformats.org/drawingml/2006/main" xmlns:r="http://schemas.openxmlformats.org/officeDocument/2006/relationships" xmlns:p="http://schemas.openxmlformats.org/presentationml/2006/main">
+  <p:cSld>
+    <p:spTree>
+      <p:nvGrpSpPr>
+        <p:cNvPr id="1" name=""/>
+        <p:cNvGrpSpPr/>
+        <p:nvPr/>
+      </p:nvGrpSpPr>
+      <p:grpSpPr>
+        <a:xfrm>
+          <a:off x="0" y="0"/>
+          <a:ext cx="0" cy="0"/>
+          <a:chOff x="0" y="0"/>
+          <a:chExt cx="0" cy="0"/>
+        </a:xfrm>
+      </p:grpSpPr>
+      <p:sp>
+        <p:nvSpPr>
+          <p:cNvPr id="2" name="Slide Image Placeholder 1"/>
+          <p:cNvSpPr>
+            <a:spLocks noGrp="1" noRot="1" noChangeAspect="1"/>
+          </p:cNvSpPr>
+          <p:nvPr>
+            <p:ph type="sldImg"/>
+          </p:nvPr>
+        </p:nvSpPr>
+        <p:spPr/>
+      </p:sp>
+      <p:sp>
+        <p:nvSpPr>
+          <p:cNvPr id="3" name="Notes Placeholder 2"/>
+          <p:cNvSpPr>
+            <a:spLocks noGrp="1"/>
+          </p:cNvSpPr>
+          <p:nvPr>
+            <p:ph type="body" idx="1"/>
+          </p:nvPr>
+        </p:nvSpPr>
+        <p:spPr/>
+        <p:txBody>
+          <a:bodyPr/>
+          <a:lstStyle/>
+          <a:p>
+            <a:r>
+              <a:rPr lang="en-US" dirty="0" smtClean="0"/>
+              <a:t>You will probably need to edit </a:t>
+            </a:r>
+            <a:r>
+              <a:rPr lang="en-US" dirty="0" err="1" smtClean="0"/>
+              <a:t>CreateValidEntites</a:t>
+            </a:r>
+            <a:r>
+              <a:rPr lang="en-US" dirty="0" smtClean="0"/>
+              <a:t> and </a:t>
+            </a:r>
+            <a:r>
+              <a:rPr lang="en-US" dirty="0" err="1" smtClean="0"/>
+              <a:t>ControllerRecordFakes</a:t>
+            </a:r>
+            <a:r>
+              <a:rPr lang="en-US" dirty="0" smtClean="0"/>
+              <a:t> as you write tests.</a:t>
+            </a:r>
+            <a:endParaRPr lang="en-US" dirty="0"/>
+          </a:p>
+        </p:txBody>
+      </p:sp>
+      <p:sp>
+        <p:nvSpPr>
+          <p:cNvPr id="4" name="Slide Number Placeholder 3"/>
+          <p:cNvSpPr>
+            <a:spLocks noGrp="1"/>
+          </p:cNvSpPr>
+          <p:nvPr>
+            <p:ph type="sldNum" sz="quarter" idx="10"/>
+          </p:nvPr>
+        </p:nvSpPr>
+        <p:spPr/>
+        <p:txBody>
+          <a:bodyPr/>
+          <a:lstStyle/>
+          <a:p>
+            <a:fld id="{75693FD4-8F83-4EF7-AC3F-0DC0388986B0}" type="slidenum">
+              <a:rPr lang="en-US" smtClean="0"/>
+              <a:pPr/>
+              <a:t>30</a:t>
+            </a:fld>
+            <a:endParaRPr lang="en-US" dirty="0"/>
+          </a:p>
+        </p:txBody>
+      </p:sp>
+    </p:spTree>
+    <p:extLst>
+      <p:ext uri="{BB962C8B-B14F-4D97-AF65-F5344CB8AC3E}">
+        <p14:creationId xmlns:p14="http://schemas.microsoft.com/office/powerpoint/2010/main" val="1506106595"/>
+      </p:ext>
+    </p:extLst>
+  </p:cSld>
+  <p:clrMapOvr>
+    <a:masterClrMapping/>
+  </p:clrMapOvr>
+</p:notes>
+</file>
+
+<file path=ppt/notesSlides/notesSlide28.xml><?xml version="1.0" encoding="utf-8"?>
+<p:notes xmlns:a="http://schemas.openxmlformats.org/drawingml/2006/main" xmlns:r="http://schemas.openxmlformats.org/officeDocument/2006/relationships" xmlns:p="http://schemas.openxmlformats.org/presentationml/2006/main">
+  <p:cSld>
+    <p:spTree>
+      <p:nvGrpSpPr>
+        <p:cNvPr id="1" name=""/>
+        <p:cNvGrpSpPr/>
+        <p:nvPr/>
+      </p:nvGrpSpPr>
+      <p:grpSpPr>
+        <a:xfrm>
+          <a:off x="0" y="0"/>
+          <a:ext cx="0" cy="0"/>
+          <a:chOff x="0" y="0"/>
+          <a:chExt cx="0" cy="0"/>
+        </a:xfrm>
+      </p:grpSpPr>
+      <p:sp>
+        <p:nvSpPr>
+          <p:cNvPr id="2" name="Slide Image Placeholder 1"/>
+          <p:cNvSpPr>
+            <a:spLocks noGrp="1" noRot="1" noChangeAspect="1"/>
+          </p:cNvSpPr>
+          <p:nvPr>
+            <p:ph type="sldImg"/>
+          </p:nvPr>
+        </p:nvSpPr>
+        <p:spPr/>
+      </p:sp>
+      <p:sp>
+        <p:nvSpPr>
+          <p:cNvPr id="3" name="Notes Placeholder 2"/>
+          <p:cNvSpPr>
+            <a:spLocks noGrp="1"/>
+          </p:cNvSpPr>
+          <p:nvPr>
+            <p:ph type="body" idx="1"/>
+          </p:nvPr>
+        </p:nvSpPr>
+        <p:spPr/>
+        <p:txBody>
+          <a:bodyPr/>
+          <a:lstStyle/>
+          <a:p>
+            <a:r>
+              <a:rPr lang="en-US" dirty="0" smtClean="0"/>
+              <a:t>If you have any.</a:t>
+            </a:r>
+            <a:endParaRPr lang="en-US" dirty="0"/>
+          </a:p>
+        </p:txBody>
+      </p:sp>
+      <p:sp>
+        <p:nvSpPr>
+          <p:cNvPr id="4" name="Slide Number Placeholder 3"/>
+          <p:cNvSpPr>
+            <a:spLocks noGrp="1"/>
+          </p:cNvSpPr>
+          <p:nvPr>
+            <p:ph type="sldNum" sz="quarter" idx="10"/>
+          </p:nvPr>
+        </p:nvSpPr>
+        <p:spPr/>
+        <p:txBody>
+          <a:bodyPr/>
+          <a:lstStyle/>
+          <a:p>
+            <a:fld id="{75693FD4-8F83-4EF7-AC3F-0DC0388986B0}" type="slidenum">
+              <a:rPr lang="en-US" smtClean="0"/>
+              <a:pPr/>
+              <a:t>31</a:t>
+            </a:fld>
+            <a:endParaRPr lang="en-US" dirty="0"/>
+          </a:p>
+        </p:txBody>
+      </p:sp>
+    </p:spTree>
+    <p:extLst>
+      <p:ext uri="{BB962C8B-B14F-4D97-AF65-F5344CB8AC3E}">
+        <p14:creationId xmlns:p14="http://schemas.microsoft.com/office/powerpoint/2010/main" val="3340220979"/>
+      </p:ext>
+    </p:extLst>
+  </p:cSld>
+  <p:clrMapOvr>
+    <a:masterClrMapping/>
+  </p:clrMapOvr>
+</p:notes>
+</file>
+
+<file path=ppt/notesSlides/notesSlide29.xml><?xml version="1.0" encoding="utf-8"?>
+<p:notes xmlns:a="http://schemas.openxmlformats.org/drawingml/2006/main" xmlns:r="http://schemas.openxmlformats.org/officeDocument/2006/relationships" xmlns:p="http://schemas.openxmlformats.org/presentationml/2006/main">
+  <p:cSld>
+    <p:spTree>
+      <p:nvGrpSpPr>
+        <p:cNvPr id="1" name=""/>
+        <p:cNvGrpSpPr/>
+        <p:nvPr/>
+      </p:nvGrpSpPr>
+      <p:grpSpPr>
+        <a:xfrm>
+          <a:off x="0" y="0"/>
+          <a:ext cx="0" cy="0"/>
+          <a:chOff x="0" y="0"/>
+          <a:chExt cx="0" cy="0"/>
+        </a:xfrm>
+      </p:grpSpPr>
+      <p:sp>
+        <p:nvSpPr>
+          <p:cNvPr id="2" name="Slide Image Placeholder 1"/>
+          <p:cNvSpPr>
+            <a:spLocks noGrp="1" noRot="1" noChangeAspect="1"/>
+          </p:cNvSpPr>
+          <p:nvPr>
+            <p:ph type="sldImg"/>
+          </p:nvPr>
+        </p:nvSpPr>
+        <p:spPr/>
+      </p:sp>
+      <p:sp>
+        <p:nvSpPr>
+          <p:cNvPr id="3" name="Notes Placeholder 2"/>
+          <p:cNvSpPr>
+            <a:spLocks noGrp="1"/>
+          </p:cNvSpPr>
+          <p:nvPr>
+            <p:ph type="body" idx="1"/>
+          </p:nvPr>
+        </p:nvSpPr>
+        <p:spPr/>
+        <p:txBody>
+          <a:bodyPr/>
+          <a:lstStyle/>
+          <a:p>
+            <a:endParaRPr lang="en-US" dirty="0"/>
+          </a:p>
+        </p:txBody>
+      </p:sp>
+      <p:sp>
+        <p:nvSpPr>
+          <p:cNvPr id="4" name="Slide Number Placeholder 3"/>
+          <p:cNvSpPr>
+            <a:spLocks noGrp="1"/>
+          </p:cNvSpPr>
+          <p:nvPr>
+            <p:ph type="sldNum" sz="quarter" idx="10"/>
+          </p:nvPr>
+        </p:nvSpPr>
+        <p:spPr/>
+        <p:txBody>
+          <a:bodyPr/>
+          <a:lstStyle/>
+          <a:p>
+            <a:fld id="{75693FD4-8F83-4EF7-AC3F-0DC0388986B0}" type="slidenum">
+              <a:rPr lang="en-US" smtClean="0"/>
+              <a:pPr/>
+              <a:t>32</a:t>
+            </a:fld>
+            <a:endParaRPr lang="en-US" dirty="0"/>
+          </a:p>
+        </p:txBody>
+      </p:sp>
+    </p:spTree>
+    <p:extLst>
+      <p:ext uri="{BB962C8B-B14F-4D97-AF65-F5344CB8AC3E}">
+        <p14:creationId xmlns:p14="http://schemas.microsoft.com/office/powerpoint/2010/main" val="3307007493"/>
+      </p:ext>
+    </p:extLst>
   </p:cSld>
   <p:clrMapOvr>
     <a:masterClrMapping/>
@@ -5075,8 +7396,13 @@
             </a:pPr>
             <a:r>
               <a:rPr lang="en-US" dirty="0" smtClean="0"/>
-              <a:t>Use a section header for each of the topics, so there is a clear transition to the audience. </a:t>
-            </a:r>
+              <a:t>Arrange,</a:t>
+            </a:r>
+            <a:r>
+              <a:rPr lang="en-US" baseline="0" dirty="0" smtClean="0"/>
+              <a:t> Act, and Assert</a:t>
+            </a:r>
+            <a:endParaRPr lang="en-US" dirty="0" smtClean="0"/>
           </a:p>
           <a:p>
             <a:endParaRPr lang="en-US" dirty="0"/>
@@ -5104,6 +7430,571 @@
               <a:t>3</a:t>
             </a:fld>
             <a:endParaRPr lang="en-US" dirty="0"/>
+          </a:p>
+        </p:txBody>
+      </p:sp>
+    </p:spTree>
+  </p:cSld>
+  <p:clrMapOvr>
+    <a:masterClrMapping/>
+  </p:clrMapOvr>
+</p:notes>
+</file>
+
+<file path=ppt/notesSlides/notesSlide30.xml><?xml version="1.0" encoding="utf-8"?>
+<p:notes xmlns:a="http://schemas.openxmlformats.org/drawingml/2006/main" xmlns:r="http://schemas.openxmlformats.org/officeDocument/2006/relationships" xmlns:p="http://schemas.openxmlformats.org/presentationml/2006/main">
+  <p:cSld>
+    <p:spTree>
+      <p:nvGrpSpPr>
+        <p:cNvPr id="1" name=""/>
+        <p:cNvGrpSpPr/>
+        <p:nvPr/>
+      </p:nvGrpSpPr>
+      <p:grpSpPr>
+        <a:xfrm>
+          <a:off x="0" y="0"/>
+          <a:ext cx="0" cy="0"/>
+          <a:chOff x="0" y="0"/>
+          <a:chExt cx="0" cy="0"/>
+        </a:xfrm>
+      </p:grpSpPr>
+      <p:sp>
+        <p:nvSpPr>
+          <p:cNvPr id="2" name="Slide Image Placeholder 1"/>
+          <p:cNvSpPr>
+            <a:spLocks noGrp="1" noRot="1" noChangeAspect="1"/>
+          </p:cNvSpPr>
+          <p:nvPr>
+            <p:ph type="sldImg"/>
+          </p:nvPr>
+        </p:nvSpPr>
+        <p:spPr/>
+      </p:sp>
+      <p:sp>
+        <p:nvSpPr>
+          <p:cNvPr id="3" name="Notes Placeholder 2"/>
+          <p:cNvSpPr>
+            <a:spLocks noGrp="1"/>
+          </p:cNvSpPr>
+          <p:nvPr>
+            <p:ph type="body" idx="1"/>
+          </p:nvPr>
+        </p:nvSpPr>
+        <p:spPr/>
+        <p:txBody>
+          <a:bodyPr/>
+          <a:lstStyle/>
+          <a:p>
+            <a:r>
+              <a:rPr lang="en-US" dirty="0" err="1" smtClean="0"/>
+              <a:t>ControllerRecordFakes</a:t>
+            </a:r>
+            <a:r>
+              <a:rPr lang="en-US" baseline="0" dirty="0" smtClean="0"/>
+              <a:t> is an abstract base class that makes it a lot easier to fake data for Controller tests. It fakes, </a:t>
+            </a:r>
+            <a:r>
+              <a:rPr lang="en-US" baseline="0" dirty="0" err="1" smtClean="0"/>
+              <a:t>GetNullableById</a:t>
+            </a:r>
+            <a:r>
+              <a:rPr lang="en-US" baseline="0" dirty="0" smtClean="0"/>
+              <a:t>, </a:t>
+            </a:r>
+            <a:r>
+              <a:rPr lang="en-US" baseline="0" dirty="0" err="1" smtClean="0"/>
+              <a:t>Queryable</a:t>
+            </a:r>
+            <a:r>
+              <a:rPr lang="en-US" baseline="0" dirty="0" smtClean="0"/>
+              <a:t>, and </a:t>
+            </a:r>
+            <a:r>
+              <a:rPr lang="en-US" baseline="0" dirty="0" err="1" smtClean="0"/>
+              <a:t>GetAll</a:t>
+            </a:r>
+            <a:endParaRPr lang="en-US" baseline="0" dirty="0" smtClean="0"/>
+          </a:p>
+          <a:p>
+            <a:endParaRPr lang="en-US" baseline="0" dirty="0" smtClean="0"/>
+          </a:p>
+          <a:p>
+            <a:r>
+              <a:rPr lang="en-US" baseline="0" dirty="0" err="1" smtClean="0"/>
+              <a:t>CreateValidEntities</a:t>
+            </a:r>
+            <a:r>
+              <a:rPr lang="en-US" baseline="0" dirty="0" smtClean="0"/>
+              <a:t> is where you would create a static method for each of your tables, and populate the required fields. String fields I always populate as The </a:t>
+            </a:r>
+            <a:r>
+              <a:rPr lang="en-US" baseline="0" dirty="0" err="1" smtClean="0"/>
+              <a:t>FieldName</a:t>
+            </a:r>
+            <a:r>
+              <a:rPr lang="en-US" baseline="0" dirty="0" smtClean="0"/>
+              <a:t> + counter if the counter is not null. This ties in with my Repository abstract base class methods.</a:t>
+            </a:r>
+          </a:p>
+          <a:p>
+            <a:endParaRPr lang="en-US" baseline="0" dirty="0" smtClean="0"/>
+          </a:p>
+          <a:p>
+            <a:r>
+              <a:rPr lang="en-US" baseline="0" dirty="0" smtClean="0"/>
+              <a:t>If you have </a:t>
+            </a:r>
+            <a:r>
+              <a:rPr lang="en-US" baseline="0" dirty="0" err="1" smtClean="0"/>
+              <a:t>Guid</a:t>
+            </a:r>
+            <a:r>
+              <a:rPr lang="en-US" baseline="0" dirty="0" smtClean="0"/>
+              <a:t> as the Id, </a:t>
+            </a:r>
+            <a:r>
+              <a:rPr lang="en-US" baseline="0" dirty="0" err="1" smtClean="0"/>
+              <a:t>SpecificGuid</a:t>
+            </a:r>
+            <a:r>
+              <a:rPr lang="en-US" baseline="0" dirty="0" smtClean="0"/>
+              <a:t> lets you set your test data to reproducible values.</a:t>
+            </a:r>
+            <a:endParaRPr lang="en-US" dirty="0"/>
+          </a:p>
+        </p:txBody>
+      </p:sp>
+      <p:sp>
+        <p:nvSpPr>
+          <p:cNvPr id="4" name="Slide Number Placeholder 3"/>
+          <p:cNvSpPr>
+            <a:spLocks noGrp="1"/>
+          </p:cNvSpPr>
+          <p:nvPr>
+            <p:ph type="sldNum" sz="quarter" idx="10"/>
+          </p:nvPr>
+        </p:nvSpPr>
+        <p:spPr/>
+        <p:txBody>
+          <a:bodyPr/>
+          <a:lstStyle/>
+          <a:p>
+            <a:fld id="{75693FD4-8F83-4EF7-AC3F-0DC0388986B0}" type="slidenum">
+              <a:rPr lang="en-US" smtClean="0"/>
+              <a:pPr/>
+              <a:t>36</a:t>
+            </a:fld>
+            <a:endParaRPr lang="en-US" dirty="0"/>
+          </a:p>
+        </p:txBody>
+      </p:sp>
+    </p:spTree>
+    <p:extLst>
+      <p:ext uri="{BB962C8B-B14F-4D97-AF65-F5344CB8AC3E}">
+        <p14:creationId xmlns:p14="http://schemas.microsoft.com/office/powerpoint/2010/main" val="1171266295"/>
+      </p:ext>
+    </p:extLst>
+  </p:cSld>
+  <p:clrMapOvr>
+    <a:masterClrMapping/>
+  </p:clrMapOvr>
+</p:notes>
+</file>
+
+<file path=ppt/notesSlides/notesSlide31.xml><?xml version="1.0" encoding="utf-8"?>
+<p:notes xmlns:a="http://schemas.openxmlformats.org/drawingml/2006/main" xmlns:r="http://schemas.openxmlformats.org/officeDocument/2006/relationships" xmlns:p="http://schemas.openxmlformats.org/presentationml/2006/main">
+  <p:cSld>
+    <p:spTree>
+      <p:nvGrpSpPr>
+        <p:cNvPr id="1" name=""/>
+        <p:cNvGrpSpPr/>
+        <p:nvPr/>
+      </p:nvGrpSpPr>
+      <p:grpSpPr>
+        <a:xfrm>
+          <a:off x="0" y="0"/>
+          <a:ext cx="0" cy="0"/>
+          <a:chOff x="0" y="0"/>
+          <a:chExt cx="0" cy="0"/>
+        </a:xfrm>
+      </p:grpSpPr>
+      <p:sp>
+        <p:nvSpPr>
+          <p:cNvPr id="2" name="Slide Image Placeholder 1"/>
+          <p:cNvSpPr>
+            <a:spLocks noGrp="1" noRot="1" noChangeAspect="1"/>
+          </p:cNvSpPr>
+          <p:nvPr>
+            <p:ph type="sldImg"/>
+          </p:nvPr>
+        </p:nvSpPr>
+        <p:spPr/>
+      </p:sp>
+      <p:sp>
+        <p:nvSpPr>
+          <p:cNvPr id="3" name="Notes Placeholder 2"/>
+          <p:cNvSpPr>
+            <a:spLocks noGrp="1"/>
+          </p:cNvSpPr>
+          <p:nvPr>
+            <p:ph type="body" idx="1"/>
+          </p:nvPr>
+        </p:nvSpPr>
+        <p:spPr/>
+        <p:txBody>
+          <a:bodyPr>
+            <a:normAutofit/>
+          </a:bodyPr>
+          <a:lstStyle/>
+          <a:p>
+            <a:r>
+              <a:rPr lang="en-US" dirty="0" smtClean="0"/>
+              <a:t>Summarize presentation content by restating the important points from the lessons.</a:t>
+            </a:r>
+          </a:p>
+          <a:p>
+            <a:r>
+              <a:rPr lang="en-US" dirty="0" smtClean="0"/>
+              <a:t>What do you want the audience to remember when they leave your presentation?</a:t>
+            </a:r>
+          </a:p>
+          <a:p>
+            <a:endParaRPr lang="en-US" dirty="0" smtClean="0"/>
+          </a:p>
+          <a:p>
+            <a:r>
+              <a:rPr lang="en-US" dirty="0" smtClean="0"/>
+              <a:t>Save your presentation to a video for easy distribution (To create a video, click the File tab, and then click Share.  Under File Types, click Create a Video.)</a:t>
+            </a:r>
+            <a:endParaRPr lang="en-US" dirty="0"/>
+          </a:p>
+        </p:txBody>
+      </p:sp>
+      <p:sp>
+        <p:nvSpPr>
+          <p:cNvPr id="4" name="Slide Number Placeholder 3"/>
+          <p:cNvSpPr>
+            <a:spLocks noGrp="1"/>
+          </p:cNvSpPr>
+          <p:nvPr>
+            <p:ph type="sldNum" sz="quarter" idx="10"/>
+          </p:nvPr>
+        </p:nvSpPr>
+        <p:spPr/>
+        <p:txBody>
+          <a:bodyPr/>
+          <a:lstStyle/>
+          <a:p>
+            <a:fld id="{EC6EAC7D-5A89-47C2-8ABA-56C9C2DEF7A4}" type="slidenum">
+              <a:rPr lang="en-US" smtClean="0"/>
+              <a:pPr/>
+              <a:t>41</a:t>
+            </a:fld>
+            <a:endParaRPr lang="en-US" dirty="0"/>
+          </a:p>
+        </p:txBody>
+      </p:sp>
+    </p:spTree>
+  </p:cSld>
+  <p:clrMapOvr>
+    <a:masterClrMapping/>
+  </p:clrMapOvr>
+</p:notes>
+</file>
+
+<file path=ppt/notesSlides/notesSlide32.xml><?xml version="1.0" encoding="utf-8"?>
+<p:notes xmlns:a="http://schemas.openxmlformats.org/drawingml/2006/main" xmlns:r="http://schemas.openxmlformats.org/officeDocument/2006/relationships" xmlns:p="http://schemas.openxmlformats.org/presentationml/2006/main">
+  <p:cSld>
+    <p:spTree>
+      <p:nvGrpSpPr>
+        <p:cNvPr id="1" name=""/>
+        <p:cNvGrpSpPr/>
+        <p:nvPr/>
+      </p:nvGrpSpPr>
+      <p:grpSpPr>
+        <a:xfrm>
+          <a:off x="0" y="0"/>
+          <a:ext cx="0" cy="0"/>
+          <a:chOff x="0" y="0"/>
+          <a:chExt cx="0" cy="0"/>
+        </a:xfrm>
+      </p:grpSpPr>
+      <p:sp>
+        <p:nvSpPr>
+          <p:cNvPr id="40962" name="Rectangle 23"/>
+          <p:cNvSpPr>
+            <a:spLocks noGrp="1" noChangeArrowheads="1"/>
+          </p:cNvSpPr>
+          <p:nvPr>
+            <p:ph type="hdr" sz="quarter"/>
+          </p:nvPr>
+        </p:nvSpPr>
+        <p:spPr>
+          <a:noFill/>
+        </p:spPr>
+        <p:txBody>
+          <a:bodyPr/>
+          <a:lstStyle/>
+          <a:p>
+            <a:r>
+              <a:rPr lang="en-US" dirty="0" smtClean="0"/>
+              <a:t>Microsoft </a:t>
+            </a:r>
+            <a:r>
+              <a:rPr lang="en-US" b="1" dirty="0" smtClean="0"/>
+              <a:t>Engineering Excellence</a:t>
+            </a:r>
+            <a:endParaRPr lang="en-US" dirty="0" smtClean="0"/>
+          </a:p>
+        </p:txBody>
+      </p:sp>
+      <p:sp>
+        <p:nvSpPr>
+          <p:cNvPr id="40963" name="Rectangle 25"/>
+          <p:cNvSpPr>
+            <a:spLocks noGrp="1" noChangeArrowheads="1"/>
+          </p:cNvSpPr>
+          <p:nvPr>
+            <p:ph type="ftr" sz="quarter" idx="4"/>
+          </p:nvPr>
+        </p:nvSpPr>
+        <p:spPr>
+          <a:noFill/>
+        </p:spPr>
+        <p:txBody>
+          <a:bodyPr/>
+          <a:lstStyle/>
+          <a:p>
+            <a:r>
+              <a:rPr lang="en-US" dirty="0" smtClean="0"/>
+              <a:t>Microsoft Confidential</a:t>
+            </a:r>
+          </a:p>
+        </p:txBody>
+      </p:sp>
+      <p:sp>
+        <p:nvSpPr>
+          <p:cNvPr id="40964" name="Rectangle 26"/>
+          <p:cNvSpPr>
+            <a:spLocks noGrp="1" noChangeArrowheads="1"/>
+          </p:cNvSpPr>
+          <p:nvPr>
+            <p:ph type="sldNum" sz="quarter" idx="5"/>
+          </p:nvPr>
+        </p:nvSpPr>
+        <p:spPr>
+          <a:noFill/>
+        </p:spPr>
+        <p:txBody>
+          <a:bodyPr/>
+          <a:lstStyle/>
+          <a:p>
+            <a:fld id="{85CEDE57-F8FE-4B43-B511-2E9F76624F74}" type="slidenum">
+              <a:rPr lang="en-US" smtClean="0"/>
+              <a:pPr/>
+              <a:t>42</a:t>
+            </a:fld>
+            <a:endParaRPr lang="en-US" dirty="0" smtClean="0"/>
+          </a:p>
+        </p:txBody>
+      </p:sp>
+      <p:sp>
+        <p:nvSpPr>
+          <p:cNvPr id="40965" name="Rectangle 2"/>
+          <p:cNvSpPr>
+            <a:spLocks noGrp="1" noRot="1" noChangeAspect="1" noChangeArrowheads="1" noTextEdit="1"/>
+          </p:cNvSpPr>
+          <p:nvPr>
+            <p:ph type="sldImg"/>
+          </p:nvPr>
+        </p:nvSpPr>
+        <p:spPr>
+          <a:xfrm>
+            <a:off x="1157288" y="449263"/>
+            <a:ext cx="4541837" cy="3408362"/>
+          </a:xfrm>
+          <a:ln/>
+        </p:spPr>
+      </p:sp>
+      <p:sp>
+        <p:nvSpPr>
+          <p:cNvPr id="40966" name="Rectangle 3"/>
+          <p:cNvSpPr>
+            <a:spLocks noGrp="1" noChangeArrowheads="1"/>
+          </p:cNvSpPr>
+          <p:nvPr>
+            <p:ph type="body" idx="1"/>
+          </p:nvPr>
+        </p:nvSpPr>
+        <p:spPr>
+          <a:xfrm>
+            <a:off x="307492" y="4139472"/>
+            <a:ext cx="6261652" cy="4593861"/>
+          </a:xfrm>
+          <a:noFill/>
+          <a:ln/>
+        </p:spPr>
+        <p:txBody>
+          <a:bodyPr/>
+          <a:lstStyle/>
+          <a:p>
+            <a:pPr>
+              <a:buFontTx/>
+              <a:buNone/>
+            </a:pPr>
+            <a:endParaRPr lang="en-US" dirty="0" smtClean="0"/>
+          </a:p>
+        </p:txBody>
+      </p:sp>
+    </p:spTree>
+  </p:cSld>
+  <p:clrMapOvr>
+    <a:masterClrMapping/>
+  </p:clrMapOvr>
+</p:notes>
+</file>
+
+<file path=ppt/notesSlides/notesSlide33.xml><?xml version="1.0" encoding="utf-8"?>
+<p:notes xmlns:a="http://schemas.openxmlformats.org/drawingml/2006/main" xmlns:r="http://schemas.openxmlformats.org/officeDocument/2006/relationships" xmlns:p="http://schemas.openxmlformats.org/presentationml/2006/main">
+  <p:cSld>
+    <p:spTree>
+      <p:nvGrpSpPr>
+        <p:cNvPr id="1" name=""/>
+        <p:cNvGrpSpPr/>
+        <p:nvPr/>
+      </p:nvGrpSpPr>
+      <p:grpSpPr>
+        <a:xfrm>
+          <a:off x="0" y="0"/>
+          <a:ext cx="0" cy="0"/>
+          <a:chOff x="0" y="0"/>
+          <a:chExt cx="0" cy="0"/>
+        </a:xfrm>
+      </p:grpSpPr>
+      <p:sp>
+        <p:nvSpPr>
+          <p:cNvPr id="41986" name="Rectangle 23"/>
+          <p:cNvSpPr>
+            <a:spLocks noGrp="1" noChangeArrowheads="1"/>
+          </p:cNvSpPr>
+          <p:nvPr>
+            <p:ph type="hdr" sz="quarter"/>
+          </p:nvPr>
+        </p:nvSpPr>
+        <p:spPr>
+          <a:noFill/>
+        </p:spPr>
+        <p:txBody>
+          <a:bodyPr/>
+          <a:lstStyle/>
+          <a:p>
+            <a:r>
+              <a:rPr lang="en-US" dirty="0" smtClean="0"/>
+              <a:t>Microsoft </a:t>
+            </a:r>
+            <a:r>
+              <a:rPr lang="en-US" b="1" dirty="0" smtClean="0"/>
+              <a:t>Engineering Excellence</a:t>
+            </a:r>
+            <a:endParaRPr lang="en-US" dirty="0" smtClean="0"/>
+          </a:p>
+        </p:txBody>
+      </p:sp>
+      <p:sp>
+        <p:nvSpPr>
+          <p:cNvPr id="41987" name="Rectangle 25"/>
+          <p:cNvSpPr>
+            <a:spLocks noGrp="1" noChangeArrowheads="1"/>
+          </p:cNvSpPr>
+          <p:nvPr>
+            <p:ph type="ftr" sz="quarter" idx="4"/>
+          </p:nvPr>
+        </p:nvSpPr>
+        <p:spPr>
+          <a:noFill/>
+        </p:spPr>
+        <p:txBody>
+          <a:bodyPr/>
+          <a:lstStyle/>
+          <a:p>
+            <a:r>
+              <a:rPr lang="en-US" dirty="0" smtClean="0"/>
+              <a:t>Microsoft Confidential</a:t>
+            </a:r>
+          </a:p>
+        </p:txBody>
+      </p:sp>
+      <p:sp>
+        <p:nvSpPr>
+          <p:cNvPr id="41988" name="Rectangle 26"/>
+          <p:cNvSpPr>
+            <a:spLocks noGrp="1" noChangeArrowheads="1"/>
+          </p:cNvSpPr>
+          <p:nvPr>
+            <p:ph type="sldNum" sz="quarter" idx="5"/>
+          </p:nvPr>
+        </p:nvSpPr>
+        <p:spPr>
+          <a:noFill/>
+        </p:spPr>
+        <p:txBody>
+          <a:bodyPr/>
+          <a:lstStyle/>
+          <a:p>
+            <a:fld id="{B2B44A5F-6CE4-493C-A0D7-6834FF76660C}" type="slidenum">
+              <a:rPr lang="en-US" smtClean="0"/>
+              <a:pPr/>
+              <a:t>43</a:t>
+            </a:fld>
+            <a:endParaRPr lang="en-US" dirty="0" smtClean="0"/>
+          </a:p>
+        </p:txBody>
+      </p:sp>
+      <p:sp>
+        <p:nvSpPr>
+          <p:cNvPr id="41989" name="Rectangle 2"/>
+          <p:cNvSpPr>
+            <a:spLocks noGrp="1" noRot="1" noChangeAspect="1" noChangeArrowheads="1" noTextEdit="1"/>
+          </p:cNvSpPr>
+          <p:nvPr>
+            <p:ph type="sldImg"/>
+          </p:nvPr>
+        </p:nvSpPr>
+        <p:spPr>
+          <a:xfrm>
+            <a:off x="1143000" y="450850"/>
+            <a:ext cx="4572000" cy="3429000"/>
+          </a:xfrm>
+          <a:ln/>
+        </p:spPr>
+      </p:sp>
+      <p:sp>
+        <p:nvSpPr>
+          <p:cNvPr id="41990" name="Rectangle 3"/>
+          <p:cNvSpPr>
+            <a:spLocks noGrp="1" noChangeArrowheads="1"/>
+          </p:cNvSpPr>
+          <p:nvPr>
+            <p:ph type="body" idx="1"/>
+          </p:nvPr>
+        </p:nvSpPr>
+        <p:spPr>
+          <a:xfrm>
+            <a:off x="307492" y="4130104"/>
+            <a:ext cx="6261652" cy="4554823"/>
+          </a:xfrm>
+          <a:noFill/>
+          <a:ln/>
+        </p:spPr>
+        <p:txBody>
+          <a:bodyPr/>
+          <a:lstStyle/>
+          <a:p>
+            <a:pPr>
+              <a:buFontTx/>
+              <a:buNone/>
+            </a:pPr>
+            <a:endParaRPr lang="en-US" dirty="0" smtClean="0"/>
           </a:p>
         </p:txBody>
       </p:sp>
@@ -5208,7 +8099,20 @@
             </a:r>
             <a:r>
               <a:rPr lang="en-US" baseline="0" dirty="0" smtClean="0"/>
-              <a:t> test runner, you can go to the exact assert that failed.</a:t>
+              <a:t> test runner, you can go to the exact assert that failed</a:t>
+            </a:r>
+            <a:r>
+              <a:rPr lang="en-US" baseline="0" dirty="0" smtClean="0"/>
+              <a:t>.</a:t>
+            </a:r>
+          </a:p>
+          <a:p>
+            <a:endParaRPr lang="en-US" baseline="0" dirty="0" smtClean="0"/>
+          </a:p>
+          <a:p>
+            <a:r>
+              <a:rPr lang="en-US" baseline="0" dirty="0" smtClean="0"/>
+              <a:t>If an Assert is not clear, it is a good idea to provide a message when the test fails. This is just a parameter.</a:t>
             </a:r>
             <a:endParaRPr lang="en-US" dirty="0"/>
           </a:p>
@@ -5297,11 +8201,29 @@
           <a:p>
             <a:r>
               <a:rPr lang="en-US" dirty="0" smtClean="0"/>
-              <a:t>These</a:t>
+              <a:t>Repository test where a null value is allowed for a</a:t>
             </a:r>
             <a:r>
               <a:rPr lang="en-US" baseline="0" dirty="0" smtClean="0"/>
-              <a:t> tests both check that the attributes are as expected and that the public methods have not been added or removed.</a:t>
+              <a:t> string</a:t>
+            </a:r>
+          </a:p>
+          <a:p>
+            <a:r>
+              <a:rPr lang="en-US" baseline="0" dirty="0" err="1" smtClean="0"/>
+              <a:t>GetValid</a:t>
+            </a:r>
+            <a:r>
+              <a:rPr lang="en-US" baseline="0" dirty="0" smtClean="0"/>
+              <a:t> calls </a:t>
+            </a:r>
+            <a:r>
+              <a:rPr lang="en-US" baseline="0" dirty="0" err="1" smtClean="0"/>
+              <a:t>CreateValidEntity</a:t>
+            </a:r>
+            <a:r>
+              <a:rPr lang="en-US" baseline="0" dirty="0" smtClean="0"/>
+              <a:t> and then sets any related entities</a:t>
             </a:r>
             <a:endParaRPr lang="en-US" dirty="0"/>
           </a:p>
@@ -5325,7 +8247,7 @@
             <a:fld id="{75693FD4-8F83-4EF7-AC3F-0DC0388986B0}" type="slidenum">
               <a:rPr lang="en-US" smtClean="0"/>
               <a:pPr/>
-              <a:t>15</a:t>
+              <a:t>5</a:t>
             </a:fld>
             <a:endParaRPr lang="en-US" dirty="0"/>
           </a:p>
@@ -5334,7 +8256,7 @@
     </p:spTree>
     <p:extLst>
       <p:ext uri="{BB962C8B-B14F-4D97-AF65-F5344CB8AC3E}">
-        <p14:creationId xmlns:p14="http://schemas.microsoft.com/office/powerpoint/2010/main" val="2337724366"/>
+        <p14:creationId xmlns:p14="http://schemas.microsoft.com/office/powerpoint/2010/main" val="3336578028"/>
       </p:ext>
     </p:extLst>
   </p:cSld>
@@ -5385,59 +8307,82 @@
         </p:nvSpPr>
         <p:spPr/>
         <p:txBody>
-          <a:bodyPr>
-            <a:normAutofit/>
-          </a:bodyPr>
-          <a:lstStyle/>
-          <a:p>
-            <a:r>
-              <a:rPr lang="en-US" dirty="0" smtClean="0"/>
-              <a:t>Summarize presentation content by restating the important points from the lessons.</a:t>
-            </a:r>
-          </a:p>
-          <a:p>
-            <a:r>
-              <a:rPr lang="en-US" dirty="0" smtClean="0"/>
-              <a:t>What do you want the audience to remember when they leave your presentation?</a:t>
-            </a:r>
-          </a:p>
-          <a:p>
-            <a:endParaRPr lang="en-US" dirty="0" smtClean="0"/>
-          </a:p>
-          <a:p>
-            <a:r>
-              <a:rPr lang="en-US" dirty="0" smtClean="0"/>
-              <a:t>Save your presentation to a video for easy distribution (To create a video, click the File tab, and then click Share.  Under File Types, click Create a Video.)</a:t>
-            </a:r>
-            <a:endParaRPr lang="en-US" dirty="0"/>
-          </a:p>
-        </p:txBody>
-      </p:sp>
-      <p:sp>
-        <p:nvSpPr>
-          <p:cNvPr id="4" name="Slide Number Placeholder 3"/>
-          <p:cNvSpPr>
-            <a:spLocks noGrp="1"/>
-          </p:cNvSpPr>
-          <p:nvPr>
-            <p:ph type="sldNum" sz="quarter" idx="10"/>
-          </p:nvPr>
-        </p:nvSpPr>
-        <p:spPr/>
-        <p:txBody>
           <a:bodyPr/>
           <a:lstStyle/>
           <a:p>
-            <a:fld id="{EC6EAC7D-5A89-47C2-8ABA-56C9C2DEF7A4}" type="slidenum">
+            <a:r>
+              <a:rPr lang="en-US" dirty="0" smtClean="0"/>
+              <a:t>We want an exception.</a:t>
+            </a:r>
+          </a:p>
+          <a:p>
+            <a:r>
+              <a:rPr lang="en-US" dirty="0" smtClean="0"/>
+              <a:t>We</a:t>
+            </a:r>
+            <a:r>
+              <a:rPr lang="en-US" baseline="0" dirty="0" smtClean="0"/>
+              <a:t> don’t want a different exception to be triggered. Another way to do this is to set a </a:t>
+            </a:r>
+            <a:r>
+              <a:rPr lang="en-US" baseline="0" dirty="0" err="1" smtClean="0"/>
+              <a:t>bool</a:t>
+            </a:r>
+            <a:r>
+              <a:rPr lang="en-US" baseline="0" dirty="0" smtClean="0"/>
+              <a:t> outside the try-catch to false, set it to true just before we expect the exception, then assert in the catch that it is true</a:t>
+            </a:r>
+          </a:p>
+          <a:p>
+            <a:endParaRPr lang="en-US" baseline="0" dirty="0" smtClean="0"/>
+          </a:p>
+          <a:p>
+            <a:r>
+              <a:rPr lang="en-US" baseline="0" dirty="0" smtClean="0"/>
+              <a:t>Proposal is a related table that has the [</a:t>
+            </a:r>
+            <a:r>
+              <a:rPr lang="en-US" baseline="0" dirty="0" err="1" smtClean="0"/>
+              <a:t>NotNull</a:t>
+            </a:r>
+            <a:r>
+              <a:rPr lang="en-US" baseline="0" dirty="0" smtClean="0"/>
+              <a:t>] attribute</a:t>
+            </a:r>
+            <a:endParaRPr lang="en-US" dirty="0"/>
+          </a:p>
+        </p:txBody>
+      </p:sp>
+      <p:sp>
+        <p:nvSpPr>
+          <p:cNvPr id="4" name="Slide Number Placeholder 3"/>
+          <p:cNvSpPr>
+            <a:spLocks noGrp="1"/>
+          </p:cNvSpPr>
+          <p:nvPr>
+            <p:ph type="sldNum" sz="quarter" idx="10"/>
+          </p:nvPr>
+        </p:nvSpPr>
+        <p:spPr/>
+        <p:txBody>
+          <a:bodyPr/>
+          <a:lstStyle/>
+          <a:p>
+            <a:fld id="{75693FD4-8F83-4EF7-AC3F-0DC0388986B0}" type="slidenum">
               <a:rPr lang="en-US" smtClean="0"/>
               <a:pPr/>
-              <a:t>41</a:t>
+              <a:t>6</a:t>
             </a:fld>
             <a:endParaRPr lang="en-US" dirty="0"/>
           </a:p>
         </p:txBody>
       </p:sp>
     </p:spTree>
+    <p:extLst>
+      <p:ext uri="{BB962C8B-B14F-4D97-AF65-F5344CB8AC3E}">
+        <p14:creationId xmlns:p14="http://schemas.microsoft.com/office/powerpoint/2010/main" val="3931100723"/>
+      </p:ext>
+    </p:extLst>
   </p:cSld>
   <p:clrMapOvr>
     <a:masterClrMapping/>
@@ -5464,132 +8409,73 @@
       </p:grpSpPr>
       <p:sp>
         <p:nvSpPr>
-          <p:cNvPr id="40962" name="Rectangle 23"/>
-          <p:cNvSpPr>
-            <a:spLocks noGrp="1" noChangeArrowheads="1"/>
-          </p:cNvSpPr>
-          <p:nvPr>
-            <p:ph type="hdr" sz="quarter"/>
-          </p:nvPr>
-        </p:nvSpPr>
-        <p:spPr>
-          <a:noFill/>
-        </p:spPr>
+          <p:cNvPr id="2" name="Slide Image Placeholder 1"/>
+          <p:cNvSpPr>
+            <a:spLocks noGrp="1" noRot="1" noChangeAspect="1"/>
+          </p:cNvSpPr>
+          <p:nvPr>
+            <p:ph type="sldImg"/>
+          </p:nvPr>
+        </p:nvSpPr>
+        <p:spPr/>
+      </p:sp>
+      <p:sp>
+        <p:nvSpPr>
+          <p:cNvPr id="3" name="Notes Placeholder 2"/>
+          <p:cNvSpPr>
+            <a:spLocks noGrp="1"/>
+          </p:cNvSpPr>
+          <p:nvPr>
+            <p:ph type="body" idx="1"/>
+          </p:nvPr>
+        </p:nvSpPr>
+        <p:spPr/>
         <p:txBody>
           <a:bodyPr/>
           <a:lstStyle/>
           <a:p>
             <a:r>
               <a:rPr lang="en-US" dirty="0" smtClean="0"/>
-              <a:t>Microsoft </a:t>
-            </a:r>
-            <a:r>
-              <a:rPr lang="en-US" b="1" dirty="0" smtClean="0"/>
-              <a:t>Engineering Excellence</a:t>
-            </a:r>
-            <a:endParaRPr lang="en-US" dirty="0" smtClean="0"/>
-          </a:p>
-        </p:txBody>
-      </p:sp>
-      <p:sp>
-        <p:nvSpPr>
-          <p:cNvPr id="40963" name="Rectangle 25"/>
-          <p:cNvSpPr>
-            <a:spLocks noGrp="1" noChangeArrowheads="1"/>
-          </p:cNvSpPr>
-          <p:nvPr>
-            <p:ph type="ftr" sz="quarter" idx="4"/>
-          </p:nvPr>
-        </p:nvSpPr>
-        <p:spPr>
-          <a:noFill/>
-        </p:spPr>
+              <a:t>Here</a:t>
+            </a:r>
+            <a:r>
+              <a:rPr lang="en-US" baseline="0" dirty="0" smtClean="0"/>
+              <a:t> the proposal is not null, but it isn’t saved and we don’t have the cascade set in the mapping</a:t>
+            </a:r>
+            <a:endParaRPr lang="en-US" dirty="0"/>
+          </a:p>
+        </p:txBody>
+      </p:sp>
+      <p:sp>
+        <p:nvSpPr>
+          <p:cNvPr id="4" name="Slide Number Placeholder 3"/>
+          <p:cNvSpPr>
+            <a:spLocks noGrp="1"/>
+          </p:cNvSpPr>
+          <p:nvPr>
+            <p:ph type="sldNum" sz="quarter" idx="10"/>
+          </p:nvPr>
+        </p:nvSpPr>
+        <p:spPr/>
         <p:txBody>
           <a:bodyPr/>
           <a:lstStyle/>
           <a:p>
-            <a:r>
-              <a:rPr lang="en-US" dirty="0" smtClean="0"/>
-              <a:t>Microsoft Confidential</a:t>
-            </a:r>
-          </a:p>
-        </p:txBody>
-      </p:sp>
-      <p:sp>
-        <p:nvSpPr>
-          <p:cNvPr id="40964" name="Rectangle 26"/>
-          <p:cNvSpPr>
-            <a:spLocks noGrp="1" noChangeArrowheads="1"/>
-          </p:cNvSpPr>
-          <p:nvPr>
-            <p:ph type="sldNum" sz="quarter" idx="5"/>
-          </p:nvPr>
-        </p:nvSpPr>
-        <p:spPr>
-          <a:noFill/>
-        </p:spPr>
-        <p:txBody>
-          <a:bodyPr/>
-          <a:lstStyle/>
-          <a:p>
-            <a:fld id="{85CEDE57-F8FE-4B43-B511-2E9F76624F74}" type="slidenum">
+            <a:fld id="{75693FD4-8F83-4EF7-AC3F-0DC0388986B0}" type="slidenum">
               <a:rPr lang="en-US" smtClean="0"/>
               <a:pPr/>
-              <a:t>42</a:t>
+              <a:t>7</a:t>
             </a:fld>
-            <a:endParaRPr lang="en-US" dirty="0" smtClean="0"/>
-          </a:p>
-        </p:txBody>
-      </p:sp>
-      <p:sp>
-        <p:nvSpPr>
-          <p:cNvPr id="40965" name="Rectangle 2"/>
-          <p:cNvSpPr>
-            <a:spLocks noGrp="1" noRot="1" noChangeAspect="1" noChangeArrowheads="1" noTextEdit="1"/>
-          </p:cNvSpPr>
-          <p:nvPr>
-            <p:ph type="sldImg"/>
-          </p:nvPr>
-        </p:nvSpPr>
-        <p:spPr>
-          <a:xfrm>
-            <a:off x="1157288" y="449263"/>
-            <a:ext cx="4541837" cy="3408362"/>
-          </a:xfrm>
-          <a:ln/>
-        </p:spPr>
-      </p:sp>
-      <p:sp>
-        <p:nvSpPr>
-          <p:cNvPr id="40966" name="Rectangle 3"/>
-          <p:cNvSpPr>
-            <a:spLocks noGrp="1" noChangeArrowheads="1"/>
-          </p:cNvSpPr>
-          <p:nvPr>
-            <p:ph type="body" idx="1"/>
-          </p:nvPr>
-        </p:nvSpPr>
-        <p:spPr>
-          <a:xfrm>
-            <a:off x="307492" y="4139472"/>
-            <a:ext cx="6261652" cy="4593861"/>
-          </a:xfrm>
-          <a:noFill/>
-          <a:ln/>
-        </p:spPr>
-        <p:txBody>
-          <a:bodyPr/>
-          <a:lstStyle/>
-          <a:p>
-            <a:pPr>
-              <a:buFontTx/>
-              <a:buNone/>
-            </a:pPr>
-            <a:endParaRPr lang="en-US" dirty="0" smtClean="0"/>
+            <a:endParaRPr lang="en-US" dirty="0"/>
           </a:p>
         </p:txBody>
       </p:sp>
     </p:spTree>
+    <p:extLst>
+      <p:ext uri="{BB962C8B-B14F-4D97-AF65-F5344CB8AC3E}">
+        <p14:creationId xmlns:p14="http://schemas.microsoft.com/office/powerpoint/2010/main" val="737804568"/>
+      </p:ext>
+    </p:extLst>
   </p:cSld>
   <p:clrMapOvr>
     <a:masterClrMapping/>
@@ -5616,132 +8502,176 @@
       </p:grpSpPr>
       <p:sp>
         <p:nvSpPr>
-          <p:cNvPr id="41986" name="Rectangle 23"/>
-          <p:cNvSpPr>
-            <a:spLocks noGrp="1" noChangeArrowheads="1"/>
-          </p:cNvSpPr>
-          <p:nvPr>
-            <p:ph type="hdr" sz="quarter"/>
-          </p:nvPr>
-        </p:nvSpPr>
-        <p:spPr>
-          <a:noFill/>
-        </p:spPr>
+          <p:cNvPr id="2" name="Slide Image Placeholder 1"/>
+          <p:cNvSpPr>
+            <a:spLocks noGrp="1" noRot="1" noChangeAspect="1"/>
+          </p:cNvSpPr>
+          <p:nvPr>
+            <p:ph type="sldImg"/>
+          </p:nvPr>
+        </p:nvSpPr>
+        <p:spPr/>
+      </p:sp>
+      <p:sp>
+        <p:nvSpPr>
+          <p:cNvPr id="3" name="Notes Placeholder 2"/>
+          <p:cNvSpPr>
+            <a:spLocks noGrp="1"/>
+          </p:cNvSpPr>
+          <p:nvPr>
+            <p:ph type="body" idx="1"/>
+          </p:nvPr>
+        </p:nvSpPr>
+        <p:spPr/>
         <p:txBody>
           <a:bodyPr/>
           <a:lstStyle/>
           <a:p>
             <a:r>
               <a:rPr lang="en-US" dirty="0" smtClean="0"/>
-              <a:t>Microsoft </a:t>
-            </a:r>
-            <a:r>
-              <a:rPr lang="en-US" b="1" dirty="0" smtClean="0"/>
-              <a:t>Engineering Excellence</a:t>
-            </a:r>
-            <a:endParaRPr lang="en-US" dirty="0" smtClean="0"/>
-          </a:p>
-        </p:txBody>
-      </p:sp>
-      <p:sp>
-        <p:nvSpPr>
-          <p:cNvPr id="41987" name="Rectangle 25"/>
-          <p:cNvSpPr>
-            <a:spLocks noGrp="1" noChangeArrowheads="1"/>
-          </p:cNvSpPr>
-          <p:nvPr>
-            <p:ph type="ftr" sz="quarter" idx="4"/>
-          </p:nvPr>
-        </p:nvSpPr>
-        <p:spPr>
-          <a:noFill/>
-        </p:spPr>
+              <a:t>3 main types of tests.</a:t>
+            </a:r>
+            <a:endParaRPr lang="en-US" dirty="0"/>
+          </a:p>
+        </p:txBody>
+      </p:sp>
+      <p:sp>
+        <p:nvSpPr>
+          <p:cNvPr id="4" name="Slide Number Placeholder 3"/>
+          <p:cNvSpPr>
+            <a:spLocks noGrp="1"/>
+          </p:cNvSpPr>
+          <p:nvPr>
+            <p:ph type="sldNum" sz="quarter" idx="10"/>
+          </p:nvPr>
+        </p:nvSpPr>
+        <p:spPr/>
         <p:txBody>
           <a:bodyPr/>
           <a:lstStyle/>
           <a:p>
-            <a:r>
-              <a:rPr lang="en-US" dirty="0" smtClean="0"/>
-              <a:t>Microsoft Confidential</a:t>
-            </a:r>
-          </a:p>
-        </p:txBody>
-      </p:sp>
-      <p:sp>
-        <p:nvSpPr>
-          <p:cNvPr id="41988" name="Rectangle 26"/>
-          <p:cNvSpPr>
-            <a:spLocks noGrp="1" noChangeArrowheads="1"/>
-          </p:cNvSpPr>
-          <p:nvPr>
-            <p:ph type="sldNum" sz="quarter" idx="5"/>
-          </p:nvPr>
-        </p:nvSpPr>
-        <p:spPr>
-          <a:noFill/>
-        </p:spPr>
+            <a:fld id="{75693FD4-8F83-4EF7-AC3F-0DC0388986B0}" type="slidenum">
+              <a:rPr lang="en-US" smtClean="0"/>
+              <a:pPr/>
+              <a:t>9</a:t>
+            </a:fld>
+            <a:endParaRPr lang="en-US" dirty="0"/>
+          </a:p>
+        </p:txBody>
+      </p:sp>
+    </p:spTree>
+    <p:extLst>
+      <p:ext uri="{BB962C8B-B14F-4D97-AF65-F5344CB8AC3E}">
+        <p14:creationId xmlns:p14="http://schemas.microsoft.com/office/powerpoint/2010/main" val="337182817"/>
+      </p:ext>
+    </p:extLst>
+  </p:cSld>
+  <p:clrMapOvr>
+    <a:masterClrMapping/>
+  </p:clrMapOvr>
+</p:notes>
+</file>
+
+<file path=ppt/notesSlides/notesSlide9.xml><?xml version="1.0" encoding="utf-8"?>
+<p:notes xmlns:a="http://schemas.openxmlformats.org/drawingml/2006/main" xmlns:r="http://schemas.openxmlformats.org/officeDocument/2006/relationships" xmlns:p="http://schemas.openxmlformats.org/presentationml/2006/main">
+  <p:cSld>
+    <p:spTree>
+      <p:nvGrpSpPr>
+        <p:cNvPr id="1" name=""/>
+        <p:cNvGrpSpPr/>
+        <p:nvPr/>
+      </p:nvGrpSpPr>
+      <p:grpSpPr>
+        <a:xfrm>
+          <a:off x="0" y="0"/>
+          <a:ext cx="0" cy="0"/>
+          <a:chOff x="0" y="0"/>
+          <a:chExt cx="0" cy="0"/>
+        </a:xfrm>
+      </p:grpSpPr>
+      <p:sp>
+        <p:nvSpPr>
+          <p:cNvPr id="2" name="Slide Image Placeholder 1"/>
+          <p:cNvSpPr>
+            <a:spLocks noGrp="1" noRot="1" noChangeAspect="1"/>
+          </p:cNvSpPr>
+          <p:nvPr>
+            <p:ph type="sldImg"/>
+          </p:nvPr>
+        </p:nvSpPr>
+        <p:spPr/>
+      </p:sp>
+      <p:sp>
+        <p:nvSpPr>
+          <p:cNvPr id="3" name="Notes Placeholder 2"/>
+          <p:cNvSpPr>
+            <a:spLocks noGrp="1"/>
+          </p:cNvSpPr>
+          <p:nvPr>
+            <p:ph type="body" idx="1"/>
+          </p:nvPr>
+        </p:nvSpPr>
+        <p:spPr/>
         <p:txBody>
           <a:bodyPr/>
           <a:lstStyle/>
           <a:p>
-            <a:fld id="{B2B44A5F-6CE4-493C-A0D7-6834FF76660C}" type="slidenum">
+            <a:r>
+              <a:rPr lang="en-US" dirty="0" smtClean="0"/>
+              <a:t>Creating the database and all that magic is done by using </a:t>
+            </a:r>
+            <a:r>
+              <a:rPr lang="en-US" dirty="0" err="1" smtClean="0"/>
+              <a:t>UCDarch’s</a:t>
+            </a:r>
+            <a:r>
+              <a:rPr lang="en-US" dirty="0" smtClean="0"/>
+              <a:t> base class.</a:t>
+            </a:r>
+          </a:p>
+          <a:p>
+            <a:r>
+              <a:rPr lang="en-US" dirty="0" smtClean="0"/>
+              <a:t>There is</a:t>
+            </a:r>
+            <a:r>
+              <a:rPr lang="en-US" baseline="0" dirty="0" smtClean="0"/>
+              <a:t> also a base class that doesn’t use the fluent mapping, but we are moving away from that way of mapping</a:t>
+            </a:r>
+            <a:endParaRPr lang="en-US" dirty="0"/>
+          </a:p>
+        </p:txBody>
+      </p:sp>
+      <p:sp>
+        <p:nvSpPr>
+          <p:cNvPr id="4" name="Slide Number Placeholder 3"/>
+          <p:cNvSpPr>
+            <a:spLocks noGrp="1"/>
+          </p:cNvSpPr>
+          <p:nvPr>
+            <p:ph type="sldNum" sz="quarter" idx="10"/>
+          </p:nvPr>
+        </p:nvSpPr>
+        <p:spPr/>
+        <p:txBody>
+          <a:bodyPr/>
+          <a:lstStyle/>
+          <a:p>
+            <a:fld id="{75693FD4-8F83-4EF7-AC3F-0DC0388986B0}" type="slidenum">
               <a:rPr lang="en-US" smtClean="0"/>
               <a:pPr/>
-              <a:t>43</a:t>
+              <a:t>10</a:t>
             </a:fld>
-            <a:endParaRPr lang="en-US" dirty="0" smtClean="0"/>
-          </a:p>
-        </p:txBody>
-      </p:sp>
-      <p:sp>
-        <p:nvSpPr>
-          <p:cNvPr id="41989" name="Rectangle 2"/>
-          <p:cNvSpPr>
-            <a:spLocks noGrp="1" noRot="1" noChangeAspect="1" noChangeArrowheads="1" noTextEdit="1"/>
-          </p:cNvSpPr>
-          <p:nvPr>
-            <p:ph type="sldImg"/>
-          </p:nvPr>
-        </p:nvSpPr>
-        <p:spPr>
-          <a:xfrm>
-            <a:off x="1143000" y="450850"/>
-            <a:ext cx="4572000" cy="3429000"/>
-          </a:xfrm>
-          <a:ln/>
-        </p:spPr>
-      </p:sp>
-      <p:sp>
-        <p:nvSpPr>
-          <p:cNvPr id="41990" name="Rectangle 3"/>
-          <p:cNvSpPr>
-            <a:spLocks noGrp="1" noChangeArrowheads="1"/>
-          </p:cNvSpPr>
-          <p:nvPr>
-            <p:ph type="body" idx="1"/>
-          </p:nvPr>
-        </p:nvSpPr>
-        <p:spPr>
-          <a:xfrm>
-            <a:off x="307492" y="4130104"/>
-            <a:ext cx="6261652" cy="4554823"/>
-          </a:xfrm>
-          <a:noFill/>
-          <a:ln/>
-        </p:spPr>
-        <p:txBody>
-          <a:bodyPr/>
-          <a:lstStyle/>
-          <a:p>
-            <a:pPr>
-              <a:buFontTx/>
-              <a:buNone/>
-            </a:pPr>
-            <a:endParaRPr lang="en-US" dirty="0" smtClean="0"/>
+            <a:endParaRPr lang="en-US" dirty="0"/>
           </a:p>
         </p:txBody>
       </p:sp>
     </p:spTree>
+    <p:extLst>
+      <p:ext uri="{BB962C8B-B14F-4D97-AF65-F5344CB8AC3E}">
+        <p14:creationId xmlns:p14="http://schemas.microsoft.com/office/powerpoint/2010/main" val="941329981"/>
+      </p:ext>
+    </p:extLst>
   </p:cSld>
   <p:clrMapOvr>
     <a:masterClrMapping/>
@@ -6217,7 +9147,7 @@
             <a:fld id="{757B281C-5159-4971-8228-52B9A72E9ED2}" type="datetimeFigureOut">
               <a:rPr lang="en-US" smtClean="0"/>
               <a:pPr/>
-              <a:t>4/12/2011</a:t>
+              <a:t>4/13/2011</a:t>
             </a:fld>
             <a:endParaRPr lang="en-US" dirty="0"/>
           </a:p>
@@ -6319,7 +9249,7 @@
             <a:fld id="{757B281C-5159-4971-8228-52B9A72E9ED2}" type="datetimeFigureOut">
               <a:rPr lang="en-US" smtClean="0"/>
               <a:pPr/>
-              <a:t>4/12/2011</a:t>
+              <a:t>4/13/2011</a:t>
             </a:fld>
             <a:endParaRPr lang="en-US" dirty="0"/>
           </a:p>
@@ -6455,7 +9385,7 @@
             <a:fld id="{757B281C-5159-4971-8228-52B9A72E9ED2}" type="datetimeFigureOut">
               <a:rPr lang="en-US" smtClean="0"/>
               <a:pPr/>
-              <a:t>4/12/2011</a:t>
+              <a:t>4/13/2011</a:t>
             </a:fld>
             <a:endParaRPr lang="en-US" dirty="0"/>
           </a:p>
@@ -6661,7 +9591,7 @@
             <a:fld id="{757B281C-5159-4971-8228-52B9A72E9ED2}" type="datetimeFigureOut">
               <a:rPr lang="en-US" smtClean="0"/>
               <a:pPr/>
-              <a:t>4/12/2011</a:t>
+              <a:t>4/13/2011</a:t>
             </a:fld>
             <a:endParaRPr lang="en-US" dirty="0"/>
           </a:p>
@@ -7060,7 +9990,7 @@
             <a:fld id="{757B281C-5159-4971-8228-52B9A72E9ED2}" type="datetimeFigureOut">
               <a:rPr lang="en-US" smtClean="0"/>
               <a:pPr/>
-              <a:t>4/12/2011</a:t>
+              <a:t>4/13/2011</a:t>
             </a:fld>
             <a:endParaRPr lang="en-US" dirty="0"/>
           </a:p>
@@ -7360,7 +10290,7 @@
             <a:fld id="{757B281C-5159-4971-8228-52B9A72E9ED2}" type="datetimeFigureOut">
               <a:rPr lang="en-US" smtClean="0"/>
               <a:pPr/>
-              <a:t>4/12/2011</a:t>
+              <a:t>4/13/2011</a:t>
             </a:fld>
             <a:endParaRPr lang="en-US" dirty="0"/>
           </a:p>
@@ -7789,7 +10719,7 @@
             <a:fld id="{757B281C-5159-4971-8228-52B9A72E9ED2}" type="datetimeFigureOut">
               <a:rPr lang="en-US" smtClean="0"/>
               <a:pPr/>
-              <a:t>4/12/2011</a:t>
+              <a:t>4/13/2011</a:t>
             </a:fld>
             <a:endParaRPr lang="en-US" dirty="0"/>
           </a:p>
@@ -8066,7 +10996,7 @@
             <a:fld id="{757B281C-5159-4971-8228-52B9A72E9ED2}" type="datetimeFigureOut">
               <a:rPr lang="en-US" smtClean="0"/>
               <a:pPr/>
-              <a:t>4/12/2011</a:t>
+              <a:t>4/13/2011</a:t>
             </a:fld>
             <a:endParaRPr lang="en-US" dirty="0"/>
           </a:p>
@@ -8330,7 +11260,7 @@
             <a:fld id="{757B281C-5159-4971-8228-52B9A72E9ED2}" type="datetimeFigureOut">
               <a:rPr lang="en-US" smtClean="0"/>
               <a:pPr/>
-              <a:t>4/12/2011</a:t>
+              <a:t>4/13/2011</a:t>
             </a:fld>
             <a:endParaRPr lang="en-US" dirty="0"/>
           </a:p>
@@ -8500,7 +11430,7 @@
             <a:fld id="{757B281C-5159-4971-8228-52B9A72E9ED2}" type="datetimeFigureOut">
               <a:rPr lang="en-US" smtClean="0"/>
               <a:pPr/>
-              <a:t>4/12/2011</a:t>
+              <a:t>4/13/2011</a:t>
             </a:fld>
             <a:endParaRPr lang="en-US" dirty="0"/>
           </a:p>
@@ -8680,7 +11610,7 @@
             <a:fld id="{757B281C-5159-4971-8228-52B9A72E9ED2}" type="datetimeFigureOut">
               <a:rPr lang="en-US" smtClean="0"/>
               <a:pPr/>
-              <a:t>4/12/2011</a:t>
+              <a:t>4/13/2011</a:t>
             </a:fld>
             <a:endParaRPr lang="en-US" dirty="0"/>
           </a:p>
@@ -8922,7 +11852,7 @@
             <a:fld id="{757B281C-5159-4971-8228-52B9A72E9ED2}" type="datetimeFigureOut">
               <a:rPr lang="en-US" smtClean="0"/>
               <a:pPr/>
-              <a:t>4/12/2011</a:t>
+              <a:t>4/13/2011</a:t>
             </a:fld>
             <a:endParaRPr lang="en-US" dirty="0"/>
           </a:p>
@@ -9636,11 +12566,15 @@
             </a:r>
             <a:r>
               <a:rPr lang="en-US" dirty="0" err="1" smtClean="0"/>
-              <a:t>resharper</a:t>
+              <a:t>Resharper</a:t>
             </a:r>
             <a:r>
               <a:rPr lang="en-US" dirty="0" smtClean="0"/>
-              <a:t> template, these are done with minimal coding)</a:t>
+              <a:t> </a:t>
+            </a:r>
+            <a:r>
+              <a:rPr lang="en-US" dirty="0" smtClean="0"/>
+              <a:t>template, these are done with minimal coding)</a:t>
             </a:r>
           </a:p>
           <a:p>
@@ -9886,7 +12820,7 @@
           <p:nvPr/>
         </p:nvPicPr>
         <p:blipFill>
-          <a:blip r:embed="rId2">
+          <a:blip r:embed="rId3">
             <a:extLst>
               <a:ext uri="{28A0092B-C50C-407E-A947-70E740481C1C}">
                 <a14:useLocalDpi xmlns:a14="http://schemas.microsoft.com/office/drawing/2010/main" val="0"/>
@@ -10013,7 +12947,7 @@
           <p:nvPr/>
         </p:nvPicPr>
         <p:blipFill>
-          <a:blip r:embed="rId2">
+          <a:blip r:embed="rId3">
             <a:extLst>
               <a:ext uri="{28A0092B-C50C-407E-A947-70E740481C1C}">
                 <a14:useLocalDpi xmlns:a14="http://schemas.microsoft.com/office/drawing/2010/main" val="0"/>
@@ -10367,7 +13301,7 @@
           <p:nvPr/>
         </p:nvPicPr>
         <p:blipFill>
-          <a:blip r:embed="rId2">
+          <a:blip r:embed="rId3">
             <a:extLst>
               <a:ext uri="{28A0092B-C50C-407E-A947-70E740481C1C}">
                 <a14:useLocalDpi xmlns:a14="http://schemas.microsoft.com/office/drawing/2010/main" val="0"/>
@@ -10639,7 +13573,7 @@
           <p:nvPr/>
         </p:nvPicPr>
         <p:blipFill>
-          <a:blip r:embed="rId2">
+          <a:blip r:embed="rId3">
             <a:extLst>
               <a:ext uri="{28A0092B-C50C-407E-A947-70E740481C1C}">
                 <a14:useLocalDpi xmlns:a14="http://schemas.microsoft.com/office/drawing/2010/main" val="0"/>
@@ -11627,7 +14561,7 @@
           <p:nvPr/>
         </p:nvPicPr>
         <p:blipFill>
-          <a:blip r:embed="rId2">
+          <a:blip r:embed="rId3">
             <a:extLst>
               <a:ext uri="{28A0092B-C50C-407E-A947-70E740481C1C}">
                 <a14:useLocalDpi xmlns:a14="http://schemas.microsoft.com/office/drawing/2010/main" val="0"/>
@@ -11691,7 +14625,7 @@
           <p:nvPr/>
         </p:nvPicPr>
         <p:blipFill>
-          <a:blip r:embed="rId3" cstate="email">
+          <a:blip r:embed="rId4" cstate="email">
             <a:extLst>
               <a:ext uri="{28A0092B-C50C-407E-A947-70E740481C1C}">
                 <a14:useLocalDpi xmlns:a14="http://schemas.microsoft.com/office/drawing/2010/main" val="0"/>
@@ -11755,7 +14689,7 @@
           <p:nvPr/>
         </p:nvPicPr>
         <p:blipFill>
-          <a:blip r:embed="rId4">
+          <a:blip r:embed="rId5">
             <a:extLst>
               <a:ext uri="{28A0092B-C50C-407E-A947-70E740481C1C}">
                 <a14:useLocalDpi xmlns:a14="http://schemas.microsoft.com/office/drawing/2010/main" val="0"/>
@@ -11882,7 +14816,7 @@
           <p:nvPr/>
         </p:nvPicPr>
         <p:blipFill>
-          <a:blip r:embed="rId2">
+          <a:blip r:embed="rId3">
             <a:extLst>
               <a:ext uri="{28A0092B-C50C-407E-A947-70E740481C1C}">
                 <a14:useLocalDpi xmlns:a14="http://schemas.microsoft.com/office/drawing/2010/main" val="0"/>
@@ -11946,7 +14880,7 @@
           <p:nvPr/>
         </p:nvPicPr>
         <p:blipFill>
-          <a:blip r:embed="rId3">
+          <a:blip r:embed="rId4">
             <a:extLst>
               <a:ext uri="{28A0092B-C50C-407E-A947-70E740481C1C}">
                 <a14:useLocalDpi xmlns:a14="http://schemas.microsoft.com/office/drawing/2010/main" val="0"/>
@@ -12077,7 +15011,7 @@
           <p:nvPr/>
         </p:nvPicPr>
         <p:blipFill>
-          <a:blip r:embed="rId2">
+          <a:blip r:embed="rId3">
             <a:extLst>
               <a:ext uri="{28A0092B-C50C-407E-A947-70E740481C1C}">
                 <a14:useLocalDpi xmlns:a14="http://schemas.microsoft.com/office/drawing/2010/main" val="0"/>
@@ -12203,7 +15137,7 @@
           <p:nvPr/>
         </p:nvPicPr>
         <p:blipFill>
-          <a:blip r:embed="rId2" cstate="email">
+          <a:blip r:embed="rId3" cstate="email">
             <a:extLst>
               <a:ext uri="{28A0092B-C50C-407E-A947-70E740481C1C}">
                 <a14:useLocalDpi xmlns:a14="http://schemas.microsoft.com/office/drawing/2010/main" val="0"/>
@@ -12267,7 +15201,7 @@
           <p:nvPr/>
         </p:nvPicPr>
         <p:blipFill>
-          <a:blip r:embed="rId3" cstate="email">
+          <a:blip r:embed="rId4" cstate="email">
             <a:extLst>
               <a:ext uri="{28A0092B-C50C-407E-A947-70E740481C1C}">
                 <a14:useLocalDpi xmlns:a14="http://schemas.microsoft.com/office/drawing/2010/main" val="0"/>
@@ -12438,6 +15372,13 @@
   <p:transition spd="slow">
     <p:wipe dir="d"/>
   </p:transition>
+  <p:timing>
+    <p:tnLst>
+      <p:par>
+        <p:cTn id="1" dur="indefinite" restart="never" nodeType="tmRoot"/>
+      </p:par>
+    </p:tnLst>
+  </p:timing>
 </p:sld>
 </file>
 
@@ -12622,6 +15563,13 @@
   <p:transition spd="slow">
     <p:wipe dir="d"/>
   </p:transition>
+  <p:timing>
+    <p:tnLst>
+      <p:par>
+        <p:cTn id="1" dur="indefinite" restart="never" nodeType="tmRoot"/>
+      </p:par>
+    </p:tnLst>
+  </p:timing>
 </p:sld>
 </file>
 
@@ -13197,6 +16145,13 @@
   <p:transition spd="slow">
     <p:wipe dir="d"/>
   </p:transition>
+  <p:timing>
+    <p:tnLst>
+      <p:par>
+        <p:cTn id="1" dur="indefinite" restart="never" nodeType="tmRoot"/>
+      </p:par>
+    </p:tnLst>
+  </p:timing>
 </p:sld>
 </file>
 
@@ -13288,6 +16243,13 @@
   <p:transition spd="slow">
     <p:wipe dir="d"/>
   </p:transition>
+  <p:timing>
+    <p:tnLst>
+      <p:par>
+        <p:cTn id="1" dur="indefinite" restart="never" nodeType="tmRoot"/>
+      </p:par>
+    </p:tnLst>
+  </p:timing>
 </p:sld>
 </file>
 
@@ -13376,6 +16338,13 @@
   <p:transition spd="slow">
     <p:wipe dir="d"/>
   </p:transition>
+  <p:timing>
+    <p:tnLst>
+      <p:par>
+        <p:cTn id="1" dur="indefinite" restart="never" nodeType="tmRoot"/>
+      </p:par>
+    </p:tnLst>
+  </p:timing>
 </p:sld>
 </file>
 
@@ -13513,6 +16482,13 @@
   <p:transition spd="slow">
     <p:wipe dir="d"/>
   </p:transition>
+  <p:timing>
+    <p:tnLst>
+      <p:par>
+        <p:cTn id="1" dur="indefinite" restart="never" nodeType="tmRoot"/>
+      </p:par>
+    </p:tnLst>
+  </p:timing>
 </p:sld>
 </file>
 
@@ -13614,6 +16590,13 @@
   <p:transition spd="slow">
     <p:wipe dir="d"/>
   </p:transition>
+  <p:timing>
+    <p:tnLst>
+      <p:par>
+        <p:cTn id="1" dur="indefinite" restart="never" nodeType="tmRoot"/>
+      </p:par>
+    </p:tnLst>
+  </p:timing>
 </p:sld>
 </file>
 
@@ -13670,6 +16653,13 @@
   <p:transition spd="slow">
     <p:wipe dir="d"/>
   </p:transition>
+  <p:timing>
+    <p:tnLst>
+      <p:par>
+        <p:cTn id="1" dur="indefinite" restart="never" nodeType="tmRoot"/>
+      </p:par>
+    </p:tnLst>
+  </p:timing>
 </p:sld>
 </file>
 
@@ -13812,6 +16802,13 @@
   <p:transition spd="slow">
     <p:wipe dir="d"/>
   </p:transition>
+  <p:timing>
+    <p:tnLst>
+      <p:par>
+        <p:cTn id="1" dur="indefinite" restart="never" nodeType="tmRoot"/>
+      </p:par>
+    </p:tnLst>
+  </p:timing>
 </p:sld>
 </file>
 
@@ -13868,6 +16865,13 @@
   <p:transition spd="slow">
     <p:wipe dir="d"/>
   </p:transition>
+  <p:timing>
+    <p:tnLst>
+      <p:par>
+        <p:cTn id="1" dur="indefinite" restart="never" nodeType="tmRoot"/>
+      </p:par>
+    </p:tnLst>
+  </p:timing>
 </p:sld>
 </file>
 
@@ -13976,6 +16980,13 @@
   <p:transition spd="slow">
     <p:wipe dir="d"/>
   </p:transition>
+  <p:timing>
+    <p:tnLst>
+      <p:par>
+        <p:cTn id="1" dur="indefinite" restart="never" nodeType="tmRoot"/>
+      </p:par>
+    </p:tnLst>
+  </p:timing>
 </p:sld>
 </file>
 
@@ -14087,6 +17098,13 @@
   <p:transition spd="slow">
     <p:wipe dir="d"/>
   </p:transition>
+  <p:timing>
+    <p:tnLst>
+      <p:par>
+        <p:cTn id="1" dur="indefinite" restart="never" nodeType="tmRoot"/>
+      </p:par>
+    </p:tnLst>
+  </p:timing>
 </p:sld>
 </file>
 
@@ -14437,6 +17455,13 @@
   <p:transition spd="slow">
     <p:wipe dir="d"/>
   </p:transition>
+  <p:timing>
+    <p:tnLst>
+      <p:par>
+        <p:cTn id="1" dur="indefinite" restart="never" nodeType="tmRoot"/>
+      </p:par>
+    </p:tnLst>
+  </p:timing>
 </p:sld>
 </file>
 
@@ -15175,7 +18200,7 @@
           <p:nvPr/>
         </p:nvPicPr>
         <p:blipFill>
-          <a:blip r:embed="rId2">
+          <a:blip r:embed="rId3">
             <a:extLst>
               <a:ext uri="{28A0092B-C50C-407E-A947-70E740481C1C}">
                 <a14:useLocalDpi xmlns:a14="http://schemas.microsoft.com/office/drawing/2010/main" val="0"/>
@@ -15302,7 +18327,7 @@
           <p:nvPr/>
         </p:nvPicPr>
         <p:blipFill>
-          <a:blip r:embed="rId2">
+          <a:blip r:embed="rId3">
             <a:extLst>
               <a:ext uri="{28A0092B-C50C-407E-A947-70E740481C1C}">
                 <a14:useLocalDpi xmlns:a14="http://schemas.microsoft.com/office/drawing/2010/main" val="0"/>
@@ -15429,7 +18454,7 @@
           <p:nvPr/>
         </p:nvPicPr>
         <p:blipFill>
-          <a:blip r:embed="rId2" cstate="email">
+          <a:blip r:embed="rId3" cstate="email">
             <a:extLst>
               <a:ext uri="{28A0092B-C50C-407E-A947-70E740481C1C}">
                 <a14:useLocalDpi xmlns:a14="http://schemas.microsoft.com/office/drawing/2010/main" val="0"/>

</xml_diff>

<commit_message>
Cleaned up notes a little in PPP
</commit_message>
<xml_diff>
--- a/How To Write Unit Tests.pptx
+++ b/How To Write Unit Tests.pptx
@@ -4232,7 +4232,7 @@
             <a:fld id="{D83FDC75-7F73-4A4A-A77C-09AADF00E0EA}" type="datetimeFigureOut">
               <a:rPr lang="en-US" smtClean="0"/>
               <a:pPr/>
-              <a:t>4/13/2011</a:t>
+              <a:t>4/14/2011</a:t>
             </a:fld>
             <a:endParaRPr lang="en-US" dirty="0"/>
           </a:p>
@@ -4399,7 +4399,7 @@
             <a:fld id="{48AEF76B-3757-4A0B-AF93-28494465C1DD}" type="datetimeFigureOut">
               <a:rPr lang="en-US" smtClean="0"/>
               <a:pPr/>
-              <a:t>4/13/2011</a:t>
+              <a:t>4/14/2011</a:t>
             </a:fld>
             <a:endParaRPr lang="en-US" dirty="0"/>
           </a:p>
@@ -4714,173 +4714,6 @@
           </a:bodyPr>
           <a:lstStyle/>
           <a:p>
-            <a:pPr marL="0" marR="0" indent="0" algn="l" defTabSz="914400" rtl="0" eaLnBrk="1" fontAlgn="auto" latinLnBrk="0" hangingPunct="1">
-              <a:lnSpc>
-                <a:spcPct val="100000"/>
-              </a:lnSpc>
-              <a:spcBef>
-                <a:spcPts val="0"/>
-              </a:spcBef>
-              <a:spcAft>
-                <a:spcPts val="0"/>
-              </a:spcAft>
-              <a:buClrTx/>
-              <a:buSzTx/>
-              <a:buFontTx/>
-              <a:buNone/>
-              <a:tabLst/>
-              <a:defRPr/>
-            </a:pPr>
-            <a:r>
-              <a:rPr lang="en-US" dirty="0" smtClean="0"/>
-              <a:t>This template can be used as a starter file for presenting training materials in a group setting.</a:t>
-            </a:r>
-          </a:p>
-          <a:p>
-            <a:endParaRPr lang="en-US" dirty="0" smtClean="0"/>
-          </a:p>
-          <a:p>
-            <a:pPr lvl="0"/>
-            <a:r>
-              <a:rPr lang="en-US" sz="1200" b="1" dirty="0" smtClean="0"/>
-              <a:t>Sections</a:t>
-            </a:r>
-            <a:endParaRPr lang="en-US" sz="1200" b="0" dirty="0" smtClean="0"/>
-          </a:p>
-          <a:p>
-            <a:pPr lvl="0"/>
-            <a:r>
-              <a:rPr lang="en-US" sz="1200" b="0" dirty="0" smtClean="0"/>
-              <a:t>Right-click on a slide to add sections.</a:t>
-            </a:r>
-            <a:r>
-              <a:rPr lang="en-US" sz="1200" b="0" baseline="0" dirty="0" smtClean="0"/>
-              <a:t> Sections can help to organize your slides or facilitate collaboration between multiple authors.</a:t>
-            </a:r>
-            <a:endParaRPr lang="en-US" sz="1200" b="0" dirty="0" smtClean="0"/>
-          </a:p>
-          <a:p>
-            <a:pPr lvl="0"/>
-            <a:endParaRPr lang="en-US" sz="1200" b="1" dirty="0" smtClean="0"/>
-          </a:p>
-          <a:p>
-            <a:pPr lvl="0"/>
-            <a:r>
-              <a:rPr lang="en-US" sz="1200" b="1" dirty="0" smtClean="0"/>
-              <a:t>Notes</a:t>
-            </a:r>
-          </a:p>
-          <a:p>
-            <a:pPr lvl="0"/>
-            <a:r>
-              <a:rPr lang="en-US" sz="1200" dirty="0" smtClean="0"/>
-              <a:t>Use the Notes section for delivery notes or to provide additional details for the audience.</a:t>
-            </a:r>
-            <a:r>
-              <a:rPr lang="en-US" sz="1200" baseline="0" dirty="0" smtClean="0"/>
-              <a:t> View these notes in Presentation View during your presentation. </a:t>
-            </a:r>
-          </a:p>
-          <a:p>
-            <a:pPr lvl="0">
-              <a:buFontTx/>
-              <a:buNone/>
-            </a:pPr>
-            <a:r>
-              <a:rPr lang="en-US" sz="1200" dirty="0" smtClean="0"/>
-              <a:t>Keep in mind the font size (important for accessibility, visibility, videotaping, and online production)</a:t>
-            </a:r>
-          </a:p>
-          <a:p>
-            <a:pPr lvl="0"/>
-            <a:endParaRPr lang="en-US" sz="1200" dirty="0" smtClean="0"/>
-          </a:p>
-          <a:p>
-            <a:pPr lvl="0">
-              <a:buFontTx/>
-              <a:buNone/>
-            </a:pPr>
-            <a:r>
-              <a:rPr lang="en-US" sz="1200" b="1" dirty="0" smtClean="0"/>
-              <a:t>Coordinated colors </a:t>
-            </a:r>
-          </a:p>
-          <a:p>
-            <a:pPr lvl="0">
-              <a:buFontTx/>
-              <a:buNone/>
-            </a:pPr>
-            <a:r>
-              <a:rPr lang="en-US" sz="1200" dirty="0" smtClean="0"/>
-              <a:t>Pay particular attention to the graphs, charts, and text boxes.</a:t>
-            </a:r>
-            <a:r>
-              <a:rPr lang="en-US" sz="1200" baseline="0" dirty="0" smtClean="0"/>
-              <a:t> </a:t>
-            </a:r>
-            <a:endParaRPr lang="en-US" sz="1200" dirty="0" smtClean="0"/>
-          </a:p>
-          <a:p>
-            <a:pPr lvl="0"/>
-            <a:r>
-              <a:rPr lang="en-US" sz="1200" dirty="0" smtClean="0"/>
-              <a:t>Consider that attendees will print in black and white or </a:t>
-            </a:r>
-            <a:r>
-              <a:rPr lang="en-US" sz="1200" dirty="0" err="1" smtClean="0"/>
-              <a:t>grayscale</a:t>
-            </a:r>
-            <a:r>
-              <a:rPr lang="en-US" sz="1200" dirty="0" smtClean="0"/>
-              <a:t>. Run a test print to make sure your colors work when printed in pure black and white and </a:t>
-            </a:r>
-            <a:r>
-              <a:rPr lang="en-US" sz="1200" dirty="0" err="1" smtClean="0"/>
-              <a:t>grayscale</a:t>
-            </a:r>
-            <a:r>
-              <a:rPr lang="en-US" sz="1200" dirty="0" smtClean="0"/>
-              <a:t>.</a:t>
-            </a:r>
-          </a:p>
-          <a:p>
-            <a:pPr lvl="0">
-              <a:buFontTx/>
-              <a:buNone/>
-            </a:pPr>
-            <a:endParaRPr lang="en-US" sz="1200" dirty="0" smtClean="0"/>
-          </a:p>
-          <a:p>
-            <a:pPr lvl="0">
-              <a:buFontTx/>
-              <a:buNone/>
-            </a:pPr>
-            <a:r>
-              <a:rPr lang="en-US" sz="1200" b="1" dirty="0" smtClean="0"/>
-              <a:t>Graphics, tables, and graphs</a:t>
-            </a:r>
-          </a:p>
-          <a:p>
-            <a:pPr lvl="0"/>
-            <a:r>
-              <a:rPr lang="en-US" sz="1200" dirty="0" smtClean="0"/>
-              <a:t>Keep it simple: If possible, use consistent, non-distracting styles and colors.</a:t>
-            </a:r>
-          </a:p>
-          <a:p>
-            <a:pPr lvl="0"/>
-            <a:r>
-              <a:rPr lang="en-US" sz="1200" dirty="0" smtClean="0"/>
-              <a:t>Label all graphs and tables.</a:t>
-            </a:r>
-          </a:p>
-          <a:p>
-            <a:endParaRPr lang="en-US" dirty="0" smtClean="0"/>
-          </a:p>
-          <a:p>
-            <a:endParaRPr lang="en-US" dirty="0" smtClean="0"/>
-          </a:p>
-          <a:p>
             <a:endParaRPr lang="en-US" dirty="0"/>
           </a:p>
         </p:txBody>
@@ -4961,34 +4794,6 @@
           <a:bodyPr/>
           <a:lstStyle/>
           <a:p>
-            <a:r>
-              <a:rPr lang="en-US" dirty="0" smtClean="0"/>
-              <a:t>The mapping file can indicate if a table is read only, or not mutable. These can be checked</a:t>
-            </a:r>
-            <a:r>
-              <a:rPr lang="en-US" baseline="0" dirty="0" smtClean="0"/>
-              <a:t> with the CRUD tests.</a:t>
-            </a:r>
-          </a:p>
-          <a:p>
-            <a:r>
-              <a:rPr lang="en-US" baseline="0" dirty="0" smtClean="0"/>
-              <a:t>If you use my base class and it fails this is usually because there is a related record that needs to be set in the </a:t>
-            </a:r>
-            <a:r>
-              <a:rPr lang="en-US" baseline="0" dirty="0" err="1" smtClean="0"/>
-              <a:t>GetValid</a:t>
-            </a:r>
-            <a:r>
-              <a:rPr lang="en-US" baseline="0" dirty="0" smtClean="0"/>
-              <a:t> method.</a:t>
-            </a:r>
-          </a:p>
-          <a:p>
-            <a:r>
-              <a:rPr lang="en-US" baseline="0" dirty="0" smtClean="0"/>
-              <a:t>Invalid Boundary tests are all the flavors, one over the max, one under the minimum, spaces only, etc.</a:t>
-            </a:r>
             <a:endParaRPr lang="en-US" dirty="0"/>
           </a:p>
         </p:txBody>
@@ -5011,7 +4816,7 @@
             <a:fld id="{75693FD4-8F83-4EF7-AC3F-0DC0388986B0}" type="slidenum">
               <a:rPr lang="en-US" smtClean="0"/>
               <a:pPr/>
-              <a:t>11</a:t>
+              <a:t>10</a:t>
             </a:fld>
             <a:endParaRPr lang="en-US" dirty="0"/>
           </a:p>
@@ -5020,7 +4825,7 @@
     </p:spTree>
     <p:extLst>
       <p:ext uri="{BB962C8B-B14F-4D97-AF65-F5344CB8AC3E}">
-        <p14:creationId xmlns:p14="http://schemas.microsoft.com/office/powerpoint/2010/main" val="2257538058"/>
+        <p14:creationId xmlns:p14="http://schemas.microsoft.com/office/powerpoint/2010/main" val="941329981"/>
       </p:ext>
     </p:extLst>
   </p:cSld>
@@ -5076,19 +4881,25 @@
           <a:p>
             <a:r>
               <a:rPr lang="en-US" dirty="0" smtClean="0"/>
-              <a:t>Valid Boundary tests are the</a:t>
+              <a:t>Types of tests:</a:t>
+            </a:r>
+          </a:p>
+          <a:p>
+            <a:r>
+              <a:rPr lang="en-US" dirty="0" smtClean="0"/>
+              <a:t>CRUD – Create Read Update Delete. Some can’t because</a:t>
             </a:r>
             <a:r>
               <a:rPr lang="en-US" baseline="0" dirty="0" smtClean="0"/>
-              <a:t> </a:t>
+              <a:t> of mapping file setting like </a:t>
             </a:r>
             <a:r>
               <a:rPr lang="en-US" baseline="0" dirty="0" err="1" smtClean="0"/>
-              <a:t>the</a:t>
+              <a:t>ReadOnly</a:t>
             </a:r>
             <a:r>
               <a:rPr lang="en-US" baseline="0" dirty="0" smtClean="0"/>
-              <a:t> maximum, minimum, etc.</a:t>
+              <a:t>.</a:t>
             </a:r>
           </a:p>
           <a:p>
@@ -5097,25 +4908,39 @@
           <a:p>
             <a:r>
               <a:rPr lang="en-US" baseline="0" dirty="0" smtClean="0"/>
-              <a:t>Constructor tests – just make sure that the expected values are set (for example if you had several parameters, you may accidentally assign the parameter to a different field.</a:t>
-            </a:r>
-          </a:p>
-          <a:p>
-            <a:endParaRPr lang="en-US" baseline="0" dirty="0" smtClean="0"/>
-          </a:p>
-          <a:p>
+              <a:t>Note, if you don’t set required related tables, these tests will fail when it tries to initialize.  </a:t>
+            </a:r>
+            <a:endParaRPr lang="en-US" dirty="0" smtClean="0"/>
+          </a:p>
+          <a:p>
+            <a:endParaRPr lang="en-US" dirty="0" smtClean="0"/>
+          </a:p>
+          <a:p>
+            <a:r>
+              <a:rPr lang="en-US" dirty="0" smtClean="0"/>
+              <a:t>Invalid Boundary</a:t>
+            </a:r>
             <a:r>
               <a:rPr lang="en-US" baseline="0" dirty="0" smtClean="0"/>
-              <a:t>Fluent Mapping tests. I’ll show an example in a bit</a:t>
-            </a:r>
-          </a:p>
-          <a:p>
-            <a:endParaRPr lang="en-US" baseline="0" dirty="0" smtClean="0"/>
+              <a:t> Test. </a:t>
+            </a:r>
           </a:p>
           <a:p>
             <a:r>
               <a:rPr lang="en-US" baseline="0" dirty="0" smtClean="0"/>
-              <a:t>Reflection Tests. I use to check for attributes, and to ensure I write tests for each field</a:t>
+              <a:t>Just too long, just too short</a:t>
+            </a:r>
+          </a:p>
+          <a:p>
+            <a:r>
+              <a:rPr lang="en-US" baseline="0" dirty="0" smtClean="0"/>
+              <a:t>Not Null</a:t>
+            </a:r>
+          </a:p>
+          <a:p>
+            <a:r>
+              <a:rPr lang="en-US" baseline="0" dirty="0" smtClean="0"/>
+              <a:t>Etc.</a:t>
             </a:r>
             <a:endParaRPr lang="en-US" dirty="0"/>
           </a:p>
@@ -5139,7 +4964,7 @@
             <a:fld id="{75693FD4-8F83-4EF7-AC3F-0DC0388986B0}" type="slidenum">
               <a:rPr lang="en-US" smtClean="0"/>
               <a:pPr/>
-              <a:t>12</a:t>
+              <a:t>11</a:t>
             </a:fld>
             <a:endParaRPr lang="en-US" dirty="0"/>
           </a:p>
@@ -5148,7 +4973,7 @@
     </p:spTree>
     <p:extLst>
       <p:ext uri="{BB962C8B-B14F-4D97-AF65-F5344CB8AC3E}">
-        <p14:creationId xmlns:p14="http://schemas.microsoft.com/office/powerpoint/2010/main" val="2863606861"/>
+        <p14:creationId xmlns:p14="http://schemas.microsoft.com/office/powerpoint/2010/main" val="2257538058"/>
       </p:ext>
     </p:extLst>
   </p:cSld>
@@ -5204,11 +5029,19 @@
           <a:p>
             <a:r>
               <a:rPr lang="en-US" dirty="0" smtClean="0"/>
-              <a:t>I</a:t>
+              <a:t>Valid Boundary tests are the</a:t>
             </a:r>
             <a:r>
               <a:rPr lang="en-US" baseline="0" dirty="0" smtClean="0"/>
-              <a:t> prefer to group the different section in Regions, and because I tend to have a lot of regions, I have the descriptive text at the start and end of the region.</a:t>
+              <a:t> </a:t>
+            </a:r>
+            <a:r>
+              <a:rPr lang="en-US" baseline="0" dirty="0" smtClean="0"/>
+              <a:t>exact maximum</a:t>
+            </a:r>
+            <a:r>
+              <a:rPr lang="en-US" baseline="0" dirty="0" smtClean="0"/>
+              <a:t>, minimum, etc.</a:t>
             </a:r>
           </a:p>
           <a:p>
@@ -5217,31 +5050,52 @@
           <a:p>
             <a:r>
               <a:rPr lang="en-US" baseline="0" dirty="0" smtClean="0"/>
-              <a:t>There will always be an </a:t>
-            </a:r>
-            <a:r>
-              <a:rPr lang="en-US" baseline="0" dirty="0" err="1" smtClean="0"/>
-              <a:t>Init</a:t>
-            </a:r>
+              <a:t>Constructor tests – just make sure that the expected values are set </a:t>
+            </a:r>
+            <a:endParaRPr lang="en-US" baseline="0" dirty="0" smtClean="0"/>
+          </a:p>
+          <a:p>
             <a:r>
               <a:rPr lang="en-US" baseline="0" dirty="0" smtClean="0"/>
-              <a:t> and Reflection regions when you create this with my </a:t>
-            </a:r>
-            <a:r>
-              <a:rPr lang="en-US" baseline="0" dirty="0" err="1" smtClean="0"/>
-              <a:t>Resharper</a:t>
+              <a:t>(</a:t>
             </a:r>
             <a:r>
               <a:rPr lang="en-US" baseline="0" dirty="0" smtClean="0"/>
-              <a:t> template. Then I have each field in it’s own region. I also prefer to group the invalid and valid tests </a:t>
-            </a:r>
-            <a:r>
-              <a:rPr lang="en-US" baseline="0" dirty="0" err="1" smtClean="0"/>
-              <a:t>seperatly</a:t>
+              <a:t>for example if you had several parameters, you may accidentally assign the parameter to a different field</a:t>
+            </a:r>
+            <a:r>
+              <a:rPr lang="en-US" baseline="0" dirty="0" smtClean="0"/>
+              <a:t>.)</a:t>
             </a:r>
             <a:endParaRPr lang="en-US" baseline="0" dirty="0" smtClean="0"/>
           </a:p>
           <a:p>
+            <a:endParaRPr lang="en-US" baseline="0" dirty="0" smtClean="0"/>
+          </a:p>
+          <a:p>
+            <a:r>
+              <a:rPr lang="en-US" baseline="0" dirty="0" smtClean="0"/>
+              <a:t>Fluent Mapping tests. I’ll show an example in a bit</a:t>
+            </a:r>
+          </a:p>
+          <a:p>
+            <a:endParaRPr lang="en-US" baseline="0" dirty="0" smtClean="0"/>
+          </a:p>
+          <a:p>
+            <a:r>
+              <a:rPr lang="en-US" baseline="0" dirty="0" smtClean="0"/>
+              <a:t>Reflection </a:t>
+            </a:r>
+            <a:r>
+              <a:rPr lang="en-US" baseline="0" dirty="0" smtClean="0"/>
+              <a:t>Tests.</a:t>
+            </a:r>
+          </a:p>
+          <a:p>
+            <a:r>
+              <a:rPr lang="en-US" baseline="0" dirty="0" smtClean="0"/>
+              <a:t>Code Coverage, and attributes</a:t>
+            </a:r>
             <a:endParaRPr lang="en-US" dirty="0"/>
           </a:p>
         </p:txBody>
@@ -5264,7 +5118,7 @@
             <a:fld id="{75693FD4-8F83-4EF7-AC3F-0DC0388986B0}" type="slidenum">
               <a:rPr lang="en-US" smtClean="0"/>
               <a:pPr/>
-              <a:t>13</a:t>
+              <a:t>12</a:t>
             </a:fld>
             <a:endParaRPr lang="en-US" dirty="0"/>
           </a:p>
@@ -5273,7 +5127,7 @@
     </p:spTree>
     <p:extLst>
       <p:ext uri="{BB962C8B-B14F-4D97-AF65-F5344CB8AC3E}">
-        <p14:creationId xmlns:p14="http://schemas.microsoft.com/office/powerpoint/2010/main" val="1035053358"/>
+        <p14:creationId xmlns:p14="http://schemas.microsoft.com/office/powerpoint/2010/main" val="2863606861"/>
       </p:ext>
     </p:extLst>
   </p:cSld>
@@ -5329,12 +5183,80 @@
           <a:p>
             <a:r>
               <a:rPr lang="en-US" dirty="0" smtClean="0"/>
-              <a:t>Fluent mapping is something new I started doing after finding an example</a:t>
+              <a:t>Part</a:t>
             </a:r>
             <a:r>
               <a:rPr lang="en-US" baseline="0" dirty="0" smtClean="0"/>
-              <a:t> on the net.</a:t>
-            </a:r>
+              <a:t> of this is generated when using my </a:t>
+            </a:r>
+            <a:r>
+              <a:rPr lang="en-US" baseline="0" dirty="0" err="1" smtClean="0"/>
+              <a:t>resharper</a:t>
+            </a:r>
+            <a:r>
+              <a:rPr lang="en-US" baseline="0" dirty="0" smtClean="0"/>
+              <a:t> file template</a:t>
+            </a:r>
+            <a:endParaRPr lang="en-US" dirty="0" smtClean="0"/>
+          </a:p>
+          <a:p>
+            <a:endParaRPr lang="en-US" dirty="0" smtClean="0"/>
+          </a:p>
+          <a:p>
+            <a:r>
+              <a:rPr lang="en-US" dirty="0" smtClean="0"/>
+              <a:t>Group with regions</a:t>
+            </a:r>
+          </a:p>
+          <a:p>
+            <a:endParaRPr lang="en-US" baseline="0" dirty="0" smtClean="0"/>
+          </a:p>
+          <a:p>
+            <a:r>
+              <a:rPr lang="en-US" baseline="0" dirty="0" smtClean="0"/>
+              <a:t>Initialize</a:t>
+            </a:r>
+          </a:p>
+          <a:p>
+            <a:endParaRPr lang="en-US" baseline="0" dirty="0" smtClean="0"/>
+          </a:p>
+          <a:p>
+            <a:r>
+              <a:rPr lang="en-US" baseline="0" dirty="0" smtClean="0"/>
+              <a:t>Test each field</a:t>
+            </a:r>
+          </a:p>
+          <a:p>
+            <a:endParaRPr lang="en-US" baseline="0" dirty="0" smtClean="0"/>
+          </a:p>
+          <a:p>
+            <a:r>
+              <a:rPr lang="en-US" baseline="0" dirty="0" smtClean="0"/>
+              <a:t>Test Constructor</a:t>
+            </a:r>
+          </a:p>
+          <a:p>
+            <a:endParaRPr lang="en-US" baseline="0" dirty="0" smtClean="0"/>
+          </a:p>
+          <a:p>
+            <a:r>
+              <a:rPr lang="en-US" baseline="0" dirty="0" smtClean="0"/>
+              <a:t>Optionally do Fluent Mapping Tests</a:t>
+            </a:r>
+          </a:p>
+          <a:p>
+            <a:endParaRPr lang="en-US" baseline="0" dirty="0" smtClean="0"/>
+          </a:p>
+          <a:p>
+            <a:r>
+              <a:rPr lang="en-US" baseline="0" dirty="0" smtClean="0"/>
+              <a:t>Do Reflection tests</a:t>
+            </a:r>
+          </a:p>
+          <a:p>
+            <a:endParaRPr lang="en-US" baseline="0" dirty="0" smtClean="0"/>
+          </a:p>
+          <a:p>
             <a:endParaRPr lang="en-US" dirty="0"/>
           </a:p>
         </p:txBody>
@@ -5357,7 +5279,7 @@
             <a:fld id="{75693FD4-8F83-4EF7-AC3F-0DC0388986B0}" type="slidenum">
               <a:rPr lang="en-US" smtClean="0"/>
               <a:pPr/>
-              <a:t>14</a:t>
+              <a:t>13</a:t>
             </a:fld>
             <a:endParaRPr lang="en-US" dirty="0"/>
           </a:p>
@@ -5366,7 +5288,7 @@
     </p:spTree>
     <p:extLst>
       <p:ext uri="{BB962C8B-B14F-4D97-AF65-F5344CB8AC3E}">
-        <p14:creationId xmlns:p14="http://schemas.microsoft.com/office/powerpoint/2010/main" val="1818885195"/>
+        <p14:creationId xmlns:p14="http://schemas.microsoft.com/office/powerpoint/2010/main" val="1035053358"/>
       </p:ext>
     </p:extLst>
   </p:cSld>
@@ -5422,44 +5344,11 @@
           <a:p>
             <a:r>
               <a:rPr lang="en-US" dirty="0" smtClean="0"/>
-              <a:t>These</a:t>
+              <a:t>Fluent mapping is something new I started doing after finding an example</a:t>
             </a:r>
             <a:r>
               <a:rPr lang="en-US" baseline="0" dirty="0" smtClean="0"/>
-              <a:t> tests both check that the attributes are as expected and that </a:t>
-            </a:r>
-            <a:r>
-              <a:rPr lang="en-US" baseline="0" dirty="0" smtClean="0"/>
-              <a:t>the </a:t>
-            </a:r>
-            <a:r>
-              <a:rPr lang="en-US" baseline="0" dirty="0" smtClean="0"/>
-              <a:t>public methods have not been added or removed</a:t>
-            </a:r>
-            <a:r>
-              <a:rPr lang="en-US" baseline="0" dirty="0" smtClean="0"/>
-              <a:t>.</a:t>
-            </a:r>
-          </a:p>
-          <a:p>
-            <a:endParaRPr lang="en-US" baseline="0" dirty="0" smtClean="0"/>
-          </a:p>
-          <a:p>
-            <a:r>
-              <a:rPr lang="en-US" baseline="0" dirty="0" err="1" smtClean="0"/>
-              <a:t>NameAndType</a:t>
-            </a:r>
-            <a:r>
-              <a:rPr lang="en-US" baseline="0" dirty="0" smtClean="0"/>
-              <a:t> and </a:t>
-            </a:r>
-            <a:r>
-              <a:rPr lang="en-US" baseline="0" dirty="0" err="1" smtClean="0"/>
-              <a:t>AttributeAndFieldValidation</a:t>
-            </a:r>
-            <a:r>
-              <a:rPr lang="en-US" baseline="0" dirty="0" smtClean="0"/>
-              <a:t> are helper classes I created. This is order, dependent. Sometimes, the attributes get sorted differently on builder vs. your local test runner. If this happens I do have a way to solve it.</a:t>
+              <a:t> on the net.</a:t>
             </a:r>
             <a:endParaRPr lang="en-US" dirty="0"/>
           </a:p>
@@ -5483,7 +5372,7 @@
             <a:fld id="{75693FD4-8F83-4EF7-AC3F-0DC0388986B0}" type="slidenum">
               <a:rPr lang="en-US" smtClean="0"/>
               <a:pPr/>
-              <a:t>15</a:t>
+              <a:t>14</a:t>
             </a:fld>
             <a:endParaRPr lang="en-US" dirty="0"/>
           </a:p>
@@ -5492,7 +5381,7 @@
     </p:spTree>
     <p:extLst>
       <p:ext uri="{BB962C8B-B14F-4D97-AF65-F5344CB8AC3E}">
-        <p14:creationId xmlns:p14="http://schemas.microsoft.com/office/powerpoint/2010/main" val="2337724366"/>
+        <p14:creationId xmlns:p14="http://schemas.microsoft.com/office/powerpoint/2010/main" val="1818885195"/>
       </p:ext>
     </p:extLst>
   </p:cSld>
@@ -5548,35 +5437,70 @@
           <a:p>
             <a:r>
               <a:rPr lang="en-US" dirty="0" smtClean="0"/>
-              <a:t>I have a </a:t>
+              <a:t>Use two helper methods “</a:t>
             </a:r>
             <a:r>
               <a:rPr lang="en-US" dirty="0" err="1" smtClean="0"/>
-              <a:t>resharper</a:t>
-            </a:r>
-            <a:r>
-              <a:rPr lang="en-US" dirty="0" smtClean="0"/>
-              <a:t> template that sets up the initial </a:t>
+              <a:t>NameAndType</a:t>
+            </a:r>
+            <a:r>
+              <a:rPr lang="en-US" dirty="0" smtClean="0"/>
+              <a:t>” and “</a:t>
             </a:r>
             <a:r>
               <a:rPr lang="en-US" dirty="0" err="1" smtClean="0"/>
-              <a:t>stucture</a:t>
-            </a:r>
-            <a:r>
-              <a:rPr lang="en-US" dirty="0" smtClean="0"/>
-              <a:t> of these tests and also provides some examples</a:t>
-            </a:r>
-          </a:p>
-          <a:p>
-            <a:r>
-              <a:rPr lang="en-US" dirty="0" smtClean="0"/>
-              <a:t>If all</a:t>
+              <a:t>AttributeAndFieldValidation</a:t>
+            </a:r>
+            <a:r>
+              <a:rPr lang="en-US" dirty="0" smtClean="0"/>
+              <a:t>”</a:t>
+            </a:r>
+          </a:p>
+          <a:p>
+            <a:endParaRPr lang="en-US" dirty="0" smtClean="0"/>
+          </a:p>
+          <a:p>
+            <a:r>
+              <a:rPr lang="en-US" dirty="0" smtClean="0"/>
+              <a:t>Each public</a:t>
             </a:r>
             <a:r>
               <a:rPr lang="en-US" baseline="0" dirty="0" smtClean="0"/>
-              <a:t> these tests suddenly fail, or fail when you first set them up, it is probably because there is Controller injection that needs to be mocked</a:t>
-            </a:r>
-            <a:endParaRPr lang="en-US" dirty="0"/>
+              <a:t> field needs to be added.</a:t>
+            </a:r>
+          </a:p>
+          <a:p>
+            <a:endParaRPr lang="en-US" baseline="0" dirty="0" smtClean="0"/>
+          </a:p>
+          <a:p>
+            <a:r>
+              <a:rPr lang="en-US" baseline="0" dirty="0" smtClean="0"/>
+              <a:t>If a field has attributes they need to be added.</a:t>
+            </a:r>
+          </a:p>
+          <a:p>
+            <a:endParaRPr lang="en-US" baseline="0" dirty="0" smtClean="0"/>
+          </a:p>
+          <a:p>
+            <a:r>
+              <a:rPr lang="en-US" baseline="0" dirty="0" smtClean="0"/>
+              <a:t>If the Test fails, it tells you what it is expecting.</a:t>
+            </a:r>
+            <a:endParaRPr lang="en-US" dirty="0" smtClean="0"/>
+          </a:p>
+          <a:p>
+            <a:endParaRPr lang="en-US" dirty="0" smtClean="0"/>
+          </a:p>
+          <a:p>
+            <a:r>
+              <a:rPr lang="en-US" dirty="0" smtClean="0"/>
+              <a:t>These</a:t>
+            </a:r>
+            <a:r>
+              <a:rPr lang="en-US" baseline="0" dirty="0" smtClean="0"/>
+              <a:t> are order dependent (sorted alphabetically). Sometimes the order of the attributes is different on Builder. I have a fix for this if it happens.</a:t>
+            </a:r>
+            <a:endParaRPr lang="en-US" dirty="0" smtClean="0"/>
           </a:p>
         </p:txBody>
       </p:sp>
@@ -5598,7 +5522,7 @@
             <a:fld id="{75693FD4-8F83-4EF7-AC3F-0DC0388986B0}" type="slidenum">
               <a:rPr lang="en-US" smtClean="0"/>
               <a:pPr/>
-              <a:t>16</a:t>
+              <a:t>15</a:t>
             </a:fld>
             <a:endParaRPr lang="en-US" dirty="0"/>
           </a:p>
@@ -5607,7 +5531,7 @@
     </p:spTree>
     <p:extLst>
       <p:ext uri="{BB962C8B-B14F-4D97-AF65-F5344CB8AC3E}">
-        <p14:creationId xmlns:p14="http://schemas.microsoft.com/office/powerpoint/2010/main" val="1651317015"/>
+        <p14:creationId xmlns:p14="http://schemas.microsoft.com/office/powerpoint/2010/main" val="2337724366"/>
       </p:ext>
     </p:extLst>
   </p:cSld>
@@ -5663,21 +5587,48 @@
           <a:p>
             <a:r>
               <a:rPr lang="en-US" dirty="0" smtClean="0"/>
-              <a:t>If the only parameter is the id, these tests work fine.</a:t>
+              <a:t>I have a </a:t>
+            </a:r>
+            <a:r>
+              <a:rPr lang="en-US" dirty="0" err="1" smtClean="0"/>
+              <a:t>resharper</a:t>
+            </a:r>
+            <a:r>
+              <a:rPr lang="en-US" dirty="0" smtClean="0"/>
+              <a:t> template that sets up the initial </a:t>
+            </a:r>
+            <a:r>
+              <a:rPr lang="en-US" dirty="0" smtClean="0"/>
+              <a:t>structure </a:t>
+            </a:r>
+            <a:r>
+              <a:rPr lang="en-US" dirty="0" smtClean="0"/>
+              <a:t>of these tests and also provides some </a:t>
+            </a:r>
+            <a:r>
+              <a:rPr lang="en-US" dirty="0" smtClean="0"/>
+              <a:t>examples.</a:t>
+            </a:r>
+          </a:p>
+          <a:p>
+            <a:endParaRPr lang="en-US" dirty="0" smtClean="0"/>
+          </a:p>
+          <a:p>
+            <a:r>
+              <a:rPr lang="en-US" dirty="0" smtClean="0"/>
+              <a:t>If all</a:t>
             </a:r>
             <a:r>
               <a:rPr lang="en-US" baseline="0" dirty="0" smtClean="0"/>
-              <a:t> If you have </a:t>
-            </a:r>
-            <a:r>
-              <a:rPr lang="en-US" baseline="0" dirty="0" err="1" smtClean="0"/>
-              <a:t>QueryString</a:t>
+              <a:t> these tests suddenly fail, or fail when you first set them up, it is probably because there is Controller injection that needs to be </a:t>
             </a:r>
             <a:r>
               <a:rPr lang="en-US" baseline="0" dirty="0" smtClean="0"/>
-              <a:t> parameters, I have an overload in the helpers that can ignore the parameters.</a:t>
-            </a:r>
-            <a:endParaRPr lang="en-US" dirty="0"/>
+              <a:t>mocked</a:t>
+            </a:r>
+          </a:p>
+          <a:p>
+            <a:endParaRPr lang="en-US" baseline="0" dirty="0" smtClean="0"/>
           </a:p>
         </p:txBody>
       </p:sp>
@@ -5699,7 +5650,7 @@
             <a:fld id="{75693FD4-8F83-4EF7-AC3F-0DC0388986B0}" type="slidenum">
               <a:rPr lang="en-US" smtClean="0"/>
               <a:pPr/>
-              <a:t>17</a:t>
+              <a:t>16</a:t>
             </a:fld>
             <a:endParaRPr lang="en-US" dirty="0"/>
           </a:p>
@@ -5708,7 +5659,7 @@
     </p:spTree>
     <p:extLst>
       <p:ext uri="{BB962C8B-B14F-4D97-AF65-F5344CB8AC3E}">
-        <p14:creationId xmlns:p14="http://schemas.microsoft.com/office/powerpoint/2010/main" val="2748494377"/>
+        <p14:creationId xmlns:p14="http://schemas.microsoft.com/office/powerpoint/2010/main" val="1651317015"/>
       </p:ext>
     </p:extLst>
   </p:cSld>
@@ -5764,108 +5715,34 @@
           <a:p>
             <a:r>
               <a:rPr lang="en-US" dirty="0" smtClean="0"/>
-              <a:t>The helpers</a:t>
+              <a:t>If </a:t>
+            </a:r>
+            <a:r>
+              <a:rPr lang="en-US" dirty="0" smtClean="0"/>
+              <a:t>the only parameter is the id, these tests work fine.</a:t>
             </a:r>
             <a:r>
               <a:rPr lang="en-US" baseline="0" dirty="0" smtClean="0"/>
-              <a:t> are the ones to fake data (base class in </a:t>
+              <a:t> </a:t>
+            </a:r>
+            <a:endParaRPr lang="en-US" baseline="0" dirty="0" smtClean="0"/>
+          </a:p>
+          <a:p>
+            <a:r>
+              <a:rPr lang="en-US" baseline="0" dirty="0" smtClean="0"/>
+              <a:t>If </a:t>
+            </a:r>
+            <a:r>
+              <a:rPr lang="en-US" baseline="0" dirty="0" smtClean="0"/>
+              <a:t>you have </a:t>
             </a:r>
             <a:r>
               <a:rPr lang="en-US" baseline="0" dirty="0" err="1" smtClean="0"/>
-              <a:t>UCDArch.Testing</a:t>
+              <a:t>QueryString</a:t>
             </a:r>
             <a:r>
               <a:rPr lang="en-US" baseline="0" dirty="0" smtClean="0"/>
-              <a:t>)</a:t>
-            </a:r>
-            <a:endParaRPr lang="en-US" dirty="0" smtClean="0"/>
-          </a:p>
-          <a:p>
-            <a:endParaRPr lang="en-US" dirty="0" smtClean="0"/>
-          </a:p>
-          <a:p>
-            <a:r>
-              <a:rPr lang="en-US" dirty="0" smtClean="0"/>
-              <a:t>Doing</a:t>
-            </a:r>
-            <a:r>
-              <a:rPr lang="en-US" baseline="0" dirty="0" smtClean="0"/>
-              <a:t> boundary tests for controller methods gets uglier as the complexity of the method increases. Using interface methods reduces some of this complexity. Avoid static methods as much as possible as they can’t be mocked (not easily)</a:t>
-            </a:r>
-          </a:p>
-          <a:p>
-            <a:endParaRPr lang="en-US" baseline="0" dirty="0" smtClean="0"/>
-          </a:p>
-          <a:p>
-            <a:r>
-              <a:rPr lang="en-US" dirty="0" smtClean="0"/>
-              <a:t>Any repository mocking is usually done in the class initialization.</a:t>
-            </a:r>
-          </a:p>
-          <a:p>
-            <a:r>
-              <a:rPr lang="en-US" dirty="0" smtClean="0"/>
-              <a:t>Basically, any parameters passed to the controller’s class (injection) has to be mocked in the test </a:t>
-            </a:r>
-            <a:r>
-              <a:rPr lang="en-US" dirty="0" err="1" smtClean="0"/>
-              <a:t>init.</a:t>
-            </a:r>
-            <a:endParaRPr lang="en-US" dirty="0" smtClean="0"/>
-          </a:p>
-          <a:p>
-            <a:endParaRPr lang="en-US" dirty="0" smtClean="0"/>
-          </a:p>
-          <a:p>
-            <a:r>
-              <a:rPr lang="en-US" dirty="0" smtClean="0"/>
-              <a:t>If</a:t>
-            </a:r>
-            <a:r>
-              <a:rPr lang="en-US" baseline="0" dirty="0" smtClean="0"/>
-              <a:t> Possible create a method to fake all the data you will need for all your tests, it really cleans up the arrange part of the tests. </a:t>
-            </a:r>
-          </a:p>
-          <a:p>
-            <a:endParaRPr lang="en-US" baseline="0" dirty="0" smtClean="0"/>
-          </a:p>
-          <a:p>
-            <a:r>
-              <a:rPr lang="en-US" baseline="0" dirty="0" smtClean="0"/>
-              <a:t>If the controller is checking the </a:t>
-            </a:r>
-            <a:r>
-              <a:rPr lang="en-US" baseline="0" dirty="0" err="1" smtClean="0"/>
-              <a:t>CurrentUser’s</a:t>
-            </a:r>
-            <a:r>
-              <a:rPr lang="en-US" baseline="0" dirty="0" smtClean="0"/>
-              <a:t> identity this needs to be mocked. There is a </a:t>
-            </a:r>
-            <a:r>
-              <a:rPr lang="en-US" baseline="0" dirty="0" err="1" smtClean="0"/>
-              <a:t>methed</a:t>
-            </a:r>
-            <a:r>
-              <a:rPr lang="en-US" baseline="0" dirty="0" smtClean="0"/>
-              <a:t> in </a:t>
-            </a:r>
-            <a:r>
-              <a:rPr lang="en-US" baseline="0" dirty="0" err="1" smtClean="0"/>
-              <a:t>UCDArch.Testing</a:t>
-            </a:r>
-            <a:r>
-              <a:rPr lang="en-US" baseline="0" dirty="0" smtClean="0"/>
-              <a:t> to mock this as well as any files that may be returned.</a:t>
-            </a:r>
-          </a:p>
-          <a:p>
-            <a:endParaRPr lang="en-US" baseline="0" dirty="0" smtClean="0"/>
-          </a:p>
-          <a:p>
-            <a:r>
-              <a:rPr lang="en-US" baseline="0" dirty="0" smtClean="0"/>
-              <a:t>Usually we test what is returned (redirect/view), error messages, and that expected code is executed.</a:t>
+              <a:t> parameters, I have an overload in the helpers that can ignore the parameters.</a:t>
             </a:r>
             <a:endParaRPr lang="en-US" dirty="0"/>
           </a:p>
@@ -5889,7 +5766,7 @@
             <a:fld id="{75693FD4-8F83-4EF7-AC3F-0DC0388986B0}" type="slidenum">
               <a:rPr lang="en-US" smtClean="0"/>
               <a:pPr/>
-              <a:t>18</a:t>
+              <a:t>17</a:t>
             </a:fld>
             <a:endParaRPr lang="en-US" dirty="0"/>
           </a:p>
@@ -5898,7 +5775,7 @@
     </p:spTree>
     <p:extLst>
       <p:ext uri="{BB962C8B-B14F-4D97-AF65-F5344CB8AC3E}">
-        <p14:creationId xmlns:p14="http://schemas.microsoft.com/office/powerpoint/2010/main" val="2448196234"/>
+        <p14:creationId xmlns:p14="http://schemas.microsoft.com/office/powerpoint/2010/main" val="2748494377"/>
       </p:ext>
     </p:extLst>
   </p:cSld>
@@ -5953,12 +5830,16 @@
           <a:lstStyle/>
           <a:p>
             <a:r>
+              <a:rPr lang="en-US" dirty="0" smtClean="0"/>
+              <a:t>Each Controller method so far has been too different to create </a:t>
+            </a:r>
+            <a:r>
               <a:rPr lang="en-US" dirty="0" err="1" smtClean="0"/>
-              <a:t>Uck</a:t>
-            </a:r>
-            <a:r>
-              <a:rPr lang="en-US" dirty="0" smtClean="0"/>
-              <a:t>, I know. It can be worse which makes the test even more fragile.</a:t>
+              <a:t>resharper</a:t>
+            </a:r>
+            <a:r>
+              <a:rPr lang="en-US" dirty="0" smtClean="0"/>
+              <a:t> templates for them.</a:t>
             </a:r>
           </a:p>
           <a:p>
@@ -5966,40 +5847,125 @@
           </a:p>
           <a:p>
             <a:r>
+              <a:rPr lang="en-US" dirty="0" smtClean="0"/>
+              <a:t>There is a abstract base class helper</a:t>
+            </a:r>
+            <a:r>
+              <a:rPr lang="en-US" baseline="0" dirty="0" smtClean="0"/>
+              <a:t> to fake and mock in </a:t>
+            </a:r>
+            <a:r>
+              <a:rPr lang="en-US" baseline="0" dirty="0" err="1" smtClean="0"/>
+              <a:t>UCDArch.Testing</a:t>
+            </a:r>
+            <a:endParaRPr lang="en-US" dirty="0" smtClean="0"/>
+          </a:p>
+          <a:p>
+            <a:endParaRPr lang="en-US" dirty="0" smtClean="0"/>
+          </a:p>
+          <a:p>
+            <a:r>
+              <a:rPr lang="en-US" dirty="0" smtClean="0"/>
+              <a:t>Doing</a:t>
+            </a:r>
+            <a:r>
+              <a:rPr lang="en-US" baseline="0" dirty="0" smtClean="0"/>
+              <a:t> </a:t>
+            </a:r>
+            <a:r>
+              <a:rPr lang="en-US" baseline="0" dirty="0" smtClean="0"/>
+              <a:t>boundary tests for controller methods gets uglier as the complexity of the method increases. Using interface methods reduces some of this complexity. Avoid static methods as much as possible as they can’t be mocked (not easily)</a:t>
+            </a:r>
+          </a:p>
+          <a:p>
+            <a:endParaRPr lang="en-US" baseline="0" dirty="0" smtClean="0"/>
+          </a:p>
+          <a:p>
+            <a:r>
+              <a:rPr lang="en-US" dirty="0" smtClean="0"/>
+              <a:t>Any repository mocking is usually done in the class initialization.</a:t>
+            </a:r>
+          </a:p>
+          <a:p>
+            <a:r>
+              <a:rPr lang="en-US" dirty="0" smtClean="0"/>
+              <a:t>Basically, any parameters passed to the controller’s class (injection) </a:t>
+            </a:r>
+            <a:r>
+              <a:rPr lang="en-US" dirty="0" smtClean="0"/>
+              <a:t>have to </a:t>
+            </a:r>
+            <a:r>
+              <a:rPr lang="en-US" dirty="0" smtClean="0"/>
+              <a:t>be mocked in the test </a:t>
+            </a:r>
+            <a:r>
               <a:rPr lang="en-US" dirty="0" err="1" smtClean="0"/>
-              <a:t>HasSameId</a:t>
-            </a:r>
-            <a:r>
-              <a:rPr lang="en-US" dirty="0" smtClean="0"/>
-              <a:t> is mocked to return false, if </a:t>
-            </a:r>
-            <a:r>
-              <a:rPr lang="en-US" dirty="0" err="1" smtClean="0"/>
-              <a:t>HasAccess</a:t>
-            </a:r>
-            <a:r>
-              <a:rPr lang="en-US" dirty="0" smtClean="0"/>
-              <a:t> was mocked to return false, it would return the same way, but the “</a:t>
-            </a:r>
-            <a:r>
-              <a:rPr lang="en-US" dirty="0" err="1" smtClean="0"/>
-              <a:t>AssertWasCalled</a:t>
-            </a:r>
-            <a:r>
-              <a:rPr lang="en-US" dirty="0" smtClean="0"/>
-              <a:t>” for </a:t>
-            </a:r>
-            <a:r>
-              <a:rPr lang="en-US" dirty="0" err="1" smtClean="0"/>
-              <a:t>HasSameId</a:t>
-            </a:r>
-            <a:r>
-              <a:rPr lang="en-US" dirty="0" smtClean="0"/>
-              <a:t> would not</a:t>
+              <a:t>init.</a:t>
+            </a:r>
+            <a:endParaRPr lang="en-US" dirty="0" smtClean="0"/>
+          </a:p>
+          <a:p>
+            <a:endParaRPr lang="en-US" dirty="0" smtClean="0"/>
+          </a:p>
+          <a:p>
+            <a:r>
+              <a:rPr lang="en-US" dirty="0" smtClean="0"/>
+              <a:t>If</a:t>
             </a:r>
             <a:r>
               <a:rPr lang="en-US" baseline="0" dirty="0" smtClean="0"/>
-              <a:t> have been reached.</a:t>
+              <a:t> </a:t>
+            </a:r>
+            <a:r>
+              <a:rPr lang="en-US" baseline="0" dirty="0" smtClean="0"/>
+              <a:t>possible, </a:t>
+            </a:r>
+            <a:r>
+              <a:rPr lang="en-US" baseline="0" dirty="0" smtClean="0"/>
+              <a:t>create a method to fake all the data you will need for all your tests, it really cleans up the arrange part of the tests. </a:t>
+            </a:r>
+          </a:p>
+          <a:p>
+            <a:endParaRPr lang="en-US" baseline="0" dirty="0" smtClean="0"/>
+          </a:p>
+          <a:p>
+            <a:r>
+              <a:rPr lang="en-US" baseline="0" dirty="0" smtClean="0"/>
+              <a:t>If the controller is checking the </a:t>
+            </a:r>
+            <a:r>
+              <a:rPr lang="en-US" baseline="0" dirty="0" err="1" smtClean="0"/>
+              <a:t>CurrentUser’s</a:t>
+            </a:r>
+            <a:r>
+              <a:rPr lang="en-US" baseline="0" dirty="0" smtClean="0"/>
+              <a:t> identity this needs to be mocked. There is a </a:t>
+            </a:r>
+            <a:r>
+              <a:rPr lang="en-US" baseline="0" dirty="0" err="1" smtClean="0"/>
+              <a:t>methed</a:t>
+            </a:r>
+            <a:r>
+              <a:rPr lang="en-US" baseline="0" dirty="0" smtClean="0"/>
+              <a:t> in </a:t>
+            </a:r>
+            <a:r>
+              <a:rPr lang="en-US" baseline="0" dirty="0" err="1" smtClean="0"/>
+              <a:t>UCDArch.Testing</a:t>
+            </a:r>
+            <a:r>
+              <a:rPr lang="en-US" baseline="0" dirty="0" smtClean="0"/>
+              <a:t> to mock this as well as any files that may be returned.</a:t>
+            </a:r>
+          </a:p>
+          <a:p>
+            <a:endParaRPr lang="en-US" baseline="0" dirty="0" smtClean="0"/>
+          </a:p>
+          <a:p>
+            <a:r>
+              <a:rPr lang="en-US" baseline="0" dirty="0" smtClean="0"/>
+              <a:t>Usually we test what is returned (redirect/view), error messages, and that expected code is executed.</a:t>
             </a:r>
             <a:endParaRPr lang="en-US" dirty="0"/>
           </a:p>
@@ -6023,7 +5989,7 @@
             <a:fld id="{75693FD4-8F83-4EF7-AC3F-0DC0388986B0}" type="slidenum">
               <a:rPr lang="en-US" smtClean="0"/>
               <a:pPr/>
-              <a:t>19</a:t>
+              <a:t>18</a:t>
             </a:fld>
             <a:endParaRPr lang="en-US" dirty="0"/>
           </a:p>
@@ -6032,7 +5998,7 @@
     </p:spTree>
     <p:extLst>
       <p:ext uri="{BB962C8B-B14F-4D97-AF65-F5344CB8AC3E}">
-        <p14:creationId xmlns:p14="http://schemas.microsoft.com/office/powerpoint/2010/main" val="780494779"/>
+        <p14:creationId xmlns:p14="http://schemas.microsoft.com/office/powerpoint/2010/main" val="2448196234"/>
       </p:ext>
     </p:extLst>
   </p:cSld>
@@ -6088,35 +6054,52 @@
           <a:p>
             <a:r>
               <a:rPr lang="en-US" dirty="0" smtClean="0"/>
-              <a:t>Controller Attributes are never run from unit tests, Reflection at least lets us know the attribute is there or not.</a:t>
-            </a:r>
-          </a:p>
-          <a:p>
-            <a:r>
-              <a:rPr lang="en-US" dirty="0" smtClean="0"/>
-              <a:t>Similar</a:t>
+              <a:t>Yuck</a:t>
+            </a:r>
+            <a:r>
+              <a:rPr lang="en-US" dirty="0" smtClean="0"/>
+              <a:t>, I know. It can be worse which makes the test even more fragile.</a:t>
+            </a:r>
+          </a:p>
+          <a:p>
+            <a:endParaRPr lang="en-US" dirty="0" smtClean="0"/>
+          </a:p>
+          <a:p>
+            <a:r>
+              <a:rPr lang="en-US" dirty="0" err="1" smtClean="0"/>
+              <a:t>HasSameId</a:t>
+            </a:r>
+            <a:r>
+              <a:rPr lang="en-US" dirty="0" smtClean="0"/>
+              <a:t> is mocked to return false, if </a:t>
+            </a:r>
+            <a:r>
+              <a:rPr lang="en-US" dirty="0" err="1" smtClean="0"/>
+              <a:t>HasAccess</a:t>
+            </a:r>
+            <a:r>
+              <a:rPr lang="en-US" dirty="0" smtClean="0"/>
+              <a:t> was mocked to return false, it would return the same way, but the “</a:t>
+            </a:r>
+            <a:r>
+              <a:rPr lang="en-US" dirty="0" err="1" smtClean="0"/>
+              <a:t>AssertWasCalled</a:t>
+            </a:r>
+            <a:r>
+              <a:rPr lang="en-US" dirty="0" smtClean="0"/>
+              <a:t>” for </a:t>
+            </a:r>
+            <a:r>
+              <a:rPr lang="en-US" dirty="0" err="1" smtClean="0"/>
+              <a:t>HasSameId</a:t>
+            </a:r>
+            <a:r>
+              <a:rPr lang="en-US" dirty="0" smtClean="0"/>
+              <a:t> would not</a:t>
             </a:r>
             <a:r>
               <a:rPr lang="en-US" baseline="0" dirty="0" smtClean="0"/>
-              <a:t> to repository tests, I use these for code coverage as I have a count of the public methods.</a:t>
-            </a:r>
-          </a:p>
-          <a:p>
-            <a:endParaRPr lang="en-US" baseline="0" dirty="0" smtClean="0"/>
-          </a:p>
-          <a:p>
-            <a:r>
-              <a:rPr lang="en-US" baseline="0" dirty="0" smtClean="0"/>
-              <a:t>I check the class attributes, then each method’s attributes too.</a:t>
-            </a:r>
-          </a:p>
-          <a:p>
-            <a:endParaRPr lang="en-US" baseline="0" dirty="0" smtClean="0"/>
-          </a:p>
-          <a:p>
-            <a:r>
-              <a:rPr lang="en-US" baseline="0" dirty="0" smtClean="0"/>
-              <a:t>This is particularly important for Authorization attributes</a:t>
+              <a:t> have been reached.</a:t>
             </a:r>
             <a:endParaRPr lang="en-US" dirty="0"/>
           </a:p>
@@ -6140,7 +6123,7 @@
             <a:fld id="{75693FD4-8F83-4EF7-AC3F-0DC0388986B0}" type="slidenum">
               <a:rPr lang="en-US" smtClean="0"/>
               <a:pPr/>
-              <a:t>20</a:t>
+              <a:t>19</a:t>
             </a:fld>
             <a:endParaRPr lang="en-US" dirty="0"/>
           </a:p>
@@ -6149,7 +6132,7 @@
     </p:spTree>
     <p:extLst>
       <p:ext uri="{BB962C8B-B14F-4D97-AF65-F5344CB8AC3E}">
-        <p14:creationId xmlns:p14="http://schemas.microsoft.com/office/powerpoint/2010/main" val="2335397108"/>
+        <p14:creationId xmlns:p14="http://schemas.microsoft.com/office/powerpoint/2010/main" val="780494779"/>
       </p:ext>
     </p:extLst>
   </p:cSld>
@@ -6240,12 +6223,17 @@
             </a:pPr>
             <a:r>
               <a:rPr lang="en-US" sz="1200" dirty="0" smtClean="0"/>
-              <a:t>1) basically how to</a:t>
+              <a:t>1) </a:t>
+            </a:r>
+            <a:r>
+              <a:rPr lang="en-US" sz="1200" dirty="0" smtClean="0"/>
+              <a:t>How to</a:t>
             </a:r>
             <a:r>
               <a:rPr lang="en-US" sz="1200" baseline="0" dirty="0" smtClean="0"/>
               <a:t> format the tests</a:t>
             </a:r>
+            <a:endParaRPr lang="en-US" sz="1200" baseline="0" dirty="0" smtClean="0"/>
           </a:p>
           <a:p>
             <a:pPr marL="228600" marR="0" indent="-228600" algn="l" defTabSz="914400" rtl="0" eaLnBrk="1" fontAlgn="auto" latinLnBrk="0" hangingPunct="1">
@@ -6267,7 +6255,15 @@
             </a:pPr>
             <a:r>
               <a:rPr lang="en-US" sz="1200" baseline="0" dirty="0" smtClean="0"/>
-              <a:t>2) the different types of tests (repository, controller, etc.)</a:t>
+              <a:t>2) </a:t>
+            </a:r>
+            <a:r>
+              <a:rPr lang="en-US" sz="1200" baseline="0" dirty="0" smtClean="0"/>
+              <a:t>Different </a:t>
+            </a:r>
+            <a:r>
+              <a:rPr lang="en-US" sz="1200" baseline="0" dirty="0" smtClean="0"/>
+              <a:t>types of tests (repository, controller, etc.)</a:t>
             </a:r>
           </a:p>
           <a:p>
@@ -6290,8 +6286,13 @@
             </a:pPr>
             <a:r>
               <a:rPr lang="en-US" sz="1200" baseline="0" dirty="0" smtClean="0"/>
-              <a:t>3) the different folders within the test project and where code and tests are located</a:t>
-            </a:r>
+              <a:t>3) </a:t>
+            </a:r>
+            <a:r>
+              <a:rPr lang="en-US" sz="1200" baseline="0" dirty="0" smtClean="0"/>
+              <a:t>How to name folders within the test project</a:t>
+            </a:r>
+            <a:endParaRPr lang="en-US" sz="1200" baseline="0" dirty="0" smtClean="0"/>
           </a:p>
           <a:p>
             <a:pPr marL="228600" marR="0" indent="-228600" algn="l" defTabSz="914400" rtl="0" eaLnBrk="1" fontAlgn="auto" latinLnBrk="0" hangingPunct="1">
@@ -6313,8 +6314,13 @@
             </a:pPr>
             <a:r>
               <a:rPr lang="en-US" sz="1200" baseline="0" dirty="0" smtClean="0"/>
-              <a:t>4) Some of the helpers and abstract base classes we use</a:t>
-            </a:r>
+              <a:t>4) </a:t>
+            </a:r>
+            <a:r>
+              <a:rPr lang="en-US" sz="1200" baseline="0" dirty="0" smtClean="0"/>
+              <a:t>Helper classes and Abstract Base classes I’ve created</a:t>
+            </a:r>
+            <a:endParaRPr lang="en-US" sz="1200" baseline="0" dirty="0" smtClean="0"/>
           </a:p>
           <a:p>
             <a:pPr marL="228600" marR="0" indent="-228600" algn="l" defTabSz="914400" rtl="0" eaLnBrk="1" fontAlgn="auto" latinLnBrk="0" hangingPunct="1">
@@ -6344,7 +6350,11 @@
             </a:r>
             <a:r>
               <a:rPr lang="en-US" sz="1200" baseline="0" dirty="0" smtClean="0"/>
-              <a:t> templates that aid in creating tests</a:t>
+              <a:t> templates </a:t>
+            </a:r>
+            <a:r>
+              <a:rPr lang="en-US" sz="1200" baseline="0" dirty="0" smtClean="0"/>
+              <a:t>For Generating Code</a:t>
             </a:r>
             <a:endParaRPr lang="en-US" sz="1200" dirty="0" smtClean="0"/>
           </a:p>
@@ -6428,7 +6438,59 @@
           <a:p>
             <a:r>
               <a:rPr lang="en-US" dirty="0" smtClean="0"/>
-              <a:t>For each of the 4 attributes found, I would have a test like the bottom one.</a:t>
+              <a:t>Controller Attributes are never run from unit </a:t>
+            </a:r>
+            <a:r>
+              <a:rPr lang="en-US" dirty="0" smtClean="0"/>
+              <a:t>tests</a:t>
+            </a:r>
+          </a:p>
+          <a:p>
+            <a:endParaRPr lang="en-US" dirty="0" smtClean="0"/>
+          </a:p>
+          <a:p>
+            <a:r>
+              <a:rPr lang="en-US" dirty="0" smtClean="0"/>
+              <a:t>Reflection </a:t>
+            </a:r>
+            <a:r>
+              <a:rPr lang="en-US" dirty="0" smtClean="0"/>
+              <a:t>at least lets us know the attribute is there or not</a:t>
+            </a:r>
+            <a:r>
+              <a:rPr lang="en-US" dirty="0" smtClean="0"/>
+              <a:t>.</a:t>
+            </a:r>
+          </a:p>
+          <a:p>
+            <a:endParaRPr lang="en-US" dirty="0" smtClean="0"/>
+          </a:p>
+          <a:p>
+            <a:r>
+              <a:rPr lang="en-US" dirty="0" smtClean="0"/>
+              <a:t>Similar</a:t>
+            </a:r>
+            <a:r>
+              <a:rPr lang="en-US" baseline="0" dirty="0" smtClean="0"/>
+              <a:t> to repository tests, I use these for code coverage as I have a count of the public methods.</a:t>
+            </a:r>
+          </a:p>
+          <a:p>
+            <a:endParaRPr lang="en-US" baseline="0" dirty="0" smtClean="0"/>
+          </a:p>
+          <a:p>
+            <a:r>
+              <a:rPr lang="en-US" baseline="0" dirty="0" smtClean="0"/>
+              <a:t>I check the class attributes, then each method’s attributes too.</a:t>
+            </a:r>
+          </a:p>
+          <a:p>
+            <a:endParaRPr lang="en-US" baseline="0" dirty="0" smtClean="0"/>
+          </a:p>
+          <a:p>
+            <a:r>
+              <a:rPr lang="en-US" baseline="0" dirty="0" smtClean="0"/>
+              <a:t>This is particularly important for Authorization attributes</a:t>
             </a:r>
             <a:endParaRPr lang="en-US" dirty="0"/>
           </a:p>
@@ -6452,7 +6514,7 @@
             <a:fld id="{75693FD4-8F83-4EF7-AC3F-0DC0388986B0}" type="slidenum">
               <a:rPr lang="en-US" smtClean="0"/>
               <a:pPr/>
-              <a:t>21</a:t>
+              <a:t>20</a:t>
             </a:fld>
             <a:endParaRPr lang="en-US" dirty="0"/>
           </a:p>
@@ -6461,7 +6523,7 @@
     </p:spTree>
     <p:extLst>
       <p:ext uri="{BB962C8B-B14F-4D97-AF65-F5344CB8AC3E}">
-        <p14:creationId xmlns:p14="http://schemas.microsoft.com/office/powerpoint/2010/main" val="3640817402"/>
+        <p14:creationId xmlns:p14="http://schemas.microsoft.com/office/powerpoint/2010/main" val="2335397108"/>
       </p:ext>
     </p:extLst>
   </p:cSld>
@@ -6517,28 +6579,48 @@
           <a:p>
             <a:r>
               <a:rPr lang="en-US" dirty="0" smtClean="0"/>
-              <a:t>If you</a:t>
+              <a:t>I check that the controller inherits from the expected base controller</a:t>
+            </a:r>
+          </a:p>
+          <a:p>
+            <a:endParaRPr lang="en-US" dirty="0" smtClean="0"/>
+          </a:p>
+          <a:p>
+            <a:r>
+              <a:rPr lang="en-US" dirty="0" smtClean="0"/>
+              <a:t>I</a:t>
             </a:r>
             <a:r>
               <a:rPr lang="en-US" baseline="0" dirty="0" smtClean="0"/>
-              <a:t> are working on a controller, you may not want the builder to keep showing up errors, you could add an </a:t>
+              <a:t> check that the controller has the expected number of attributes </a:t>
+            </a:r>
+          </a:p>
+          <a:p>
+            <a:r>
+              <a:rPr lang="en-US" baseline="0" dirty="0" smtClean="0"/>
+              <a:t>my </a:t>
             </a:r>
             <a:r>
               <a:rPr lang="en-US" baseline="0" dirty="0" err="1" smtClean="0"/>
-              <a:t>Assert.Inconclusive</a:t>
+              <a:t>resharper</a:t>
             </a:r>
             <a:r>
               <a:rPr lang="en-US" baseline="0" dirty="0" smtClean="0"/>
-              <a:t>(“some message”) You will get that the test failed, but not builder.</a:t>
-            </a:r>
-          </a:p>
-          <a:p>
-            <a:endParaRPr lang="en-US" baseline="0" dirty="0" smtClean="0"/>
-          </a:p>
-          <a:p>
-            <a:r>
-              <a:rPr lang="en-US" baseline="0" dirty="0" smtClean="0"/>
-              <a:t>I like to have a number in the summary for these tests, and the mapping tests, that matches up to a number in the summary of the controller method.</a:t>
+              <a:t> template has a test for three, if you add any to your controller class, these tests need to be modified</a:t>
+            </a:r>
+            <a:endParaRPr lang="en-US" dirty="0" smtClean="0"/>
+          </a:p>
+          <a:p>
+            <a:endParaRPr lang="en-US" dirty="0" smtClean="0"/>
+          </a:p>
+          <a:p>
+            <a:r>
+              <a:rPr lang="en-US" dirty="0" smtClean="0"/>
+              <a:t>For </a:t>
+            </a:r>
+            <a:r>
+              <a:rPr lang="en-US" dirty="0" smtClean="0"/>
+              <a:t>each of the 4 attributes found, I would have a test like the bottom one.</a:t>
             </a:r>
             <a:endParaRPr lang="en-US" dirty="0"/>
           </a:p>
@@ -6562,7 +6644,7 @@
             <a:fld id="{75693FD4-8F83-4EF7-AC3F-0DC0388986B0}" type="slidenum">
               <a:rPr lang="en-US" smtClean="0"/>
               <a:pPr/>
-              <a:t>22</a:t>
+              <a:t>21</a:t>
             </a:fld>
             <a:endParaRPr lang="en-US" dirty="0"/>
           </a:p>
@@ -6571,7 +6653,7 @@
     </p:spTree>
     <p:extLst>
       <p:ext uri="{BB962C8B-B14F-4D97-AF65-F5344CB8AC3E}">
-        <p14:creationId xmlns:p14="http://schemas.microsoft.com/office/powerpoint/2010/main" val="1037723208"/>
+        <p14:creationId xmlns:p14="http://schemas.microsoft.com/office/powerpoint/2010/main" val="3640817402"/>
       </p:ext>
     </p:extLst>
   </p:cSld>
@@ -6627,19 +6709,32 @@
           <a:p>
             <a:r>
               <a:rPr lang="en-US" dirty="0" smtClean="0"/>
-              <a:t>Create has both a Get and</a:t>
+              <a:t>If you</a:t>
             </a:r>
             <a:r>
               <a:rPr lang="en-US" baseline="0" dirty="0" smtClean="0"/>
-              <a:t> Post, so we need to use “</a:t>
+              <a:t> are working on a controller, you may not want the builder to keep showing up errors, you could add an </a:t>
             </a:r>
             <a:r>
               <a:rPr lang="en-US" baseline="0" dirty="0" err="1" smtClean="0"/>
-              <a:t>ElementAt</a:t>
+              <a:t>Assert.Inconclusive</a:t>
             </a:r>
             <a:r>
               <a:rPr lang="en-US" baseline="0" dirty="0" smtClean="0"/>
-              <a:t>()” to identify which one we are looking at.</a:t>
+              <a:t>(“some message”) You will get that the test failed, but not builder.</a:t>
+            </a:r>
+          </a:p>
+          <a:p>
+            <a:endParaRPr lang="en-US" baseline="0" dirty="0" smtClean="0"/>
+          </a:p>
+          <a:p>
+            <a:r>
+              <a:rPr lang="en-US" baseline="0" dirty="0" smtClean="0"/>
+              <a:t>I like to have a number in the summary for these tests, and the mapping tests, that matches up to a number in the summary of the controller method</a:t>
+            </a:r>
+            <a:r>
+              <a:rPr lang="en-US" baseline="0" dirty="0" smtClean="0"/>
+              <a:t>.</a:t>
             </a:r>
             <a:endParaRPr lang="en-US" dirty="0"/>
           </a:p>
@@ -6663,7 +6758,7 @@
             <a:fld id="{75693FD4-8F83-4EF7-AC3F-0DC0388986B0}" type="slidenum">
               <a:rPr lang="en-US" smtClean="0"/>
               <a:pPr/>
-              <a:t>23</a:t>
+              <a:t>22</a:t>
             </a:fld>
             <a:endParaRPr lang="en-US" dirty="0"/>
           </a:p>
@@ -6672,7 +6767,7 @@
     </p:spTree>
     <p:extLst>
       <p:ext uri="{BB962C8B-B14F-4D97-AF65-F5344CB8AC3E}">
-        <p14:creationId xmlns:p14="http://schemas.microsoft.com/office/powerpoint/2010/main" val="2620657771"/>
+        <p14:creationId xmlns:p14="http://schemas.microsoft.com/office/powerpoint/2010/main" val="1037723208"/>
       </p:ext>
     </p:extLst>
   </p:cSld>
@@ -6728,13 +6823,19 @@
           <a:p>
             <a:r>
               <a:rPr lang="en-US" dirty="0" smtClean="0"/>
-              <a:t>This post method has two attributes. </a:t>
-            </a:r>
-          </a:p>
-          <a:p>
-            <a:r>
-              <a:rPr lang="en-US" dirty="0" smtClean="0"/>
-              <a:t>We can also example values within the attribute</a:t>
+              <a:t>Create has both a Get and</a:t>
+            </a:r>
+            <a:r>
+              <a:rPr lang="en-US" baseline="0" dirty="0" smtClean="0"/>
+              <a:t> Post, so we need to use “</a:t>
+            </a:r>
+            <a:r>
+              <a:rPr lang="en-US" baseline="0" dirty="0" err="1" smtClean="0"/>
+              <a:t>ElementAt</a:t>
+            </a:r>
+            <a:r>
+              <a:rPr lang="en-US" baseline="0" dirty="0" smtClean="0"/>
+              <a:t>()” to identify which one we are looking at.</a:t>
             </a:r>
             <a:endParaRPr lang="en-US" dirty="0"/>
           </a:p>
@@ -6758,7 +6859,7 @@
             <a:fld id="{75693FD4-8F83-4EF7-AC3F-0DC0388986B0}" type="slidenum">
               <a:rPr lang="en-US" smtClean="0"/>
               <a:pPr/>
-              <a:t>24</a:t>
+              <a:t>23</a:t>
             </a:fld>
             <a:endParaRPr lang="en-US" dirty="0"/>
           </a:p>
@@ -6767,7 +6868,7 @@
     </p:spTree>
     <p:extLst>
       <p:ext uri="{BB962C8B-B14F-4D97-AF65-F5344CB8AC3E}">
-        <p14:creationId xmlns:p14="http://schemas.microsoft.com/office/powerpoint/2010/main" val="2365652880"/>
+        <p14:creationId xmlns:p14="http://schemas.microsoft.com/office/powerpoint/2010/main" val="2620657771"/>
       </p:ext>
     </p:extLst>
   </p:cSld>
@@ -6823,14 +6924,26 @@
           <a:p>
             <a:r>
               <a:rPr lang="en-US" dirty="0" smtClean="0"/>
-              <a:t>If one of your interface methods sends</a:t>
-            </a:r>
-            <a:r>
-              <a:rPr lang="en-US" baseline="0" dirty="0" smtClean="0"/>
-              <a:t> an email, you probably don’t want to test it.</a:t>
-            </a:r>
-          </a:p>
-          <a:p>
+              <a:t>This post method has two attributes. </a:t>
+            </a:r>
+            <a:endParaRPr lang="en-US" dirty="0" smtClean="0"/>
+          </a:p>
+          <a:p>
+            <a:endParaRPr lang="en-US" dirty="0" smtClean="0"/>
+          </a:p>
+          <a:p>
+            <a:r>
+              <a:rPr lang="en-US" dirty="0" smtClean="0"/>
+              <a:t>We can also </a:t>
+            </a:r>
+            <a:r>
+              <a:rPr lang="en-US" dirty="0" smtClean="0"/>
+              <a:t>assert values </a:t>
+            </a:r>
+            <a:r>
+              <a:rPr lang="en-US" dirty="0" smtClean="0"/>
+              <a:t>within the attribute</a:t>
+            </a:r>
             <a:endParaRPr lang="en-US" dirty="0"/>
           </a:p>
         </p:txBody>
@@ -6853,7 +6966,7 @@
             <a:fld id="{75693FD4-8F83-4EF7-AC3F-0DC0388986B0}" type="slidenum">
               <a:rPr lang="en-US" smtClean="0"/>
               <a:pPr/>
-              <a:t>25</a:t>
+              <a:t>24</a:t>
             </a:fld>
             <a:endParaRPr lang="en-US" dirty="0"/>
           </a:p>
@@ -6862,7 +6975,7 @@
     </p:spTree>
     <p:extLst>
       <p:ext uri="{BB962C8B-B14F-4D97-AF65-F5344CB8AC3E}">
-        <p14:creationId xmlns:p14="http://schemas.microsoft.com/office/powerpoint/2010/main" val="1835671339"/>
+        <p14:creationId xmlns:p14="http://schemas.microsoft.com/office/powerpoint/2010/main" val="2365652880"/>
       </p:ext>
     </p:extLst>
   </p:cSld>
@@ -6916,6 +7029,16 @@
           <a:bodyPr/>
           <a:lstStyle/>
           <a:p>
+            <a:r>
+              <a:rPr lang="en-US" dirty="0" smtClean="0"/>
+              <a:t>If one of your interface methods sends</a:t>
+            </a:r>
+            <a:r>
+              <a:rPr lang="en-US" baseline="0" dirty="0" smtClean="0"/>
+              <a:t> an email, you probably don’t want to test it.</a:t>
+            </a:r>
+          </a:p>
+          <a:p>
             <a:endParaRPr lang="en-US" dirty="0"/>
           </a:p>
         </p:txBody>
@@ -6938,7 +7061,7 @@
             <a:fld id="{75693FD4-8F83-4EF7-AC3F-0DC0388986B0}" type="slidenum">
               <a:rPr lang="en-US" smtClean="0"/>
               <a:pPr/>
-              <a:t>28</a:t>
+              <a:t>25</a:t>
             </a:fld>
             <a:endParaRPr lang="en-US" dirty="0"/>
           </a:p>
@@ -6947,7 +7070,7 @@
     </p:spTree>
     <p:extLst>
       <p:ext uri="{BB962C8B-B14F-4D97-AF65-F5344CB8AC3E}">
-        <p14:creationId xmlns:p14="http://schemas.microsoft.com/office/powerpoint/2010/main" val="1440932894"/>
+        <p14:creationId xmlns:p14="http://schemas.microsoft.com/office/powerpoint/2010/main" val="1835671339"/>
       </p:ext>
     </p:extLst>
   </p:cSld>
@@ -7003,17 +7126,29 @@
           <a:p>
             <a:r>
               <a:rPr lang="en-US" dirty="0" smtClean="0"/>
-              <a:t>Controller tests often get very long which causes </a:t>
-            </a:r>
-            <a:r>
-              <a:rPr lang="en-US" dirty="0" err="1" smtClean="0"/>
-              <a:t>resharper</a:t>
-            </a:r>
-            <a:r>
-              <a:rPr lang="en-US" dirty="0" smtClean="0"/>
-              <a:t> to slow down. I like to break these into partial classes.</a:t>
-            </a:r>
-            <a:endParaRPr lang="en-US" dirty="0"/>
+              <a:t>Top one is the constructor for the tests</a:t>
+            </a:r>
+          </a:p>
+          <a:p>
+            <a:endParaRPr lang="en-US" dirty="0" smtClean="0"/>
+          </a:p>
+          <a:p>
+            <a:r>
+              <a:rPr lang="en-US" dirty="0" smtClean="0"/>
+              <a:t>Second</a:t>
+            </a:r>
+            <a:r>
+              <a:rPr lang="en-US" baseline="0" dirty="0" smtClean="0"/>
+              <a:t> one checks that the </a:t>
+            </a:r>
+            <a:r>
+              <a:rPr lang="en-US" baseline="0" dirty="0" err="1" smtClean="0"/>
+              <a:t>EmailQueue</a:t>
+            </a:r>
+            <a:r>
+              <a:rPr lang="en-US" baseline="0" dirty="0" smtClean="0"/>
+              <a:t> record was saved (once) with expected values</a:t>
+            </a:r>
           </a:p>
         </p:txBody>
       </p:sp>
@@ -7035,7 +7170,7 @@
             <a:fld id="{75693FD4-8F83-4EF7-AC3F-0DC0388986B0}" type="slidenum">
               <a:rPr lang="en-US" smtClean="0"/>
               <a:pPr/>
-              <a:t>29</a:t>
+              <a:t>26</a:t>
             </a:fld>
             <a:endParaRPr lang="en-US" dirty="0"/>
           </a:p>
@@ -7044,7 +7179,7 @@
     </p:spTree>
     <p:extLst>
       <p:ext uri="{BB962C8B-B14F-4D97-AF65-F5344CB8AC3E}">
-        <p14:creationId xmlns:p14="http://schemas.microsoft.com/office/powerpoint/2010/main" val="2426448396"/>
+        <p14:creationId xmlns:p14="http://schemas.microsoft.com/office/powerpoint/2010/main" val="3629447452"/>
       </p:ext>
     </p:extLst>
   </p:cSld>
@@ -7098,26 +7233,6 @@
           <a:bodyPr/>
           <a:lstStyle/>
           <a:p>
-            <a:r>
-              <a:rPr lang="en-US" dirty="0" smtClean="0"/>
-              <a:t>You will probably need to edit </a:t>
-            </a:r>
-            <a:r>
-              <a:rPr lang="en-US" dirty="0" err="1" smtClean="0"/>
-              <a:t>CreateValidEntites</a:t>
-            </a:r>
-            <a:r>
-              <a:rPr lang="en-US" dirty="0" smtClean="0"/>
-              <a:t> and </a:t>
-            </a:r>
-            <a:r>
-              <a:rPr lang="en-US" dirty="0" err="1" smtClean="0"/>
-              <a:t>ControllerRecordFakes</a:t>
-            </a:r>
-            <a:r>
-              <a:rPr lang="en-US" dirty="0" smtClean="0"/>
-              <a:t> as you write tests.</a:t>
-            </a:r>
             <a:endParaRPr lang="en-US" dirty="0"/>
           </a:p>
         </p:txBody>
@@ -7140,7 +7255,7 @@
             <a:fld id="{75693FD4-8F83-4EF7-AC3F-0DC0388986B0}" type="slidenum">
               <a:rPr lang="en-US" smtClean="0"/>
               <a:pPr/>
-              <a:t>30</a:t>
+              <a:t>28</a:t>
             </a:fld>
             <a:endParaRPr lang="en-US" dirty="0"/>
           </a:p>
@@ -7149,7 +7264,7 @@
     </p:spTree>
     <p:extLst>
       <p:ext uri="{BB962C8B-B14F-4D97-AF65-F5344CB8AC3E}">
-        <p14:creationId xmlns:p14="http://schemas.microsoft.com/office/powerpoint/2010/main" val="1506106595"/>
+        <p14:creationId xmlns:p14="http://schemas.microsoft.com/office/powerpoint/2010/main" val="1440932894"/>
       </p:ext>
     </p:extLst>
   </p:cSld>
@@ -7205,7 +7320,15 @@
           <a:p>
             <a:r>
               <a:rPr lang="en-US" dirty="0" smtClean="0"/>
-              <a:t>If you have any.</a:t>
+              <a:t>Controller tests often get very long which causes </a:t>
+            </a:r>
+            <a:r>
+              <a:rPr lang="en-US" dirty="0" err="1" smtClean="0"/>
+              <a:t>resharper</a:t>
+            </a:r>
+            <a:r>
+              <a:rPr lang="en-US" dirty="0" smtClean="0"/>
+              <a:t> to slow down. I like to break these into partial classes.</a:t>
             </a:r>
             <a:endParaRPr lang="en-US" dirty="0"/>
           </a:p>
@@ -7229,7 +7352,7 @@
             <a:fld id="{75693FD4-8F83-4EF7-AC3F-0DC0388986B0}" type="slidenum">
               <a:rPr lang="en-US" smtClean="0"/>
               <a:pPr/>
-              <a:t>31</a:t>
+              <a:t>29</a:t>
             </a:fld>
             <a:endParaRPr lang="en-US" dirty="0"/>
           </a:p>
@@ -7238,7 +7361,7 @@
     </p:spTree>
     <p:extLst>
       <p:ext uri="{BB962C8B-B14F-4D97-AF65-F5344CB8AC3E}">
-        <p14:creationId xmlns:p14="http://schemas.microsoft.com/office/powerpoint/2010/main" val="3340220979"/>
+        <p14:creationId xmlns:p14="http://schemas.microsoft.com/office/powerpoint/2010/main" val="2426448396"/>
       </p:ext>
     </p:extLst>
   </p:cSld>
@@ -7292,6 +7415,26 @@
           <a:bodyPr/>
           <a:lstStyle/>
           <a:p>
+            <a:r>
+              <a:rPr lang="en-US" dirty="0" smtClean="0"/>
+              <a:t>You will probably need to edit </a:t>
+            </a:r>
+            <a:r>
+              <a:rPr lang="en-US" dirty="0" err="1" smtClean="0"/>
+              <a:t>CreateValidEntites</a:t>
+            </a:r>
+            <a:r>
+              <a:rPr lang="en-US" dirty="0" smtClean="0"/>
+              <a:t> and </a:t>
+            </a:r>
+            <a:r>
+              <a:rPr lang="en-US" dirty="0" err="1" smtClean="0"/>
+              <a:t>ControllerRecordFakes</a:t>
+            </a:r>
+            <a:r>
+              <a:rPr lang="en-US" dirty="0" smtClean="0"/>
+              <a:t> as you write tests.</a:t>
+            </a:r>
             <a:endParaRPr lang="en-US" dirty="0"/>
           </a:p>
         </p:txBody>
@@ -7314,7 +7457,7 @@
             <a:fld id="{75693FD4-8F83-4EF7-AC3F-0DC0388986B0}" type="slidenum">
               <a:rPr lang="en-US" smtClean="0"/>
               <a:pPr/>
-              <a:t>32</a:t>
+              <a:t>30</a:t>
             </a:fld>
             <a:endParaRPr lang="en-US" dirty="0"/>
           </a:p>
@@ -7323,7 +7466,7 @@
     </p:spTree>
     <p:extLst>
       <p:ext uri="{BB962C8B-B14F-4D97-AF65-F5344CB8AC3E}">
-        <p14:creationId xmlns:p14="http://schemas.microsoft.com/office/powerpoint/2010/main" val="3307007493"/>
+        <p14:creationId xmlns:p14="http://schemas.microsoft.com/office/powerpoint/2010/main" val="1506106595"/>
       </p:ext>
     </p:extLst>
   </p:cSld>
@@ -7486,79 +7629,8 @@
           <a:lstStyle/>
           <a:p>
             <a:r>
-              <a:rPr lang="en-US" dirty="0" err="1" smtClean="0"/>
-              <a:t>ControllerRecordFakes</a:t>
-            </a:r>
-            <a:r>
-              <a:rPr lang="en-US" baseline="0" dirty="0" smtClean="0"/>
-              <a:t> is an abstract base class that makes it a lot easier to fake data for Controller tests. It fakes, </a:t>
-            </a:r>
-            <a:r>
-              <a:rPr lang="en-US" baseline="0" dirty="0" err="1" smtClean="0"/>
-              <a:t>GetNullableById</a:t>
-            </a:r>
-            <a:r>
-              <a:rPr lang="en-US" baseline="0" dirty="0" smtClean="0"/>
-              <a:t>, </a:t>
-            </a:r>
-            <a:r>
-              <a:rPr lang="en-US" baseline="0" dirty="0" err="1" smtClean="0"/>
-              <a:t>Queryable</a:t>
-            </a:r>
-            <a:r>
-              <a:rPr lang="en-US" baseline="0" dirty="0" smtClean="0"/>
-              <a:t>, and </a:t>
-            </a:r>
-            <a:r>
-              <a:rPr lang="en-US" baseline="0" dirty="0" err="1" smtClean="0"/>
-              <a:t>GetAll</a:t>
-            </a:r>
-            <a:endParaRPr lang="en-US" baseline="0" dirty="0" smtClean="0"/>
-          </a:p>
-          <a:p>
-            <a:endParaRPr lang="en-US" baseline="0" dirty="0" smtClean="0"/>
-          </a:p>
-          <a:p>
-            <a:r>
-              <a:rPr lang="en-US" baseline="0" dirty="0" err="1" smtClean="0"/>
-              <a:t>CreateValidEntities</a:t>
-            </a:r>
-            <a:r>
-              <a:rPr lang="en-US" baseline="0" dirty="0" smtClean="0"/>
-              <a:t> is where you would create a static method for each of your tables, and populate the required fields. String fields I always populate as The </a:t>
-            </a:r>
-            <a:r>
-              <a:rPr lang="en-US" baseline="0" dirty="0" err="1" smtClean="0"/>
-              <a:t>FieldName</a:t>
-            </a:r>
-            <a:r>
-              <a:rPr lang="en-US" baseline="0" dirty="0" smtClean="0"/>
-              <a:t> + counter if the counter is not null. This ties in with my Repository abstract base class methods.</a:t>
-            </a:r>
-          </a:p>
-          <a:p>
-            <a:endParaRPr lang="en-US" baseline="0" dirty="0" smtClean="0"/>
-          </a:p>
-          <a:p>
-            <a:r>
-              <a:rPr lang="en-US" baseline="0" dirty="0" smtClean="0"/>
-              <a:t>If you have </a:t>
-            </a:r>
-            <a:r>
-              <a:rPr lang="en-US" baseline="0" dirty="0" err="1" smtClean="0"/>
-              <a:t>Guid</a:t>
-            </a:r>
-            <a:r>
-              <a:rPr lang="en-US" baseline="0" dirty="0" smtClean="0"/>
-              <a:t> as the Id, </a:t>
-            </a:r>
-            <a:r>
-              <a:rPr lang="en-US" baseline="0" dirty="0" err="1" smtClean="0"/>
-              <a:t>SpecificGuid</a:t>
-            </a:r>
-            <a:r>
-              <a:rPr lang="en-US" baseline="0" dirty="0" smtClean="0"/>
-              <a:t> lets you set your test data to reproducible values.</a:t>
+              <a:rPr lang="en-US" dirty="0" smtClean="0"/>
+              <a:t>If you have any.</a:t>
             </a:r>
             <a:endParaRPr lang="en-US" dirty="0"/>
           </a:p>
@@ -7582,7 +7654,7 @@
             <a:fld id="{75693FD4-8F83-4EF7-AC3F-0DC0388986B0}" type="slidenum">
               <a:rPr lang="en-US" smtClean="0"/>
               <a:pPr/>
-              <a:t>36</a:t>
+              <a:t>31</a:t>
             </a:fld>
             <a:endParaRPr lang="en-US" dirty="0"/>
           </a:p>
@@ -7591,7 +7663,7 @@
     </p:spTree>
     <p:extLst>
       <p:ext uri="{BB962C8B-B14F-4D97-AF65-F5344CB8AC3E}">
-        <p14:creationId xmlns:p14="http://schemas.microsoft.com/office/powerpoint/2010/main" val="1171266295"/>
+        <p14:creationId xmlns:p14="http://schemas.microsoft.com/office/powerpoint/2010/main" val="3340220979"/>
       </p:ext>
     </p:extLst>
   </p:cSld>
@@ -7642,59 +7714,43 @@
         </p:nvSpPr>
         <p:spPr/>
         <p:txBody>
-          <a:bodyPr>
-            <a:normAutofit/>
-          </a:bodyPr>
-          <a:lstStyle/>
-          <a:p>
-            <a:r>
-              <a:rPr lang="en-US" dirty="0" smtClean="0"/>
-              <a:t>Summarize presentation content by restating the important points from the lessons.</a:t>
-            </a:r>
-          </a:p>
-          <a:p>
-            <a:r>
-              <a:rPr lang="en-US" dirty="0" smtClean="0"/>
-              <a:t>What do you want the audience to remember when they leave your presentation?</a:t>
-            </a:r>
-          </a:p>
-          <a:p>
-            <a:endParaRPr lang="en-US" dirty="0" smtClean="0"/>
-          </a:p>
-          <a:p>
-            <a:r>
-              <a:rPr lang="en-US" dirty="0" smtClean="0"/>
-              <a:t>Save your presentation to a video for easy distribution (To create a video, click the File tab, and then click Share.  Under File Types, click Create a Video.)</a:t>
-            </a:r>
-            <a:endParaRPr lang="en-US" dirty="0"/>
-          </a:p>
-        </p:txBody>
-      </p:sp>
-      <p:sp>
-        <p:nvSpPr>
-          <p:cNvPr id="4" name="Slide Number Placeholder 3"/>
-          <p:cNvSpPr>
-            <a:spLocks noGrp="1"/>
-          </p:cNvSpPr>
-          <p:nvPr>
-            <p:ph type="sldNum" sz="quarter" idx="10"/>
-          </p:nvPr>
-        </p:nvSpPr>
-        <p:spPr/>
-        <p:txBody>
           <a:bodyPr/>
           <a:lstStyle/>
           <a:p>
-            <a:fld id="{EC6EAC7D-5A89-47C2-8ABA-56C9C2DEF7A4}" type="slidenum">
+            <a:endParaRPr lang="en-US" dirty="0"/>
+          </a:p>
+        </p:txBody>
+      </p:sp>
+      <p:sp>
+        <p:nvSpPr>
+          <p:cNvPr id="4" name="Slide Number Placeholder 3"/>
+          <p:cNvSpPr>
+            <a:spLocks noGrp="1"/>
+          </p:cNvSpPr>
+          <p:nvPr>
+            <p:ph type="sldNum" sz="quarter" idx="10"/>
+          </p:nvPr>
+        </p:nvSpPr>
+        <p:spPr/>
+        <p:txBody>
+          <a:bodyPr/>
+          <a:lstStyle/>
+          <a:p>
+            <a:fld id="{75693FD4-8F83-4EF7-AC3F-0DC0388986B0}" type="slidenum">
               <a:rPr lang="en-US" smtClean="0"/>
               <a:pPr/>
-              <a:t>41</a:t>
+              <a:t>32</a:t>
             </a:fld>
             <a:endParaRPr lang="en-US" dirty="0"/>
           </a:p>
         </p:txBody>
       </p:sp>
     </p:spTree>
+    <p:extLst>
+      <p:ext uri="{BB962C8B-B14F-4D97-AF65-F5344CB8AC3E}">
+        <p14:creationId xmlns:p14="http://schemas.microsoft.com/office/powerpoint/2010/main" val="3307007493"/>
+      </p:ext>
+    </p:extLst>
   </p:cSld>
   <p:clrMapOvr>
     <a:masterClrMapping/>
@@ -7721,6 +7777,248 @@
       </p:grpSpPr>
       <p:sp>
         <p:nvSpPr>
+          <p:cNvPr id="2" name="Slide Image Placeholder 1"/>
+          <p:cNvSpPr>
+            <a:spLocks noGrp="1" noRot="1" noChangeAspect="1"/>
+          </p:cNvSpPr>
+          <p:nvPr>
+            <p:ph type="sldImg"/>
+          </p:nvPr>
+        </p:nvSpPr>
+        <p:spPr/>
+      </p:sp>
+      <p:sp>
+        <p:nvSpPr>
+          <p:cNvPr id="3" name="Notes Placeholder 2"/>
+          <p:cNvSpPr>
+            <a:spLocks noGrp="1"/>
+          </p:cNvSpPr>
+          <p:nvPr>
+            <p:ph type="body" idx="1"/>
+          </p:nvPr>
+        </p:nvSpPr>
+        <p:spPr/>
+        <p:txBody>
+          <a:bodyPr/>
+          <a:lstStyle/>
+          <a:p>
+            <a:r>
+              <a:rPr lang="en-US" dirty="0" err="1" smtClean="0"/>
+              <a:t>ControllerRecordFakes</a:t>
+            </a:r>
+            <a:r>
+              <a:rPr lang="en-US" baseline="0" dirty="0" smtClean="0"/>
+              <a:t> is an abstract base class that makes it a lot easier to fake data for Controller tests. It fakes, </a:t>
+            </a:r>
+            <a:r>
+              <a:rPr lang="en-US" baseline="0" dirty="0" err="1" smtClean="0"/>
+              <a:t>GetNullableById</a:t>
+            </a:r>
+            <a:r>
+              <a:rPr lang="en-US" baseline="0" dirty="0" smtClean="0"/>
+              <a:t>, </a:t>
+            </a:r>
+            <a:r>
+              <a:rPr lang="en-US" baseline="0" dirty="0" err="1" smtClean="0"/>
+              <a:t>Queryable</a:t>
+            </a:r>
+            <a:r>
+              <a:rPr lang="en-US" baseline="0" dirty="0" smtClean="0"/>
+              <a:t>, and </a:t>
+            </a:r>
+            <a:r>
+              <a:rPr lang="en-US" baseline="0" dirty="0" err="1" smtClean="0"/>
+              <a:t>GetAll</a:t>
+            </a:r>
+            <a:endParaRPr lang="en-US" baseline="0" dirty="0" smtClean="0"/>
+          </a:p>
+          <a:p>
+            <a:endParaRPr lang="en-US" baseline="0" dirty="0" smtClean="0"/>
+          </a:p>
+          <a:p>
+            <a:r>
+              <a:rPr lang="en-US" baseline="0" dirty="0" err="1" smtClean="0"/>
+              <a:t>CreateValidEntities</a:t>
+            </a:r>
+            <a:r>
+              <a:rPr lang="en-US" baseline="0" dirty="0" smtClean="0"/>
+              <a:t> is where you would create a static method for each of your tables, and populate the required fields. String fields I always populate as The </a:t>
+            </a:r>
+            <a:r>
+              <a:rPr lang="en-US" baseline="0" dirty="0" err="1" smtClean="0"/>
+              <a:t>FieldName</a:t>
+            </a:r>
+            <a:r>
+              <a:rPr lang="en-US" baseline="0" dirty="0" smtClean="0"/>
+              <a:t> + counter if the counter is not null. This ties in with my Repository abstract base class methods.</a:t>
+            </a:r>
+          </a:p>
+          <a:p>
+            <a:endParaRPr lang="en-US" baseline="0" dirty="0" smtClean="0"/>
+          </a:p>
+          <a:p>
+            <a:r>
+              <a:rPr lang="en-US" baseline="0" dirty="0" smtClean="0"/>
+              <a:t>If you have </a:t>
+            </a:r>
+            <a:r>
+              <a:rPr lang="en-US" baseline="0" dirty="0" err="1" smtClean="0"/>
+              <a:t>Guid</a:t>
+            </a:r>
+            <a:r>
+              <a:rPr lang="en-US" baseline="0" dirty="0" smtClean="0"/>
+              <a:t> as the Id, </a:t>
+            </a:r>
+            <a:r>
+              <a:rPr lang="en-US" baseline="0" dirty="0" err="1" smtClean="0"/>
+              <a:t>SpecificGuid</a:t>
+            </a:r>
+            <a:r>
+              <a:rPr lang="en-US" baseline="0" dirty="0" smtClean="0"/>
+              <a:t> lets you set your test data to reproducible values.</a:t>
+            </a:r>
+            <a:endParaRPr lang="en-US" dirty="0"/>
+          </a:p>
+        </p:txBody>
+      </p:sp>
+      <p:sp>
+        <p:nvSpPr>
+          <p:cNvPr id="4" name="Slide Number Placeholder 3"/>
+          <p:cNvSpPr>
+            <a:spLocks noGrp="1"/>
+          </p:cNvSpPr>
+          <p:nvPr>
+            <p:ph type="sldNum" sz="quarter" idx="10"/>
+          </p:nvPr>
+        </p:nvSpPr>
+        <p:spPr/>
+        <p:txBody>
+          <a:bodyPr/>
+          <a:lstStyle/>
+          <a:p>
+            <a:fld id="{75693FD4-8F83-4EF7-AC3F-0DC0388986B0}" type="slidenum">
+              <a:rPr lang="en-US" smtClean="0"/>
+              <a:pPr/>
+              <a:t>36</a:t>
+            </a:fld>
+            <a:endParaRPr lang="en-US" dirty="0"/>
+          </a:p>
+        </p:txBody>
+      </p:sp>
+    </p:spTree>
+    <p:extLst>
+      <p:ext uri="{BB962C8B-B14F-4D97-AF65-F5344CB8AC3E}">
+        <p14:creationId xmlns:p14="http://schemas.microsoft.com/office/powerpoint/2010/main" val="1171266295"/>
+      </p:ext>
+    </p:extLst>
+  </p:cSld>
+  <p:clrMapOvr>
+    <a:masterClrMapping/>
+  </p:clrMapOvr>
+</p:notes>
+</file>
+
+<file path=ppt/notesSlides/notesSlide33.xml><?xml version="1.0" encoding="utf-8"?>
+<p:notes xmlns:a="http://schemas.openxmlformats.org/drawingml/2006/main" xmlns:r="http://schemas.openxmlformats.org/officeDocument/2006/relationships" xmlns:p="http://schemas.openxmlformats.org/presentationml/2006/main">
+  <p:cSld>
+    <p:spTree>
+      <p:nvGrpSpPr>
+        <p:cNvPr id="1" name=""/>
+        <p:cNvGrpSpPr/>
+        <p:nvPr/>
+      </p:nvGrpSpPr>
+      <p:grpSpPr>
+        <a:xfrm>
+          <a:off x="0" y="0"/>
+          <a:ext cx="0" cy="0"/>
+          <a:chOff x="0" y="0"/>
+          <a:chExt cx="0" cy="0"/>
+        </a:xfrm>
+      </p:grpSpPr>
+      <p:sp>
+        <p:nvSpPr>
+          <p:cNvPr id="2" name="Slide Image Placeholder 1"/>
+          <p:cNvSpPr>
+            <a:spLocks noGrp="1" noRot="1" noChangeAspect="1"/>
+          </p:cNvSpPr>
+          <p:nvPr>
+            <p:ph type="sldImg"/>
+          </p:nvPr>
+        </p:nvSpPr>
+        <p:spPr/>
+      </p:sp>
+      <p:sp>
+        <p:nvSpPr>
+          <p:cNvPr id="3" name="Notes Placeholder 2"/>
+          <p:cNvSpPr>
+            <a:spLocks noGrp="1"/>
+          </p:cNvSpPr>
+          <p:nvPr>
+            <p:ph type="body" idx="1"/>
+          </p:nvPr>
+        </p:nvSpPr>
+        <p:spPr/>
+        <p:txBody>
+          <a:bodyPr>
+            <a:normAutofit/>
+          </a:bodyPr>
+          <a:lstStyle/>
+          <a:p>
+            <a:endParaRPr lang="en-US" dirty="0"/>
+          </a:p>
+        </p:txBody>
+      </p:sp>
+      <p:sp>
+        <p:nvSpPr>
+          <p:cNvPr id="4" name="Slide Number Placeholder 3"/>
+          <p:cNvSpPr>
+            <a:spLocks noGrp="1"/>
+          </p:cNvSpPr>
+          <p:nvPr>
+            <p:ph type="sldNum" sz="quarter" idx="10"/>
+          </p:nvPr>
+        </p:nvSpPr>
+        <p:spPr/>
+        <p:txBody>
+          <a:bodyPr/>
+          <a:lstStyle/>
+          <a:p>
+            <a:fld id="{EC6EAC7D-5A89-47C2-8ABA-56C9C2DEF7A4}" type="slidenum">
+              <a:rPr lang="en-US" smtClean="0"/>
+              <a:pPr/>
+              <a:t>41</a:t>
+            </a:fld>
+            <a:endParaRPr lang="en-US" dirty="0"/>
+          </a:p>
+        </p:txBody>
+      </p:sp>
+    </p:spTree>
+  </p:cSld>
+  <p:clrMapOvr>
+    <a:masterClrMapping/>
+  </p:clrMapOvr>
+</p:notes>
+</file>
+
+<file path=ppt/notesSlides/notesSlide34.xml><?xml version="1.0" encoding="utf-8"?>
+<p:notes xmlns:a="http://schemas.openxmlformats.org/drawingml/2006/main" xmlns:r="http://schemas.openxmlformats.org/officeDocument/2006/relationships" xmlns:p="http://schemas.openxmlformats.org/presentationml/2006/main">
+  <p:cSld>
+    <p:spTree>
+      <p:nvGrpSpPr>
+        <p:cNvPr id="1" name=""/>
+        <p:cNvGrpSpPr/>
+        <p:nvPr/>
+      </p:nvGrpSpPr>
+      <p:grpSpPr>
+        <a:xfrm>
+          <a:off x="0" y="0"/>
+          <a:ext cx="0" cy="0"/>
+          <a:chOff x="0" y="0"/>
+          <a:chExt cx="0" cy="0"/>
+        </a:xfrm>
+      </p:grpSpPr>
+      <p:sp>
+        <p:nvSpPr>
           <p:cNvPr id="40962" name="Rectangle 23"/>
           <p:cNvSpPr>
             <a:spLocks noGrp="1" noChangeArrowheads="1"/>
@@ -7854,7 +8152,7 @@
 </p:notes>
 </file>
 
-<file path=ppt/notesSlides/notesSlide33.xml><?xml version="1.0" encoding="utf-8"?>
+<file path=ppt/notesSlides/notesSlide35.xml><?xml version="1.0" encoding="utf-8"?>
 <p:notes xmlns:a="http://schemas.openxmlformats.org/drawingml/2006/main" xmlns:r="http://schemas.openxmlformats.org/officeDocument/2006/relationships" xmlns:p="http://schemas.openxmlformats.org/presentationml/2006/main">
   <p:cSld>
     <p:spTree>
@@ -8056,19 +8354,81 @@
             </a:r>
             <a:r>
               <a:rPr lang="en-US" baseline="0" dirty="0" smtClean="0"/>
-              <a:t> Part of the setup is done in the base class</a:t>
-            </a:r>
+              <a:t> </a:t>
+            </a:r>
+            <a:endParaRPr lang="en-US" baseline="0" dirty="0" smtClean="0"/>
           </a:p>
           <a:p>
             <a:r>
               <a:rPr lang="en-US" baseline="0" dirty="0" smtClean="0"/>
-              <a:t>Act: Where the method is called (The controller method, or ensure persistence, remove, etc.)</a:t>
+              <a:t>Setup Data, Remember some setup is done in the class constructor</a:t>
             </a:r>
           </a:p>
           <a:p>
             <a:r>
               <a:rPr lang="en-US" baseline="0" dirty="0" smtClean="0"/>
-              <a:t>Assert: True unit tests have only one assert per unit test, but I find that too restrictive. Even the Unit Tests generated for the Account Controller in </a:t>
+              <a:t>Use methods to setup common data as much as possible. This makes the tests easier to read and fix.</a:t>
+            </a:r>
+          </a:p>
+          <a:p>
+            <a:r>
+              <a:rPr lang="en-US" baseline="0" dirty="0" smtClean="0"/>
+              <a:t>Mock and Fake data</a:t>
+            </a:r>
+          </a:p>
+          <a:p>
+            <a:endParaRPr lang="en-US" baseline="0" dirty="0" smtClean="0"/>
+          </a:p>
+          <a:p>
+            <a:r>
+              <a:rPr lang="en-US" baseline="0" dirty="0" smtClean="0"/>
+              <a:t>Act: </a:t>
+            </a:r>
+            <a:endParaRPr lang="en-US" baseline="0" dirty="0" smtClean="0"/>
+          </a:p>
+          <a:p>
+            <a:r>
+              <a:rPr lang="en-US" baseline="0" dirty="0" smtClean="0"/>
+              <a:t>Where </a:t>
+            </a:r>
+            <a:r>
+              <a:rPr lang="en-US" baseline="0" dirty="0" smtClean="0"/>
+              <a:t>the method is called (The controller method, or ensure persistence, remove, etc</a:t>
+            </a:r>
+            <a:r>
+              <a:rPr lang="en-US" baseline="0" dirty="0" smtClean="0"/>
+              <a:t>.)</a:t>
+            </a:r>
+          </a:p>
+          <a:p>
+            <a:endParaRPr lang="en-US" baseline="0" dirty="0" smtClean="0"/>
+          </a:p>
+          <a:p>
+            <a:r>
+              <a:rPr lang="en-US" baseline="0" dirty="0" smtClean="0"/>
+              <a:t>Assert: </a:t>
+            </a:r>
+            <a:endParaRPr lang="en-US" baseline="0" dirty="0" smtClean="0"/>
+          </a:p>
+          <a:p>
+            <a:r>
+              <a:rPr lang="en-US" baseline="0" dirty="0" smtClean="0"/>
+              <a:t>True </a:t>
+            </a:r>
+            <a:r>
+              <a:rPr lang="en-US" baseline="0" dirty="0" smtClean="0"/>
+              <a:t>unit tests have only one assert per unit test, but I find that too restrictive. </a:t>
+            </a:r>
+            <a:endParaRPr lang="en-US" baseline="0" dirty="0" smtClean="0"/>
+          </a:p>
+          <a:p>
+            <a:r>
+              <a:rPr lang="en-US" baseline="0" dirty="0" smtClean="0"/>
+              <a:t>Even </a:t>
+            </a:r>
+            <a:r>
+              <a:rPr lang="en-US" baseline="0" dirty="0" smtClean="0"/>
+              <a:t>the Unit Tests generated for the Account Controller in </a:t>
             </a:r>
             <a:r>
               <a:rPr lang="en-US" baseline="0" dirty="0" err="1" smtClean="0"/>
@@ -8076,8 +8436,37 @@
             </a:r>
             <a:r>
               <a:rPr lang="en-US" baseline="0" dirty="0" smtClean="0"/>
-              <a:t> assert more than 1 thing per test.</a:t>
-            </a:r>
+              <a:t> assert more than 1 thing per test</a:t>
+            </a:r>
+            <a:r>
+              <a:rPr lang="en-US" baseline="0" dirty="0" smtClean="0"/>
+              <a:t>.</a:t>
+            </a:r>
+          </a:p>
+          <a:p>
+            <a:r>
+              <a:rPr lang="en-US" baseline="0" dirty="0" smtClean="0"/>
+              <a:t>So… </a:t>
+            </a:r>
+          </a:p>
+          <a:p>
+            <a:r>
+              <a:rPr lang="en-US" baseline="0" dirty="0" smtClean="0"/>
+              <a:t>Check for expected vales and the expected code is called</a:t>
+            </a:r>
+          </a:p>
+          <a:p>
+            <a:r>
+              <a:rPr lang="en-US" baseline="0" dirty="0" smtClean="0"/>
+              <a:t>Check that expected parameters we passed to mocked methods (Ensure persistent for example)</a:t>
+            </a:r>
+          </a:p>
+          <a:p>
+            <a:r>
+              <a:rPr lang="en-US" baseline="0" dirty="0" smtClean="0"/>
+              <a:t>Inconclusive fails locally, but not on builder. You can also use Ignore in the Test attribute.</a:t>
+            </a:r>
+            <a:endParaRPr lang="en-US" baseline="0" dirty="0" smtClean="0"/>
           </a:p>
           <a:p>
             <a:endParaRPr lang="en-US" baseline="0" dirty="0" smtClean="0"/>
@@ -8099,11 +8488,15 @@
             </a:r>
             <a:r>
               <a:rPr lang="en-US" baseline="0" dirty="0" smtClean="0"/>
-              <a:t> test runner, you can go to the exact assert that failed</a:t>
+              <a:t> test runner, </a:t>
             </a:r>
             <a:r>
               <a:rPr lang="en-US" baseline="0" dirty="0" smtClean="0"/>
-              <a:t>.</a:t>
+              <a:t>there is a link to </a:t>
+            </a:r>
+            <a:r>
+              <a:rPr lang="en-US" baseline="0" dirty="0" smtClean="0"/>
+              <a:t>go to the exact assert that failed.</a:t>
             </a:r>
           </a:p>
           <a:p>
@@ -8205,8 +8598,15 @@
             </a:r>
             <a:r>
               <a:rPr lang="en-US" baseline="0" dirty="0" smtClean="0"/>
-              <a:t> string</a:t>
-            </a:r>
+              <a:t> </a:t>
+            </a:r>
+            <a:r>
+              <a:rPr lang="en-US" baseline="0" dirty="0" smtClean="0"/>
+              <a:t>string</a:t>
+            </a:r>
+          </a:p>
+          <a:p>
+            <a:endParaRPr lang="en-US" baseline="0" dirty="0" smtClean="0"/>
           </a:p>
           <a:p>
             <a:r>
@@ -8223,7 +8623,29 @@
             </a:r>
             <a:r>
               <a:rPr lang="en-US" baseline="0" dirty="0" smtClean="0"/>
-              <a:t> and then sets any related entities</a:t>
+              <a:t> and then sets any </a:t>
+            </a:r>
+            <a:r>
+              <a:rPr lang="en-US" baseline="0" dirty="0" smtClean="0"/>
+              <a:t>required related entities</a:t>
+            </a:r>
+          </a:p>
+          <a:p>
+            <a:endParaRPr lang="en-US" baseline="0" dirty="0" smtClean="0"/>
+          </a:p>
+          <a:p>
+            <a:r>
+              <a:rPr lang="en-US" baseline="0" dirty="0" smtClean="0"/>
+              <a:t>We save in the act</a:t>
+            </a:r>
+          </a:p>
+          <a:p>
+            <a:endParaRPr lang="en-US" baseline="0" dirty="0" smtClean="0"/>
+          </a:p>
+          <a:p>
+            <a:r>
+              <a:rPr lang="en-US" baseline="0" dirty="0" smtClean="0"/>
+              <a:t>We check that the value we are testing was not changed and that the save took place</a:t>
             </a:r>
             <a:endParaRPr lang="en-US" dirty="0"/>
           </a:p>
@@ -8312,8 +8734,33 @@
           <a:p>
             <a:r>
               <a:rPr lang="en-US" dirty="0" smtClean="0"/>
-              <a:t>We want an exception.</a:t>
-            </a:r>
+              <a:t>This is the exception we would get if we tried to</a:t>
+            </a:r>
+            <a:r>
+              <a:rPr lang="en-US" baseline="0" dirty="0" smtClean="0"/>
+              <a:t> save this in a controller method even though it isn’t valid.</a:t>
+            </a:r>
+            <a:endParaRPr lang="en-US" dirty="0" smtClean="0"/>
+          </a:p>
+          <a:p>
+            <a:endParaRPr lang="en-US" dirty="0" smtClean="0"/>
+          </a:p>
+          <a:p>
+            <a:r>
+              <a:rPr lang="en-US" dirty="0" smtClean="0"/>
+              <a:t>We </a:t>
+            </a:r>
+            <a:r>
+              <a:rPr lang="en-US" dirty="0" smtClean="0"/>
+              <a:t>want an exception</a:t>
+            </a:r>
+            <a:r>
+              <a:rPr lang="en-US" dirty="0" smtClean="0"/>
+              <a:t>. If we don’t get one this test fails.</a:t>
+            </a:r>
+          </a:p>
+          <a:p>
+            <a:endParaRPr lang="en-US" dirty="0" smtClean="0"/>
           </a:p>
           <a:p>
             <a:r>
@@ -8322,7 +8769,18 @@
             </a:r>
             <a:r>
               <a:rPr lang="en-US" baseline="0" dirty="0" smtClean="0"/>
-              <a:t> don’t want a different exception to be triggered. Another way to do this is to set a </a:t>
+              <a:t> don’t want a different exception to be triggered. </a:t>
+            </a:r>
+            <a:endParaRPr lang="en-US" baseline="0" dirty="0" smtClean="0"/>
+          </a:p>
+          <a:p>
+            <a:r>
+              <a:rPr lang="en-US" baseline="0" dirty="0" smtClean="0"/>
+              <a:t>Another </a:t>
+            </a:r>
+            <a:r>
+              <a:rPr lang="en-US" baseline="0" dirty="0" smtClean="0"/>
+              <a:t>way to do this is to set a </a:t>
             </a:r>
             <a:r>
               <a:rPr lang="en-US" baseline="0" dirty="0" err="1" smtClean="0"/>
@@ -8440,7 +8898,28 @@
             </a:r>
             <a:r>
               <a:rPr lang="en-US" baseline="0" dirty="0" smtClean="0"/>
-              <a:t> the proposal is not null, but it isn’t saved and we don’t have the cascade set in the mapping</a:t>
+              <a:t> the proposal is not null, but it isn’t saved </a:t>
+            </a:r>
+            <a:r>
+              <a:rPr lang="en-US" baseline="0" dirty="0" smtClean="0"/>
+              <a:t>*BECAUSE* we </a:t>
+            </a:r>
+            <a:r>
+              <a:rPr lang="en-US" baseline="0" dirty="0" smtClean="0"/>
+              <a:t>don’t have the cascade set in the </a:t>
+            </a:r>
+            <a:r>
+              <a:rPr lang="en-US" baseline="0" dirty="0" smtClean="0"/>
+              <a:t>mapping.</a:t>
+            </a:r>
+          </a:p>
+          <a:p>
+            <a:endParaRPr lang="en-US" baseline="0" dirty="0" smtClean="0"/>
+          </a:p>
+          <a:p>
+            <a:r>
+              <a:rPr lang="en-US" baseline="0" dirty="0" smtClean="0"/>
+              <a:t>If the mapping was changed to cascade save, this test would fail.</a:t>
             </a:r>
             <a:endParaRPr lang="en-US" dirty="0"/>
           </a:p>
@@ -8527,10 +9006,6 @@
           <a:bodyPr/>
           <a:lstStyle/>
           <a:p>
-            <a:r>
-              <a:rPr lang="en-US" dirty="0" smtClean="0"/>
-              <a:t>3 main types of tests.</a:t>
-            </a:r>
             <a:endParaRPr lang="en-US" dirty="0"/>
           </a:p>
         </p:txBody>
@@ -8553,7 +9028,7 @@
             <a:fld id="{75693FD4-8F83-4EF7-AC3F-0DC0388986B0}" type="slidenum">
               <a:rPr lang="en-US" smtClean="0"/>
               <a:pPr/>
-              <a:t>9</a:t>
+              <a:t>8</a:t>
             </a:fld>
             <a:endParaRPr lang="en-US" dirty="0"/>
           </a:p>
@@ -8562,7 +9037,7 @@
     </p:spTree>
     <p:extLst>
       <p:ext uri="{BB962C8B-B14F-4D97-AF65-F5344CB8AC3E}">
-        <p14:creationId xmlns:p14="http://schemas.microsoft.com/office/powerpoint/2010/main" val="337182817"/>
+        <p14:creationId xmlns:p14="http://schemas.microsoft.com/office/powerpoint/2010/main" val="3599361326"/>
       </p:ext>
     </p:extLst>
   </p:cSld>
@@ -8618,25 +9093,7 @@
           <a:p>
             <a:r>
               <a:rPr lang="en-US" dirty="0" smtClean="0"/>
-              <a:t>Creating the database and all that magic is done by using </a:t>
-            </a:r>
-            <a:r>
-              <a:rPr lang="en-US" dirty="0" err="1" smtClean="0"/>
-              <a:t>UCDarch’s</a:t>
-            </a:r>
-            <a:r>
-              <a:rPr lang="en-US" dirty="0" smtClean="0"/>
-              <a:t> base class.</a:t>
-            </a:r>
-          </a:p>
-          <a:p>
-            <a:r>
-              <a:rPr lang="en-US" dirty="0" smtClean="0"/>
-              <a:t>There is</a:t>
-            </a:r>
-            <a:r>
-              <a:rPr lang="en-US" baseline="0" dirty="0" smtClean="0"/>
-              <a:t> also a base class that doesn’t use the fluent mapping, but we are moving away from that way of mapping</a:t>
+              <a:t>3 main types of tests.</a:t>
             </a:r>
             <a:endParaRPr lang="en-US" dirty="0"/>
           </a:p>
@@ -8660,7 +9117,7 @@
             <a:fld id="{75693FD4-8F83-4EF7-AC3F-0DC0388986B0}" type="slidenum">
               <a:rPr lang="en-US" smtClean="0"/>
               <a:pPr/>
-              <a:t>10</a:t>
+              <a:t>9</a:t>
             </a:fld>
             <a:endParaRPr lang="en-US" dirty="0"/>
           </a:p>
@@ -8669,7 +9126,7 @@
     </p:spTree>
     <p:extLst>
       <p:ext uri="{BB962C8B-B14F-4D97-AF65-F5344CB8AC3E}">
-        <p14:creationId xmlns:p14="http://schemas.microsoft.com/office/powerpoint/2010/main" val="941329981"/>
+        <p14:creationId xmlns:p14="http://schemas.microsoft.com/office/powerpoint/2010/main" val="337182817"/>
       </p:ext>
     </p:extLst>
   </p:cSld>
@@ -9147,7 +9604,7 @@
             <a:fld id="{757B281C-5159-4971-8228-52B9A72E9ED2}" type="datetimeFigureOut">
               <a:rPr lang="en-US" smtClean="0"/>
               <a:pPr/>
-              <a:t>4/13/2011</a:t>
+              <a:t>4/14/2011</a:t>
             </a:fld>
             <a:endParaRPr lang="en-US" dirty="0"/>
           </a:p>
@@ -9249,7 +9706,7 @@
             <a:fld id="{757B281C-5159-4971-8228-52B9A72E9ED2}" type="datetimeFigureOut">
               <a:rPr lang="en-US" smtClean="0"/>
               <a:pPr/>
-              <a:t>4/13/2011</a:t>
+              <a:t>4/14/2011</a:t>
             </a:fld>
             <a:endParaRPr lang="en-US" dirty="0"/>
           </a:p>
@@ -9385,7 +9842,7 @@
             <a:fld id="{757B281C-5159-4971-8228-52B9A72E9ED2}" type="datetimeFigureOut">
               <a:rPr lang="en-US" smtClean="0"/>
               <a:pPr/>
-              <a:t>4/13/2011</a:t>
+              <a:t>4/14/2011</a:t>
             </a:fld>
             <a:endParaRPr lang="en-US" dirty="0"/>
           </a:p>
@@ -9591,7 +10048,7 @@
             <a:fld id="{757B281C-5159-4971-8228-52B9A72E9ED2}" type="datetimeFigureOut">
               <a:rPr lang="en-US" smtClean="0"/>
               <a:pPr/>
-              <a:t>4/13/2011</a:t>
+              <a:t>4/14/2011</a:t>
             </a:fld>
             <a:endParaRPr lang="en-US" dirty="0"/>
           </a:p>
@@ -9990,7 +10447,7 @@
             <a:fld id="{757B281C-5159-4971-8228-52B9A72E9ED2}" type="datetimeFigureOut">
               <a:rPr lang="en-US" smtClean="0"/>
               <a:pPr/>
-              <a:t>4/13/2011</a:t>
+              <a:t>4/14/2011</a:t>
             </a:fld>
             <a:endParaRPr lang="en-US" dirty="0"/>
           </a:p>
@@ -10290,7 +10747,7 @@
             <a:fld id="{757B281C-5159-4971-8228-52B9A72E9ED2}" type="datetimeFigureOut">
               <a:rPr lang="en-US" smtClean="0"/>
               <a:pPr/>
-              <a:t>4/13/2011</a:t>
+              <a:t>4/14/2011</a:t>
             </a:fld>
             <a:endParaRPr lang="en-US" dirty="0"/>
           </a:p>
@@ -10719,7 +11176,7 @@
             <a:fld id="{757B281C-5159-4971-8228-52B9A72E9ED2}" type="datetimeFigureOut">
               <a:rPr lang="en-US" smtClean="0"/>
               <a:pPr/>
-              <a:t>4/13/2011</a:t>
+              <a:t>4/14/2011</a:t>
             </a:fld>
             <a:endParaRPr lang="en-US" dirty="0"/>
           </a:p>
@@ -10996,7 +11453,7 @@
             <a:fld id="{757B281C-5159-4971-8228-52B9A72E9ED2}" type="datetimeFigureOut">
               <a:rPr lang="en-US" smtClean="0"/>
               <a:pPr/>
-              <a:t>4/13/2011</a:t>
+              <a:t>4/14/2011</a:t>
             </a:fld>
             <a:endParaRPr lang="en-US" dirty="0"/>
           </a:p>
@@ -11260,7 +11717,7 @@
             <a:fld id="{757B281C-5159-4971-8228-52B9A72E9ED2}" type="datetimeFigureOut">
               <a:rPr lang="en-US" smtClean="0"/>
               <a:pPr/>
-              <a:t>4/13/2011</a:t>
+              <a:t>4/14/2011</a:t>
             </a:fld>
             <a:endParaRPr lang="en-US" dirty="0"/>
           </a:p>
@@ -11430,7 +11887,7 @@
             <a:fld id="{757B281C-5159-4971-8228-52B9A72E9ED2}" type="datetimeFigureOut">
               <a:rPr lang="en-US" smtClean="0"/>
               <a:pPr/>
-              <a:t>4/13/2011</a:t>
+              <a:t>4/14/2011</a:t>
             </a:fld>
             <a:endParaRPr lang="en-US" dirty="0"/>
           </a:p>
@@ -11610,7 +12067,7 @@
             <a:fld id="{757B281C-5159-4971-8228-52B9A72E9ED2}" type="datetimeFigureOut">
               <a:rPr lang="en-US" smtClean="0"/>
               <a:pPr/>
-              <a:t>4/13/2011</a:t>
+              <a:t>4/14/2011</a:t>
             </a:fld>
             <a:endParaRPr lang="en-US" dirty="0"/>
           </a:p>
@@ -11852,7 +12309,7 @@
             <a:fld id="{757B281C-5159-4971-8228-52B9A72E9ED2}" type="datetimeFigureOut">
               <a:rPr lang="en-US" smtClean="0"/>
               <a:pPr/>
-              <a:t>4/13/2011</a:t>
+              <a:t>4/14/2011</a:t>
             </a:fld>
             <a:endParaRPr lang="en-US" dirty="0"/>
           </a:p>
@@ -12445,40 +12902,25 @@
             </a:r>
             <a:r>
               <a:rPr lang="en-US" dirty="0"/>
-              <a:t>in testing “: </a:t>
-            </a:r>
-            <a:r>
-              <a:rPr lang="en-US" dirty="0" err="1"/>
+              <a:t>in testing </a:t>
+            </a:r>
+            <a:r>
+              <a:rPr lang="en-US" dirty="0" smtClean="0"/>
+              <a:t>“</a:t>
+            </a:r>
+            <a:r>
+              <a:rPr lang="en-US" dirty="0"/>
+              <a:t> </a:t>
+            </a:r>
+            <a:r>
+              <a:rPr lang="en-US" dirty="0" err="1" smtClean="0"/>
               <a:t>FluentRepositoryTestBase</a:t>
             </a:r>
             <a:r>
-              <a:rPr lang="en-US" dirty="0"/>
-              <a:t>&lt;</a:t>
-            </a:r>
-            <a:r>
-              <a:rPr lang="en-US" dirty="0" err="1"/>
-              <a:t>TMap</a:t>
-            </a:r>
-            <a:r>
-              <a:rPr lang="en-US" dirty="0"/>
-              <a:t>&gt; where T : </a:t>
-            </a:r>
-            <a:r>
-              <a:rPr lang="en-US" dirty="0" err="1"/>
-              <a:t>DomainObjectWithTypedId</a:t>
-            </a:r>
-            <a:r>
-              <a:rPr lang="en-US" dirty="0"/>
-              <a:t>&lt;</a:t>
-            </a:r>
-            <a:r>
-              <a:rPr lang="en-US" dirty="0" err="1"/>
-              <a:t>IdT</a:t>
-            </a:r>
-            <a:r>
-              <a:rPr lang="en-US" dirty="0"/>
-              <a:t>&gt; ”</a:t>
-            </a:r>
+              <a:rPr lang="en-US" dirty="0" smtClean="0"/>
+              <a:t>”</a:t>
+            </a:r>
+            <a:endParaRPr lang="en-US" dirty="0"/>
           </a:p>
         </p:txBody>
       </p:sp>
@@ -12570,11 +13012,7 @@
             </a:r>
             <a:r>
               <a:rPr lang="en-US" dirty="0" smtClean="0"/>
-              <a:t> </a:t>
-            </a:r>
-            <a:r>
-              <a:rPr lang="en-US" dirty="0" smtClean="0"/>
-              <a:t>template, these are done with minimal coding)</a:t>
+              <a:t> template, these are done with minimal coding)</a:t>
             </a:r>
           </a:p>
           <a:p>
@@ -15431,7 +15869,7 @@
           <p:nvPr/>
         </p:nvPicPr>
         <p:blipFill>
-          <a:blip r:embed="rId2">
+          <a:blip r:embed="rId3">
             <a:extLst>
               <a:ext uri="{28A0092B-C50C-407E-A947-70E740481C1C}">
                 <a14:useLocalDpi xmlns:a14="http://schemas.microsoft.com/office/drawing/2010/main" val="0"/>
@@ -15495,7 +15933,7 @@
           <p:nvPr/>
         </p:nvPicPr>
         <p:blipFill>
-          <a:blip r:embed="rId3" cstate="email">
+          <a:blip r:embed="rId4" cstate="email">
             <a:extLst>
               <a:ext uri="{28A0092B-C50C-407E-A947-70E740481C1C}">
                 <a14:useLocalDpi xmlns:a14="http://schemas.microsoft.com/office/drawing/2010/main" val="0"/>

</xml_diff>